<commit_message>
Infografia y foto de MVC
</commit_message>
<xml_diff>
--- a/Infografias.pptx
+++ b/Infografias.pptx
@@ -6,6 +6,7 @@
   </p:sldMasterIdLst>
   <p:sldIdLst>
     <p:sldId id="256" r:id="rId2"/>
+    <p:sldId id="257" r:id="rId3"/>
   </p:sldIdLst>
   <p:sldSz cx="12192000" cy="6858000"/>
   <p:notesSz cx="6858000" cy="9144000"/>
@@ -104,6 +105,11 @@
       </a:defRPr>
     </a:lvl9pPr>
   </p:defaultTextStyle>
+  <p:extLst>
+    <p:ext uri="{EFAFB233-063F-42B5-8137-9DF3F51BA10A}">
+      <p15:sldGuideLst xmlns:p15="http://schemas.microsoft.com/office/powerpoint/2012/main"/>
+    </p:ext>
+  </p:extLst>
 </p:presentation>
 </file>
 
@@ -1510,6 +1516,3352 @@
 </cs:chartStyle>
 </file>
 
+<file path=ppt/diagrams/colors1.xml><?xml version="1.0" encoding="utf-8"?>
+<dgm:colorsDef xmlns:dgm="http://schemas.openxmlformats.org/drawingml/2006/diagram" xmlns:a="http://schemas.openxmlformats.org/drawingml/2006/main" uniqueId="urn:microsoft.com/office/officeart/2005/8/colors/accent5_1">
+  <dgm:title val=""/>
+  <dgm:desc val=""/>
+  <dgm:catLst>
+    <dgm:cat type="accent5" pri="11100"/>
+  </dgm:catLst>
+  <dgm:styleLbl name="node0">
+    <dgm:fillClrLst meth="repeat">
+      <a:schemeClr val="lt1"/>
+    </dgm:fillClrLst>
+    <dgm:linClrLst meth="repeat">
+      <a:schemeClr val="accent5">
+        <a:shade val="80000"/>
+      </a:schemeClr>
+    </dgm:linClrLst>
+    <dgm:effectClrLst/>
+    <dgm:txLinClrLst/>
+    <dgm:txFillClrLst meth="repeat">
+      <a:schemeClr val="dk1"/>
+    </dgm:txFillClrLst>
+    <dgm:txEffectClrLst/>
+  </dgm:styleLbl>
+  <dgm:styleLbl name="node1">
+    <dgm:fillClrLst meth="repeat">
+      <a:schemeClr val="lt1"/>
+    </dgm:fillClrLst>
+    <dgm:linClrLst meth="repeat">
+      <a:schemeClr val="accent5">
+        <a:shade val="80000"/>
+      </a:schemeClr>
+    </dgm:linClrLst>
+    <dgm:effectClrLst/>
+    <dgm:txLinClrLst/>
+    <dgm:txFillClrLst meth="repeat">
+      <a:schemeClr val="dk1"/>
+    </dgm:txFillClrLst>
+    <dgm:txEffectClrLst/>
+  </dgm:styleLbl>
+  <dgm:styleLbl name="alignNode1">
+    <dgm:fillClrLst meth="repeat">
+      <a:schemeClr val="lt1"/>
+    </dgm:fillClrLst>
+    <dgm:linClrLst meth="repeat">
+      <a:schemeClr val="accent5">
+        <a:shade val="80000"/>
+      </a:schemeClr>
+    </dgm:linClrLst>
+    <dgm:effectClrLst/>
+    <dgm:txLinClrLst/>
+    <dgm:txFillClrLst meth="repeat">
+      <a:schemeClr val="dk1"/>
+    </dgm:txFillClrLst>
+    <dgm:txEffectClrLst/>
+  </dgm:styleLbl>
+  <dgm:styleLbl name="lnNode1">
+    <dgm:fillClrLst meth="repeat">
+      <a:schemeClr val="lt1"/>
+    </dgm:fillClrLst>
+    <dgm:linClrLst meth="repeat">
+      <a:schemeClr val="accent5">
+        <a:shade val="80000"/>
+      </a:schemeClr>
+    </dgm:linClrLst>
+    <dgm:effectClrLst/>
+    <dgm:txLinClrLst/>
+    <dgm:txFillClrLst meth="repeat">
+      <a:schemeClr val="dk1"/>
+    </dgm:txFillClrLst>
+    <dgm:txEffectClrLst/>
+  </dgm:styleLbl>
+  <dgm:styleLbl name="vennNode1">
+    <dgm:fillClrLst meth="repeat">
+      <a:schemeClr val="lt1">
+        <a:alpha val="50000"/>
+      </a:schemeClr>
+    </dgm:fillClrLst>
+    <dgm:linClrLst meth="repeat">
+      <a:schemeClr val="accent5">
+        <a:shade val="80000"/>
+      </a:schemeClr>
+    </dgm:linClrLst>
+    <dgm:effectClrLst/>
+    <dgm:txLinClrLst/>
+    <dgm:txFillClrLst/>
+    <dgm:txEffectClrLst/>
+  </dgm:styleLbl>
+  <dgm:styleLbl name="node2">
+    <dgm:fillClrLst meth="repeat">
+      <a:schemeClr val="lt1"/>
+    </dgm:fillClrLst>
+    <dgm:linClrLst meth="repeat">
+      <a:schemeClr val="accent5">
+        <a:shade val="80000"/>
+      </a:schemeClr>
+    </dgm:linClrLst>
+    <dgm:effectClrLst/>
+    <dgm:txLinClrLst/>
+    <dgm:txFillClrLst meth="repeat">
+      <a:schemeClr val="dk1"/>
+    </dgm:txFillClrLst>
+    <dgm:txEffectClrLst/>
+  </dgm:styleLbl>
+  <dgm:styleLbl name="node3">
+    <dgm:fillClrLst meth="repeat">
+      <a:schemeClr val="lt1"/>
+    </dgm:fillClrLst>
+    <dgm:linClrLst meth="repeat">
+      <a:schemeClr val="accent5">
+        <a:shade val="80000"/>
+      </a:schemeClr>
+    </dgm:linClrLst>
+    <dgm:effectClrLst/>
+    <dgm:txLinClrLst/>
+    <dgm:txFillClrLst meth="repeat">
+      <a:schemeClr val="dk1"/>
+    </dgm:txFillClrLst>
+    <dgm:txEffectClrLst/>
+  </dgm:styleLbl>
+  <dgm:styleLbl name="node4">
+    <dgm:fillClrLst meth="repeat">
+      <a:schemeClr val="lt1"/>
+    </dgm:fillClrLst>
+    <dgm:linClrLst meth="repeat">
+      <a:schemeClr val="accent5">
+        <a:shade val="80000"/>
+      </a:schemeClr>
+    </dgm:linClrLst>
+    <dgm:effectClrLst/>
+    <dgm:txLinClrLst/>
+    <dgm:txFillClrLst meth="repeat">
+      <a:schemeClr val="dk1"/>
+    </dgm:txFillClrLst>
+    <dgm:txEffectClrLst/>
+  </dgm:styleLbl>
+  <dgm:styleLbl name="fgImgPlace1">
+    <dgm:fillClrLst meth="repeat">
+      <a:schemeClr val="accent5">
+        <a:tint val="40000"/>
+      </a:schemeClr>
+    </dgm:fillClrLst>
+    <dgm:linClrLst meth="repeat">
+      <a:schemeClr val="accent5">
+        <a:shade val="80000"/>
+      </a:schemeClr>
+    </dgm:linClrLst>
+    <dgm:effectClrLst/>
+    <dgm:txLinClrLst/>
+    <dgm:txFillClrLst meth="repeat">
+      <a:schemeClr val="lt1"/>
+    </dgm:txFillClrLst>
+    <dgm:txEffectClrLst/>
+  </dgm:styleLbl>
+  <dgm:styleLbl name="alignImgPlace1">
+    <dgm:fillClrLst meth="repeat">
+      <a:schemeClr val="accent5">
+        <a:tint val="40000"/>
+      </a:schemeClr>
+    </dgm:fillClrLst>
+    <dgm:linClrLst meth="repeat">
+      <a:schemeClr val="accent5">
+        <a:shade val="80000"/>
+      </a:schemeClr>
+    </dgm:linClrLst>
+    <dgm:effectClrLst/>
+    <dgm:txLinClrLst/>
+    <dgm:txFillClrLst meth="repeat">
+      <a:schemeClr val="lt1"/>
+    </dgm:txFillClrLst>
+    <dgm:txEffectClrLst/>
+  </dgm:styleLbl>
+  <dgm:styleLbl name="bgImgPlace1">
+    <dgm:fillClrLst meth="repeat">
+      <a:schemeClr val="accent5">
+        <a:tint val="40000"/>
+      </a:schemeClr>
+    </dgm:fillClrLst>
+    <dgm:linClrLst meth="repeat">
+      <a:schemeClr val="accent5">
+        <a:shade val="80000"/>
+      </a:schemeClr>
+    </dgm:linClrLst>
+    <dgm:effectClrLst/>
+    <dgm:txLinClrLst/>
+    <dgm:txFillClrLst meth="repeat">
+      <a:schemeClr val="lt1"/>
+    </dgm:txFillClrLst>
+    <dgm:txEffectClrLst/>
+  </dgm:styleLbl>
+  <dgm:styleLbl name="sibTrans2D1">
+    <dgm:fillClrLst meth="repeat">
+      <a:schemeClr val="accent5">
+        <a:tint val="60000"/>
+      </a:schemeClr>
+    </dgm:fillClrLst>
+    <dgm:linClrLst meth="repeat">
+      <a:schemeClr val="accent5">
+        <a:tint val="60000"/>
+      </a:schemeClr>
+    </dgm:linClrLst>
+    <dgm:effectClrLst/>
+    <dgm:txLinClrLst/>
+    <dgm:txFillClrLst meth="repeat">
+      <a:schemeClr val="dk1"/>
+    </dgm:txFillClrLst>
+    <dgm:txEffectClrLst/>
+  </dgm:styleLbl>
+  <dgm:styleLbl name="fgSibTrans2D1">
+    <dgm:fillClrLst meth="repeat">
+      <a:schemeClr val="accent5">
+        <a:tint val="60000"/>
+      </a:schemeClr>
+    </dgm:fillClrLst>
+    <dgm:linClrLst meth="repeat">
+      <a:schemeClr val="accent5">
+        <a:tint val="60000"/>
+      </a:schemeClr>
+    </dgm:linClrLst>
+    <dgm:effectClrLst/>
+    <dgm:txLinClrLst/>
+    <dgm:txFillClrLst meth="repeat">
+      <a:schemeClr val="dk1"/>
+    </dgm:txFillClrLst>
+    <dgm:txEffectClrLst/>
+  </dgm:styleLbl>
+  <dgm:styleLbl name="bgSibTrans2D1">
+    <dgm:fillClrLst meth="repeat">
+      <a:schemeClr val="accent5">
+        <a:tint val="60000"/>
+      </a:schemeClr>
+    </dgm:fillClrLst>
+    <dgm:linClrLst meth="repeat">
+      <a:schemeClr val="accent5">
+        <a:tint val="60000"/>
+      </a:schemeClr>
+    </dgm:linClrLst>
+    <dgm:effectClrLst/>
+    <dgm:txLinClrLst/>
+    <dgm:txFillClrLst meth="repeat">
+      <a:schemeClr val="dk1"/>
+    </dgm:txFillClrLst>
+    <dgm:txEffectClrLst/>
+  </dgm:styleLbl>
+  <dgm:styleLbl name="sibTrans1D1">
+    <dgm:fillClrLst meth="repeat">
+      <a:schemeClr val="accent5"/>
+    </dgm:fillClrLst>
+    <dgm:linClrLst meth="repeat">
+      <a:schemeClr val="accent5"/>
+    </dgm:linClrLst>
+    <dgm:effectClrLst/>
+    <dgm:txLinClrLst/>
+    <dgm:txFillClrLst meth="repeat">
+      <a:schemeClr val="tx1"/>
+    </dgm:txFillClrLst>
+    <dgm:txEffectClrLst/>
+  </dgm:styleLbl>
+  <dgm:styleLbl name="callout">
+    <dgm:fillClrLst meth="repeat">
+      <a:schemeClr val="accent5"/>
+    </dgm:fillClrLst>
+    <dgm:linClrLst meth="repeat">
+      <a:schemeClr val="accent5"/>
+    </dgm:linClrLst>
+    <dgm:effectClrLst/>
+    <dgm:txLinClrLst/>
+    <dgm:txFillClrLst meth="repeat">
+      <a:schemeClr val="tx1"/>
+    </dgm:txFillClrLst>
+    <dgm:txEffectClrLst/>
+  </dgm:styleLbl>
+  <dgm:styleLbl name="asst0">
+    <dgm:fillClrLst meth="repeat">
+      <a:schemeClr val="lt1"/>
+    </dgm:fillClrLst>
+    <dgm:linClrLst meth="repeat">
+      <a:schemeClr val="accent5">
+        <a:shade val="80000"/>
+      </a:schemeClr>
+    </dgm:linClrLst>
+    <dgm:effectClrLst/>
+    <dgm:txLinClrLst/>
+    <dgm:txFillClrLst meth="repeat">
+      <a:schemeClr val="dk1"/>
+    </dgm:txFillClrLst>
+    <dgm:txEffectClrLst/>
+  </dgm:styleLbl>
+  <dgm:styleLbl name="asst1">
+    <dgm:fillClrLst meth="repeat">
+      <a:schemeClr val="lt1"/>
+    </dgm:fillClrLst>
+    <dgm:linClrLst meth="repeat">
+      <a:schemeClr val="accent5">
+        <a:shade val="80000"/>
+      </a:schemeClr>
+    </dgm:linClrLst>
+    <dgm:effectClrLst/>
+    <dgm:txLinClrLst/>
+    <dgm:txFillClrLst meth="repeat">
+      <a:schemeClr val="dk1"/>
+    </dgm:txFillClrLst>
+    <dgm:txEffectClrLst/>
+  </dgm:styleLbl>
+  <dgm:styleLbl name="asst2">
+    <dgm:fillClrLst meth="repeat">
+      <a:schemeClr val="lt1"/>
+    </dgm:fillClrLst>
+    <dgm:linClrLst meth="repeat">
+      <a:schemeClr val="accent5">
+        <a:shade val="80000"/>
+      </a:schemeClr>
+    </dgm:linClrLst>
+    <dgm:effectClrLst/>
+    <dgm:txLinClrLst/>
+    <dgm:txFillClrLst meth="repeat">
+      <a:schemeClr val="dk1"/>
+    </dgm:txFillClrLst>
+    <dgm:txEffectClrLst/>
+  </dgm:styleLbl>
+  <dgm:styleLbl name="asst3">
+    <dgm:fillClrLst meth="repeat">
+      <a:schemeClr val="lt1"/>
+    </dgm:fillClrLst>
+    <dgm:linClrLst meth="repeat">
+      <a:schemeClr val="accent5">
+        <a:shade val="80000"/>
+      </a:schemeClr>
+    </dgm:linClrLst>
+    <dgm:effectClrLst/>
+    <dgm:txLinClrLst/>
+    <dgm:txFillClrLst meth="repeat">
+      <a:schemeClr val="dk1"/>
+    </dgm:txFillClrLst>
+    <dgm:txEffectClrLst/>
+  </dgm:styleLbl>
+  <dgm:styleLbl name="asst4">
+    <dgm:fillClrLst meth="repeat">
+      <a:schemeClr val="lt1"/>
+    </dgm:fillClrLst>
+    <dgm:linClrLst meth="repeat">
+      <a:schemeClr val="accent5">
+        <a:shade val="80000"/>
+      </a:schemeClr>
+    </dgm:linClrLst>
+    <dgm:effectClrLst/>
+    <dgm:txLinClrLst/>
+    <dgm:txFillClrLst meth="repeat">
+      <a:schemeClr val="dk1"/>
+    </dgm:txFillClrLst>
+    <dgm:txEffectClrLst/>
+  </dgm:styleLbl>
+  <dgm:styleLbl name="parChTrans2D1">
+    <dgm:fillClrLst meth="repeat">
+      <a:schemeClr val="accent5">
+        <a:tint val="60000"/>
+      </a:schemeClr>
+    </dgm:fillClrLst>
+    <dgm:linClrLst meth="repeat">
+      <a:schemeClr val="accent5">
+        <a:tint val="60000"/>
+      </a:schemeClr>
+    </dgm:linClrLst>
+    <dgm:effectClrLst/>
+    <dgm:txLinClrLst/>
+    <dgm:txFillClrLst/>
+    <dgm:txEffectClrLst/>
+  </dgm:styleLbl>
+  <dgm:styleLbl name="parChTrans2D2">
+    <dgm:fillClrLst meth="repeat">
+      <a:schemeClr val="accent5"/>
+    </dgm:fillClrLst>
+    <dgm:linClrLst meth="repeat">
+      <a:schemeClr val="accent5"/>
+    </dgm:linClrLst>
+    <dgm:effectClrLst/>
+    <dgm:txLinClrLst/>
+    <dgm:txFillClrLst/>
+    <dgm:txEffectClrLst/>
+  </dgm:styleLbl>
+  <dgm:styleLbl name="parChTrans2D3">
+    <dgm:fillClrLst meth="repeat">
+      <a:schemeClr val="accent5"/>
+    </dgm:fillClrLst>
+    <dgm:linClrLst meth="repeat">
+      <a:schemeClr val="accent5"/>
+    </dgm:linClrLst>
+    <dgm:effectClrLst/>
+    <dgm:txLinClrLst/>
+    <dgm:txFillClrLst/>
+    <dgm:txEffectClrLst/>
+  </dgm:styleLbl>
+  <dgm:styleLbl name="parChTrans2D4">
+    <dgm:fillClrLst meth="repeat">
+      <a:schemeClr val="accent5"/>
+    </dgm:fillClrLst>
+    <dgm:linClrLst meth="repeat">
+      <a:schemeClr val="accent5"/>
+    </dgm:linClrLst>
+    <dgm:effectClrLst/>
+    <dgm:txLinClrLst/>
+    <dgm:txFillClrLst meth="repeat">
+      <a:schemeClr val="lt1"/>
+    </dgm:txFillClrLst>
+    <dgm:txEffectClrLst/>
+  </dgm:styleLbl>
+  <dgm:styleLbl name="parChTrans1D1">
+    <dgm:fillClrLst meth="repeat">
+      <a:schemeClr val="accent5"/>
+    </dgm:fillClrLst>
+    <dgm:linClrLst meth="repeat">
+      <a:schemeClr val="accent5">
+        <a:shade val="60000"/>
+      </a:schemeClr>
+    </dgm:linClrLst>
+    <dgm:effectClrLst/>
+    <dgm:txLinClrLst/>
+    <dgm:txFillClrLst meth="repeat">
+      <a:schemeClr val="tx1"/>
+    </dgm:txFillClrLst>
+    <dgm:txEffectClrLst/>
+  </dgm:styleLbl>
+  <dgm:styleLbl name="parChTrans1D2">
+    <dgm:fillClrLst meth="repeat">
+      <a:schemeClr val="accent5"/>
+    </dgm:fillClrLst>
+    <dgm:linClrLst meth="repeat">
+      <a:schemeClr val="accent5">
+        <a:shade val="60000"/>
+      </a:schemeClr>
+    </dgm:linClrLst>
+    <dgm:effectClrLst/>
+    <dgm:txLinClrLst/>
+    <dgm:txFillClrLst meth="repeat">
+      <a:schemeClr val="tx1"/>
+    </dgm:txFillClrLst>
+    <dgm:txEffectClrLst/>
+  </dgm:styleLbl>
+  <dgm:styleLbl name="parChTrans1D3">
+    <dgm:fillClrLst meth="repeat">
+      <a:schemeClr val="accent5"/>
+    </dgm:fillClrLst>
+    <dgm:linClrLst meth="repeat">
+      <a:schemeClr val="accent5">
+        <a:shade val="80000"/>
+      </a:schemeClr>
+    </dgm:linClrLst>
+    <dgm:effectClrLst/>
+    <dgm:txLinClrLst/>
+    <dgm:txFillClrLst meth="repeat">
+      <a:schemeClr val="tx1"/>
+    </dgm:txFillClrLst>
+    <dgm:txEffectClrLst/>
+  </dgm:styleLbl>
+  <dgm:styleLbl name="parChTrans1D4">
+    <dgm:fillClrLst meth="repeat">
+      <a:schemeClr val="accent5"/>
+    </dgm:fillClrLst>
+    <dgm:linClrLst meth="repeat">
+      <a:schemeClr val="accent5">
+        <a:shade val="80000"/>
+      </a:schemeClr>
+    </dgm:linClrLst>
+    <dgm:effectClrLst/>
+    <dgm:txLinClrLst/>
+    <dgm:txFillClrLst meth="repeat">
+      <a:schemeClr val="tx1"/>
+    </dgm:txFillClrLst>
+    <dgm:txEffectClrLst/>
+  </dgm:styleLbl>
+  <dgm:styleLbl name="fgAcc1">
+    <dgm:fillClrLst meth="repeat">
+      <a:schemeClr val="accent5">
+        <a:alpha val="90000"/>
+        <a:tint val="40000"/>
+      </a:schemeClr>
+    </dgm:fillClrLst>
+    <dgm:linClrLst meth="repeat">
+      <a:schemeClr val="accent5"/>
+    </dgm:linClrLst>
+    <dgm:effectClrLst/>
+    <dgm:txLinClrLst/>
+    <dgm:txFillClrLst meth="repeat">
+      <a:schemeClr val="dk1"/>
+    </dgm:txFillClrLst>
+    <dgm:txEffectClrLst/>
+  </dgm:styleLbl>
+  <dgm:styleLbl name="conFgAcc1">
+    <dgm:fillClrLst meth="repeat">
+      <a:schemeClr val="accent5">
+        <a:alpha val="90000"/>
+        <a:tint val="40000"/>
+      </a:schemeClr>
+    </dgm:fillClrLst>
+    <dgm:linClrLst meth="repeat">
+      <a:schemeClr val="accent5"/>
+    </dgm:linClrLst>
+    <dgm:effectClrLst/>
+    <dgm:txLinClrLst/>
+    <dgm:txFillClrLst meth="repeat">
+      <a:schemeClr val="dk1"/>
+    </dgm:txFillClrLst>
+    <dgm:txEffectClrLst/>
+  </dgm:styleLbl>
+  <dgm:styleLbl name="alignAcc1">
+    <dgm:fillClrLst meth="repeat">
+      <a:schemeClr val="accent5">
+        <a:alpha val="90000"/>
+        <a:tint val="40000"/>
+      </a:schemeClr>
+    </dgm:fillClrLst>
+    <dgm:linClrLst meth="repeat">
+      <a:schemeClr val="accent5"/>
+    </dgm:linClrLst>
+    <dgm:effectClrLst/>
+    <dgm:txLinClrLst/>
+    <dgm:txFillClrLst meth="repeat">
+      <a:schemeClr val="dk1"/>
+    </dgm:txFillClrLst>
+    <dgm:txEffectClrLst/>
+  </dgm:styleLbl>
+  <dgm:styleLbl name="trAlignAcc1">
+    <dgm:fillClrLst meth="repeat">
+      <a:schemeClr val="accent5">
+        <a:alpha val="40000"/>
+        <a:tint val="40000"/>
+      </a:schemeClr>
+    </dgm:fillClrLst>
+    <dgm:linClrLst meth="repeat">
+      <a:schemeClr val="accent5"/>
+    </dgm:linClrLst>
+    <dgm:effectClrLst/>
+    <dgm:txLinClrLst/>
+    <dgm:txFillClrLst meth="repeat">
+      <a:schemeClr val="dk1"/>
+    </dgm:txFillClrLst>
+    <dgm:txEffectClrLst/>
+  </dgm:styleLbl>
+  <dgm:styleLbl name="bgAcc1">
+    <dgm:fillClrLst meth="repeat">
+      <a:schemeClr val="accent5">
+        <a:alpha val="90000"/>
+        <a:tint val="40000"/>
+      </a:schemeClr>
+    </dgm:fillClrLst>
+    <dgm:linClrLst meth="repeat">
+      <a:schemeClr val="accent5"/>
+    </dgm:linClrLst>
+    <dgm:effectClrLst/>
+    <dgm:txLinClrLst/>
+    <dgm:txFillClrLst meth="repeat">
+      <a:schemeClr val="dk1"/>
+    </dgm:txFillClrLst>
+    <dgm:txEffectClrLst/>
+  </dgm:styleLbl>
+  <dgm:styleLbl name="solidFgAcc1">
+    <dgm:fillClrLst meth="repeat">
+      <a:schemeClr val="lt1"/>
+    </dgm:fillClrLst>
+    <dgm:linClrLst meth="repeat">
+      <a:schemeClr val="accent5"/>
+    </dgm:linClrLst>
+    <dgm:effectClrLst/>
+    <dgm:txLinClrLst/>
+    <dgm:txFillClrLst meth="repeat">
+      <a:schemeClr val="dk1"/>
+    </dgm:txFillClrLst>
+    <dgm:txEffectClrLst/>
+  </dgm:styleLbl>
+  <dgm:styleLbl name="solidAlignAcc1">
+    <dgm:fillClrLst meth="repeat">
+      <a:schemeClr val="lt1"/>
+    </dgm:fillClrLst>
+    <dgm:linClrLst meth="repeat">
+      <a:schemeClr val="accent5"/>
+    </dgm:linClrLst>
+    <dgm:effectClrLst/>
+    <dgm:txLinClrLst/>
+    <dgm:txFillClrLst meth="repeat">
+      <a:schemeClr val="dk1"/>
+    </dgm:txFillClrLst>
+    <dgm:txEffectClrLst/>
+  </dgm:styleLbl>
+  <dgm:styleLbl name="solidBgAcc1">
+    <dgm:fillClrLst meth="repeat">
+      <a:schemeClr val="lt1"/>
+    </dgm:fillClrLst>
+    <dgm:linClrLst meth="repeat">
+      <a:schemeClr val="accent5"/>
+    </dgm:linClrLst>
+    <dgm:effectClrLst/>
+    <dgm:txLinClrLst/>
+    <dgm:txFillClrLst meth="repeat">
+      <a:schemeClr val="dk1"/>
+    </dgm:txFillClrLst>
+    <dgm:txEffectClrLst/>
+  </dgm:styleLbl>
+  <dgm:styleLbl name="fgAccFollowNode1">
+    <dgm:fillClrLst meth="repeat">
+      <a:schemeClr val="lt1">
+        <a:alpha val="90000"/>
+        <a:tint val="40000"/>
+      </a:schemeClr>
+    </dgm:fillClrLst>
+    <dgm:linClrLst meth="repeat">
+      <a:schemeClr val="accent5">
+        <a:alpha val="90000"/>
+      </a:schemeClr>
+    </dgm:linClrLst>
+    <dgm:effectClrLst/>
+    <dgm:txLinClrLst/>
+    <dgm:txFillClrLst meth="repeat">
+      <a:schemeClr val="dk1"/>
+    </dgm:txFillClrLst>
+    <dgm:txEffectClrLst/>
+  </dgm:styleLbl>
+  <dgm:styleLbl name="alignAccFollowNode1">
+    <dgm:fillClrLst meth="repeat">
+      <a:schemeClr val="lt1">
+        <a:alpha val="90000"/>
+        <a:tint val="40000"/>
+      </a:schemeClr>
+    </dgm:fillClrLst>
+    <dgm:linClrLst meth="repeat">
+      <a:schemeClr val="accent5">
+        <a:alpha val="90000"/>
+      </a:schemeClr>
+    </dgm:linClrLst>
+    <dgm:effectClrLst/>
+    <dgm:txLinClrLst/>
+    <dgm:txFillClrLst meth="repeat">
+      <a:schemeClr val="dk1"/>
+    </dgm:txFillClrLst>
+    <dgm:txEffectClrLst/>
+  </dgm:styleLbl>
+  <dgm:styleLbl name="bgAccFollowNode1">
+    <dgm:fillClrLst meth="repeat">
+      <a:schemeClr val="lt1">
+        <a:alpha val="90000"/>
+        <a:tint val="40000"/>
+      </a:schemeClr>
+    </dgm:fillClrLst>
+    <dgm:linClrLst meth="repeat">
+      <a:schemeClr val="accent5">
+        <a:alpha val="90000"/>
+      </a:schemeClr>
+    </dgm:linClrLst>
+    <dgm:effectClrLst/>
+    <dgm:txLinClrLst/>
+    <dgm:txFillClrLst meth="repeat">
+      <a:schemeClr val="dk1"/>
+    </dgm:txFillClrLst>
+    <dgm:txEffectClrLst/>
+  </dgm:styleLbl>
+  <dgm:styleLbl name="fgAcc0">
+    <dgm:fillClrLst meth="repeat">
+      <a:schemeClr val="accent5">
+        <a:alpha val="90000"/>
+        <a:tint val="40000"/>
+      </a:schemeClr>
+    </dgm:fillClrLst>
+    <dgm:linClrLst meth="repeat">
+      <a:schemeClr val="accent5"/>
+    </dgm:linClrLst>
+    <dgm:effectClrLst/>
+    <dgm:txLinClrLst/>
+    <dgm:txFillClrLst meth="repeat">
+      <a:schemeClr val="dk1"/>
+    </dgm:txFillClrLst>
+    <dgm:txEffectClrLst/>
+  </dgm:styleLbl>
+  <dgm:styleLbl name="fgAcc2">
+    <dgm:fillClrLst meth="repeat">
+      <a:schemeClr val="accent5">
+        <a:alpha val="90000"/>
+        <a:tint val="40000"/>
+      </a:schemeClr>
+    </dgm:fillClrLst>
+    <dgm:linClrLst meth="repeat">
+      <a:schemeClr val="accent5"/>
+    </dgm:linClrLst>
+    <dgm:effectClrLst/>
+    <dgm:txLinClrLst/>
+    <dgm:txFillClrLst meth="repeat">
+      <a:schemeClr val="dk1"/>
+    </dgm:txFillClrLst>
+    <dgm:txEffectClrLst/>
+  </dgm:styleLbl>
+  <dgm:styleLbl name="fgAcc3">
+    <dgm:fillClrLst meth="repeat">
+      <a:schemeClr val="accent5">
+        <a:alpha val="90000"/>
+        <a:tint val="40000"/>
+      </a:schemeClr>
+    </dgm:fillClrLst>
+    <dgm:linClrLst meth="repeat">
+      <a:schemeClr val="accent5"/>
+    </dgm:linClrLst>
+    <dgm:effectClrLst/>
+    <dgm:txLinClrLst/>
+    <dgm:txFillClrLst meth="repeat">
+      <a:schemeClr val="dk1"/>
+    </dgm:txFillClrLst>
+    <dgm:txEffectClrLst/>
+  </dgm:styleLbl>
+  <dgm:styleLbl name="fgAcc4">
+    <dgm:fillClrLst meth="repeat">
+      <a:schemeClr val="accent5">
+        <a:alpha val="90000"/>
+        <a:tint val="40000"/>
+      </a:schemeClr>
+    </dgm:fillClrLst>
+    <dgm:linClrLst meth="repeat">
+      <a:schemeClr val="accent5"/>
+    </dgm:linClrLst>
+    <dgm:effectClrLst/>
+    <dgm:txLinClrLst/>
+    <dgm:txFillClrLst meth="repeat">
+      <a:schemeClr val="dk1"/>
+    </dgm:txFillClrLst>
+    <dgm:txEffectClrLst/>
+  </dgm:styleLbl>
+  <dgm:styleLbl name="bgShp">
+    <dgm:fillClrLst meth="repeat">
+      <a:schemeClr val="accent5">
+        <a:tint val="40000"/>
+      </a:schemeClr>
+    </dgm:fillClrLst>
+    <dgm:linClrLst meth="repeat">
+      <a:schemeClr val="accent5"/>
+    </dgm:linClrLst>
+    <dgm:effectClrLst/>
+    <dgm:txLinClrLst/>
+    <dgm:txFillClrLst meth="repeat">
+      <a:schemeClr val="dk1"/>
+    </dgm:txFillClrLst>
+    <dgm:txEffectClrLst/>
+  </dgm:styleLbl>
+  <dgm:styleLbl name="dkBgShp">
+    <dgm:fillClrLst meth="repeat">
+      <a:schemeClr val="accent5">
+        <a:shade val="80000"/>
+      </a:schemeClr>
+    </dgm:fillClrLst>
+    <dgm:linClrLst meth="repeat">
+      <a:schemeClr val="accent5"/>
+    </dgm:linClrLst>
+    <dgm:effectClrLst/>
+    <dgm:txLinClrLst/>
+    <dgm:txFillClrLst meth="repeat">
+      <a:schemeClr val="lt1"/>
+    </dgm:txFillClrLst>
+    <dgm:txEffectClrLst/>
+  </dgm:styleLbl>
+  <dgm:styleLbl name="trBgShp">
+    <dgm:fillClrLst meth="repeat">
+      <a:schemeClr val="accent5">
+        <a:tint val="50000"/>
+        <a:alpha val="40000"/>
+      </a:schemeClr>
+    </dgm:fillClrLst>
+    <dgm:linClrLst meth="repeat">
+      <a:schemeClr val="accent5"/>
+    </dgm:linClrLst>
+    <dgm:effectClrLst/>
+    <dgm:txLinClrLst/>
+    <dgm:txFillClrLst meth="repeat">
+      <a:schemeClr val="lt1"/>
+    </dgm:txFillClrLst>
+    <dgm:txEffectClrLst/>
+  </dgm:styleLbl>
+  <dgm:styleLbl name="fgShp">
+    <dgm:fillClrLst meth="repeat">
+      <a:schemeClr val="accent5">
+        <a:tint val="60000"/>
+      </a:schemeClr>
+    </dgm:fillClrLst>
+    <dgm:linClrLst meth="repeat">
+      <a:schemeClr val="lt1"/>
+    </dgm:linClrLst>
+    <dgm:effectClrLst/>
+    <dgm:txLinClrLst/>
+    <dgm:txFillClrLst meth="repeat">
+      <a:schemeClr val="dk1"/>
+    </dgm:txFillClrLst>
+    <dgm:txEffectClrLst/>
+  </dgm:styleLbl>
+  <dgm:styleLbl name="revTx">
+    <dgm:fillClrLst meth="repeat">
+      <a:schemeClr val="lt1">
+        <a:alpha val="0"/>
+      </a:schemeClr>
+    </dgm:fillClrLst>
+    <dgm:linClrLst meth="repeat">
+      <a:schemeClr val="dk1">
+        <a:alpha val="0"/>
+      </a:schemeClr>
+    </dgm:linClrLst>
+    <dgm:effectClrLst/>
+    <dgm:txLinClrLst/>
+    <dgm:txFillClrLst meth="repeat">
+      <a:schemeClr val="tx1"/>
+    </dgm:txFillClrLst>
+    <dgm:txEffectClrLst/>
+  </dgm:styleLbl>
+</dgm:colorsDef>
+</file>
+
+<file path=ppt/diagrams/data1.xml><?xml version="1.0" encoding="utf-8"?>
+<dgm:dataModel xmlns:dgm="http://schemas.openxmlformats.org/drawingml/2006/diagram" xmlns:a="http://schemas.openxmlformats.org/drawingml/2006/main">
+  <dgm:ptLst>
+    <dgm:pt modelId="{10B536A7-6E30-404E-BA80-F79D95CADD30}" type="doc">
+      <dgm:prSet loTypeId="urn:microsoft.com/office/officeart/2005/8/layout/StepDownProcess" loCatId="process" qsTypeId="urn:microsoft.com/office/officeart/2005/8/quickstyle/simple1" qsCatId="simple" csTypeId="urn:microsoft.com/office/officeart/2005/8/colors/accent5_1" csCatId="accent5" phldr="1"/>
+      <dgm:spPr/>
+      <dgm:t>
+        <a:bodyPr/>
+        <a:lstStyle/>
+        <a:p>
+          <a:endParaRPr lang="es-ES"/>
+        </a:p>
+      </dgm:t>
+    </dgm:pt>
+    <dgm:pt modelId="{EDC3B893-2DE6-465C-A086-FA09B20A320D}">
+      <dgm:prSet phldrT="[Texto]"/>
+      <dgm:spPr/>
+      <dgm:t>
+        <a:bodyPr/>
+        <a:lstStyle/>
+        <a:p>
+          <a:r>
+            <a:rPr lang="es-ES" dirty="0" smtClean="0"/>
+            <a:t>Requisitos software</a:t>
+          </a:r>
+          <a:endParaRPr lang="es-ES" dirty="0"/>
+        </a:p>
+      </dgm:t>
+    </dgm:pt>
+    <dgm:pt modelId="{4AC02CC2-0FB0-42E7-8A95-ADDA50419CD2}" type="parTrans" cxnId="{50F8FEDB-F51C-472C-BB84-613A4EE4017D}">
+      <dgm:prSet/>
+      <dgm:spPr/>
+      <dgm:t>
+        <a:bodyPr/>
+        <a:lstStyle/>
+        <a:p>
+          <a:endParaRPr lang="es-ES"/>
+        </a:p>
+      </dgm:t>
+    </dgm:pt>
+    <dgm:pt modelId="{410EC82D-F1E4-4144-8972-DA59DEC93A24}" type="sibTrans" cxnId="{50F8FEDB-F51C-472C-BB84-613A4EE4017D}">
+      <dgm:prSet/>
+      <dgm:spPr/>
+      <dgm:t>
+        <a:bodyPr/>
+        <a:lstStyle/>
+        <a:p>
+          <a:endParaRPr lang="es-ES"/>
+        </a:p>
+      </dgm:t>
+    </dgm:pt>
+    <dgm:pt modelId="{E90A7B7F-C043-4CF5-B459-871488D90643}">
+      <dgm:prSet phldrT="[Texto]"/>
+      <dgm:spPr/>
+      <dgm:t>
+        <a:bodyPr/>
+        <a:lstStyle/>
+        <a:p>
+          <a:r>
+            <a:rPr lang="es-ES" dirty="0" smtClean="0"/>
+            <a:t>Diseño</a:t>
+          </a:r>
+          <a:endParaRPr lang="es-ES" dirty="0"/>
+        </a:p>
+      </dgm:t>
+    </dgm:pt>
+    <dgm:pt modelId="{BC9783CF-43D6-456A-980C-384662AC20DA}" type="parTrans" cxnId="{910CB811-7DEB-4DB5-A1B8-74C928CFDF94}">
+      <dgm:prSet/>
+      <dgm:spPr/>
+      <dgm:t>
+        <a:bodyPr/>
+        <a:lstStyle/>
+        <a:p>
+          <a:endParaRPr lang="es-ES"/>
+        </a:p>
+      </dgm:t>
+    </dgm:pt>
+    <dgm:pt modelId="{A0E79249-7065-4962-8735-A6C688F5445B}" type="sibTrans" cxnId="{910CB811-7DEB-4DB5-A1B8-74C928CFDF94}">
+      <dgm:prSet/>
+      <dgm:spPr/>
+      <dgm:t>
+        <a:bodyPr/>
+        <a:lstStyle/>
+        <a:p>
+          <a:endParaRPr lang="es-ES"/>
+        </a:p>
+      </dgm:t>
+    </dgm:pt>
+    <dgm:pt modelId="{C963126C-24D9-4CD0-A634-48E45F49C5DE}">
+      <dgm:prSet phldrT="[Texto]"/>
+      <dgm:spPr/>
+      <dgm:t>
+        <a:bodyPr/>
+        <a:lstStyle/>
+        <a:p>
+          <a:r>
+            <a:rPr lang="es-ES" dirty="0" smtClean="0"/>
+            <a:t>Implementación</a:t>
+          </a:r>
+          <a:endParaRPr lang="es-ES" dirty="0"/>
+        </a:p>
+      </dgm:t>
+    </dgm:pt>
+    <dgm:pt modelId="{9329C171-081B-426F-9254-AC652C4774F6}" type="parTrans" cxnId="{83D3C1C1-8B90-4D2E-ABCB-1E96F3D88BE7}">
+      <dgm:prSet/>
+      <dgm:spPr/>
+      <dgm:t>
+        <a:bodyPr/>
+        <a:lstStyle/>
+        <a:p>
+          <a:endParaRPr lang="es-ES"/>
+        </a:p>
+      </dgm:t>
+    </dgm:pt>
+    <dgm:pt modelId="{9A17AD42-0B00-406A-8100-E3566A66F3D3}" type="sibTrans" cxnId="{83D3C1C1-8B90-4D2E-ABCB-1E96F3D88BE7}">
+      <dgm:prSet/>
+      <dgm:spPr/>
+      <dgm:t>
+        <a:bodyPr/>
+        <a:lstStyle/>
+        <a:p>
+          <a:endParaRPr lang="es-ES"/>
+        </a:p>
+      </dgm:t>
+    </dgm:pt>
+    <dgm:pt modelId="{4A66FC27-468B-4BD2-8DCA-B5C193A98BBD}">
+      <dgm:prSet phldrT="[Texto]"/>
+      <dgm:spPr/>
+      <dgm:t>
+        <a:bodyPr/>
+        <a:lstStyle/>
+        <a:p>
+          <a:r>
+            <a:rPr lang="es-ES" dirty="0" smtClean="0"/>
+            <a:t>Verificación</a:t>
+          </a:r>
+          <a:endParaRPr lang="es-ES" dirty="0"/>
+        </a:p>
+      </dgm:t>
+    </dgm:pt>
+    <dgm:pt modelId="{3E8D3D35-8D87-40B0-AD1A-4AB625FB757E}" type="parTrans" cxnId="{F5BF2D68-3C0D-4471-9087-AF89D79EC340}">
+      <dgm:prSet/>
+      <dgm:spPr/>
+      <dgm:t>
+        <a:bodyPr/>
+        <a:lstStyle/>
+        <a:p>
+          <a:endParaRPr lang="es-ES"/>
+        </a:p>
+      </dgm:t>
+    </dgm:pt>
+    <dgm:pt modelId="{FB05280D-551C-4D87-A18D-4E28E3EFE770}" type="sibTrans" cxnId="{F5BF2D68-3C0D-4471-9087-AF89D79EC340}">
+      <dgm:prSet/>
+      <dgm:spPr/>
+      <dgm:t>
+        <a:bodyPr/>
+        <a:lstStyle/>
+        <a:p>
+          <a:endParaRPr lang="es-ES"/>
+        </a:p>
+      </dgm:t>
+    </dgm:pt>
+    <dgm:pt modelId="{179228B3-389D-40F4-AB8B-BEAD5A6314A1}">
+      <dgm:prSet phldrT="[Texto]"/>
+      <dgm:spPr/>
+      <dgm:t>
+        <a:bodyPr/>
+        <a:lstStyle/>
+        <a:p>
+          <a:r>
+            <a:rPr lang="es-ES" dirty="0" smtClean="0"/>
+            <a:t>Instalación y mantenimiento</a:t>
+          </a:r>
+          <a:endParaRPr lang="es-ES" dirty="0"/>
+        </a:p>
+      </dgm:t>
+    </dgm:pt>
+    <dgm:pt modelId="{0BBDD2C8-5DE2-4B88-8818-77B914584AC9}" type="parTrans" cxnId="{0369377F-41F0-4CC5-82A6-6D5625703756}">
+      <dgm:prSet/>
+      <dgm:spPr/>
+      <dgm:t>
+        <a:bodyPr/>
+        <a:lstStyle/>
+        <a:p>
+          <a:endParaRPr lang="es-ES"/>
+        </a:p>
+      </dgm:t>
+    </dgm:pt>
+    <dgm:pt modelId="{4E33100D-E9DD-4D50-825E-BF814EB5660B}" type="sibTrans" cxnId="{0369377F-41F0-4CC5-82A6-6D5625703756}">
+      <dgm:prSet/>
+      <dgm:spPr/>
+      <dgm:t>
+        <a:bodyPr/>
+        <a:lstStyle/>
+        <a:p>
+          <a:endParaRPr lang="es-ES"/>
+        </a:p>
+      </dgm:t>
+    </dgm:pt>
+    <dgm:pt modelId="{8A781059-DDA9-497E-8613-5445EDB52CF3}" type="pres">
+      <dgm:prSet presAssocID="{10B536A7-6E30-404E-BA80-F79D95CADD30}" presName="rootnode" presStyleCnt="0">
+        <dgm:presLayoutVars>
+          <dgm:chMax/>
+          <dgm:chPref/>
+          <dgm:dir/>
+          <dgm:animLvl val="lvl"/>
+        </dgm:presLayoutVars>
+      </dgm:prSet>
+      <dgm:spPr/>
+    </dgm:pt>
+    <dgm:pt modelId="{7A52D6B9-C7A3-49FF-AF71-92B04ECB2EB3}" type="pres">
+      <dgm:prSet presAssocID="{EDC3B893-2DE6-465C-A086-FA09B20A320D}" presName="composite" presStyleCnt="0"/>
+      <dgm:spPr/>
+    </dgm:pt>
+    <dgm:pt modelId="{E6803CD7-0CDA-41E6-8A33-26BEDB2B5354}" type="pres">
+      <dgm:prSet presAssocID="{EDC3B893-2DE6-465C-A086-FA09B20A320D}" presName="bentUpArrow1" presStyleLbl="alignImgPlace1" presStyleIdx="0" presStyleCnt="4"/>
+      <dgm:spPr/>
+    </dgm:pt>
+    <dgm:pt modelId="{2BA88272-170E-4935-B77F-F5F1143295AA}" type="pres">
+      <dgm:prSet presAssocID="{EDC3B893-2DE6-465C-A086-FA09B20A320D}" presName="ParentText" presStyleLbl="node1" presStyleIdx="0" presStyleCnt="5">
+        <dgm:presLayoutVars>
+          <dgm:chMax val="1"/>
+          <dgm:chPref val="1"/>
+          <dgm:bulletEnabled val="1"/>
+        </dgm:presLayoutVars>
+      </dgm:prSet>
+      <dgm:spPr/>
+      <dgm:t>
+        <a:bodyPr/>
+        <a:lstStyle/>
+        <a:p>
+          <a:endParaRPr lang="es-ES"/>
+        </a:p>
+      </dgm:t>
+    </dgm:pt>
+    <dgm:pt modelId="{0B3B84AC-938F-457C-909B-F66ED71EB7B4}" type="pres">
+      <dgm:prSet presAssocID="{EDC3B893-2DE6-465C-A086-FA09B20A320D}" presName="ChildText" presStyleLbl="revTx" presStyleIdx="0" presStyleCnt="4">
+        <dgm:presLayoutVars>
+          <dgm:chMax val="0"/>
+          <dgm:chPref val="0"/>
+          <dgm:bulletEnabled val="1"/>
+        </dgm:presLayoutVars>
+      </dgm:prSet>
+      <dgm:spPr/>
+      <dgm:t>
+        <a:bodyPr/>
+        <a:lstStyle/>
+        <a:p>
+          <a:endParaRPr lang="es-ES"/>
+        </a:p>
+      </dgm:t>
+    </dgm:pt>
+    <dgm:pt modelId="{BCF17F61-58D8-4CE1-9140-9143B7492291}" type="pres">
+      <dgm:prSet presAssocID="{410EC82D-F1E4-4144-8972-DA59DEC93A24}" presName="sibTrans" presStyleCnt="0"/>
+      <dgm:spPr/>
+    </dgm:pt>
+    <dgm:pt modelId="{162D8ACE-B9D9-41BC-B2A2-34A21D95A24C}" type="pres">
+      <dgm:prSet presAssocID="{E90A7B7F-C043-4CF5-B459-871488D90643}" presName="composite" presStyleCnt="0"/>
+      <dgm:spPr/>
+    </dgm:pt>
+    <dgm:pt modelId="{AAA495A4-53F0-4EAB-B19C-378C608EA8AD}" type="pres">
+      <dgm:prSet presAssocID="{E90A7B7F-C043-4CF5-B459-871488D90643}" presName="bentUpArrow1" presStyleLbl="alignImgPlace1" presStyleIdx="1" presStyleCnt="4"/>
+      <dgm:spPr/>
+    </dgm:pt>
+    <dgm:pt modelId="{699E7647-938C-4444-9B23-7D8CA3770712}" type="pres">
+      <dgm:prSet presAssocID="{E90A7B7F-C043-4CF5-B459-871488D90643}" presName="ParentText" presStyleLbl="node1" presStyleIdx="1" presStyleCnt="5">
+        <dgm:presLayoutVars>
+          <dgm:chMax val="1"/>
+          <dgm:chPref val="1"/>
+          <dgm:bulletEnabled val="1"/>
+        </dgm:presLayoutVars>
+      </dgm:prSet>
+      <dgm:spPr/>
+    </dgm:pt>
+    <dgm:pt modelId="{632DA3B5-B0F2-494F-B9FC-1542F9C589D4}" type="pres">
+      <dgm:prSet presAssocID="{E90A7B7F-C043-4CF5-B459-871488D90643}" presName="ChildText" presStyleLbl="revTx" presStyleIdx="1" presStyleCnt="4">
+        <dgm:presLayoutVars>
+          <dgm:chMax val="0"/>
+          <dgm:chPref val="0"/>
+          <dgm:bulletEnabled val="1"/>
+        </dgm:presLayoutVars>
+      </dgm:prSet>
+      <dgm:spPr/>
+      <dgm:t>
+        <a:bodyPr/>
+        <a:lstStyle/>
+        <a:p>
+          <a:endParaRPr lang="es-ES"/>
+        </a:p>
+      </dgm:t>
+    </dgm:pt>
+    <dgm:pt modelId="{7CA6AC14-87F7-4453-B7D5-4C8597103B0A}" type="pres">
+      <dgm:prSet presAssocID="{A0E79249-7065-4962-8735-A6C688F5445B}" presName="sibTrans" presStyleCnt="0"/>
+      <dgm:spPr/>
+    </dgm:pt>
+    <dgm:pt modelId="{3211E69D-5009-4C86-A96B-5E680B686B05}" type="pres">
+      <dgm:prSet presAssocID="{C963126C-24D9-4CD0-A634-48E45F49C5DE}" presName="composite" presStyleCnt="0"/>
+      <dgm:spPr/>
+    </dgm:pt>
+    <dgm:pt modelId="{8707CF70-2BA9-4284-A502-2BDF75A51BE6}" type="pres">
+      <dgm:prSet presAssocID="{C963126C-24D9-4CD0-A634-48E45F49C5DE}" presName="bentUpArrow1" presStyleLbl="alignImgPlace1" presStyleIdx="2" presStyleCnt="4"/>
+      <dgm:spPr/>
+    </dgm:pt>
+    <dgm:pt modelId="{C5B5DBD7-56DE-4B46-8EC5-F2AD05812196}" type="pres">
+      <dgm:prSet presAssocID="{C963126C-24D9-4CD0-A634-48E45F49C5DE}" presName="ParentText" presStyleLbl="node1" presStyleIdx="2" presStyleCnt="5">
+        <dgm:presLayoutVars>
+          <dgm:chMax val="1"/>
+          <dgm:chPref val="1"/>
+          <dgm:bulletEnabled val="1"/>
+        </dgm:presLayoutVars>
+      </dgm:prSet>
+      <dgm:spPr/>
+    </dgm:pt>
+    <dgm:pt modelId="{3A3633D6-FB12-461F-8612-F6270D66E58E}" type="pres">
+      <dgm:prSet presAssocID="{C963126C-24D9-4CD0-A634-48E45F49C5DE}" presName="ChildText" presStyleLbl="revTx" presStyleIdx="2" presStyleCnt="4">
+        <dgm:presLayoutVars>
+          <dgm:chMax val="0"/>
+          <dgm:chPref val="0"/>
+          <dgm:bulletEnabled val="1"/>
+        </dgm:presLayoutVars>
+      </dgm:prSet>
+      <dgm:spPr/>
+    </dgm:pt>
+    <dgm:pt modelId="{CD0F5BCD-4207-4906-AAEE-68959C75CBFC}" type="pres">
+      <dgm:prSet presAssocID="{9A17AD42-0B00-406A-8100-E3566A66F3D3}" presName="sibTrans" presStyleCnt="0"/>
+      <dgm:spPr/>
+    </dgm:pt>
+    <dgm:pt modelId="{E89AD89A-8A02-437F-9795-B2E53A2309CB}" type="pres">
+      <dgm:prSet presAssocID="{4A66FC27-468B-4BD2-8DCA-B5C193A98BBD}" presName="composite" presStyleCnt="0"/>
+      <dgm:spPr/>
+    </dgm:pt>
+    <dgm:pt modelId="{1E3EC8DE-3BF6-494A-8A88-200D6A6133F0}" type="pres">
+      <dgm:prSet presAssocID="{4A66FC27-468B-4BD2-8DCA-B5C193A98BBD}" presName="bentUpArrow1" presStyleLbl="alignImgPlace1" presStyleIdx="3" presStyleCnt="4"/>
+      <dgm:spPr/>
+    </dgm:pt>
+    <dgm:pt modelId="{6371D646-3A5B-42D7-9009-C5E5A3E1EC2B}" type="pres">
+      <dgm:prSet presAssocID="{4A66FC27-468B-4BD2-8DCA-B5C193A98BBD}" presName="ParentText" presStyleLbl="node1" presStyleIdx="3" presStyleCnt="5">
+        <dgm:presLayoutVars>
+          <dgm:chMax val="1"/>
+          <dgm:chPref val="1"/>
+          <dgm:bulletEnabled val="1"/>
+        </dgm:presLayoutVars>
+      </dgm:prSet>
+      <dgm:spPr/>
+    </dgm:pt>
+    <dgm:pt modelId="{31F43388-8B1B-4DA9-9795-06D00AC3E9C8}" type="pres">
+      <dgm:prSet presAssocID="{4A66FC27-468B-4BD2-8DCA-B5C193A98BBD}" presName="ChildText" presStyleLbl="revTx" presStyleIdx="3" presStyleCnt="4">
+        <dgm:presLayoutVars>
+          <dgm:chMax val="0"/>
+          <dgm:chPref val="0"/>
+          <dgm:bulletEnabled val="1"/>
+        </dgm:presLayoutVars>
+      </dgm:prSet>
+      <dgm:spPr/>
+    </dgm:pt>
+    <dgm:pt modelId="{741E191D-1866-457C-874A-AF72AECF7858}" type="pres">
+      <dgm:prSet presAssocID="{FB05280D-551C-4D87-A18D-4E28E3EFE770}" presName="sibTrans" presStyleCnt="0"/>
+      <dgm:spPr/>
+    </dgm:pt>
+    <dgm:pt modelId="{E4419706-DCEB-409E-94A4-035C092446DC}" type="pres">
+      <dgm:prSet presAssocID="{179228B3-389D-40F4-AB8B-BEAD5A6314A1}" presName="composite" presStyleCnt="0"/>
+      <dgm:spPr/>
+    </dgm:pt>
+    <dgm:pt modelId="{D16181EC-2972-492A-A361-E129EE7F9699}" type="pres">
+      <dgm:prSet presAssocID="{179228B3-389D-40F4-AB8B-BEAD5A6314A1}" presName="ParentText" presStyleLbl="node1" presStyleIdx="4" presStyleCnt="5">
+        <dgm:presLayoutVars>
+          <dgm:chMax val="1"/>
+          <dgm:chPref val="1"/>
+          <dgm:bulletEnabled val="1"/>
+        </dgm:presLayoutVars>
+      </dgm:prSet>
+      <dgm:spPr/>
+      <dgm:t>
+        <a:bodyPr/>
+        <a:lstStyle/>
+        <a:p>
+          <a:endParaRPr lang="es-ES"/>
+        </a:p>
+      </dgm:t>
+    </dgm:pt>
+  </dgm:ptLst>
+  <dgm:cxnLst>
+    <dgm:cxn modelId="{910CB811-7DEB-4DB5-A1B8-74C928CFDF94}" srcId="{10B536A7-6E30-404E-BA80-F79D95CADD30}" destId="{E90A7B7F-C043-4CF5-B459-871488D90643}" srcOrd="1" destOrd="0" parTransId="{BC9783CF-43D6-456A-980C-384662AC20DA}" sibTransId="{A0E79249-7065-4962-8735-A6C688F5445B}"/>
+    <dgm:cxn modelId="{1E05FB7E-EC0E-4FD6-B3DB-23627115BA87}" type="presOf" srcId="{C963126C-24D9-4CD0-A634-48E45F49C5DE}" destId="{C5B5DBD7-56DE-4B46-8EC5-F2AD05812196}" srcOrd="0" destOrd="0" presId="urn:microsoft.com/office/officeart/2005/8/layout/StepDownProcess"/>
+    <dgm:cxn modelId="{50F8FEDB-F51C-472C-BB84-613A4EE4017D}" srcId="{10B536A7-6E30-404E-BA80-F79D95CADD30}" destId="{EDC3B893-2DE6-465C-A086-FA09B20A320D}" srcOrd="0" destOrd="0" parTransId="{4AC02CC2-0FB0-42E7-8A95-ADDA50419CD2}" sibTransId="{410EC82D-F1E4-4144-8972-DA59DEC93A24}"/>
+    <dgm:cxn modelId="{F871793D-0736-4E3C-B0BD-E0F3CA31A06C}" type="presOf" srcId="{10B536A7-6E30-404E-BA80-F79D95CADD30}" destId="{8A781059-DDA9-497E-8613-5445EDB52CF3}" srcOrd="0" destOrd="0" presId="urn:microsoft.com/office/officeart/2005/8/layout/StepDownProcess"/>
+    <dgm:cxn modelId="{83D3C1C1-8B90-4D2E-ABCB-1E96F3D88BE7}" srcId="{10B536A7-6E30-404E-BA80-F79D95CADD30}" destId="{C963126C-24D9-4CD0-A634-48E45F49C5DE}" srcOrd="2" destOrd="0" parTransId="{9329C171-081B-426F-9254-AC652C4774F6}" sibTransId="{9A17AD42-0B00-406A-8100-E3566A66F3D3}"/>
+    <dgm:cxn modelId="{B2DCFDF6-8F2E-467F-863B-BA09B3B6EF73}" type="presOf" srcId="{4A66FC27-468B-4BD2-8DCA-B5C193A98BBD}" destId="{6371D646-3A5B-42D7-9009-C5E5A3E1EC2B}" srcOrd="0" destOrd="0" presId="urn:microsoft.com/office/officeart/2005/8/layout/StepDownProcess"/>
+    <dgm:cxn modelId="{F18315FA-3F58-4F50-9D76-91B450172A79}" type="presOf" srcId="{E90A7B7F-C043-4CF5-B459-871488D90643}" destId="{699E7647-938C-4444-9B23-7D8CA3770712}" srcOrd="0" destOrd="0" presId="urn:microsoft.com/office/officeart/2005/8/layout/StepDownProcess"/>
+    <dgm:cxn modelId="{0369377F-41F0-4CC5-82A6-6D5625703756}" srcId="{10B536A7-6E30-404E-BA80-F79D95CADD30}" destId="{179228B3-389D-40F4-AB8B-BEAD5A6314A1}" srcOrd="4" destOrd="0" parTransId="{0BBDD2C8-5DE2-4B88-8818-77B914584AC9}" sibTransId="{4E33100D-E9DD-4D50-825E-BF814EB5660B}"/>
+    <dgm:cxn modelId="{E677E61E-97EE-4D69-AE59-42F461A56A46}" type="presOf" srcId="{179228B3-389D-40F4-AB8B-BEAD5A6314A1}" destId="{D16181EC-2972-492A-A361-E129EE7F9699}" srcOrd="0" destOrd="0" presId="urn:microsoft.com/office/officeart/2005/8/layout/StepDownProcess"/>
+    <dgm:cxn modelId="{D981A90D-46C4-4271-B808-D70A709E6643}" type="presOf" srcId="{EDC3B893-2DE6-465C-A086-FA09B20A320D}" destId="{2BA88272-170E-4935-B77F-F5F1143295AA}" srcOrd="0" destOrd="0" presId="urn:microsoft.com/office/officeart/2005/8/layout/StepDownProcess"/>
+    <dgm:cxn modelId="{F5BF2D68-3C0D-4471-9087-AF89D79EC340}" srcId="{10B536A7-6E30-404E-BA80-F79D95CADD30}" destId="{4A66FC27-468B-4BD2-8DCA-B5C193A98BBD}" srcOrd="3" destOrd="0" parTransId="{3E8D3D35-8D87-40B0-AD1A-4AB625FB757E}" sibTransId="{FB05280D-551C-4D87-A18D-4E28E3EFE770}"/>
+    <dgm:cxn modelId="{54B9D7AC-CD47-4F51-BED3-BD1371A7B696}" type="presParOf" srcId="{8A781059-DDA9-497E-8613-5445EDB52CF3}" destId="{7A52D6B9-C7A3-49FF-AF71-92B04ECB2EB3}" srcOrd="0" destOrd="0" presId="urn:microsoft.com/office/officeart/2005/8/layout/StepDownProcess"/>
+    <dgm:cxn modelId="{988016CA-EAC2-4AC4-83D4-1DDFB46A7634}" type="presParOf" srcId="{7A52D6B9-C7A3-49FF-AF71-92B04ECB2EB3}" destId="{E6803CD7-0CDA-41E6-8A33-26BEDB2B5354}" srcOrd="0" destOrd="0" presId="urn:microsoft.com/office/officeart/2005/8/layout/StepDownProcess"/>
+    <dgm:cxn modelId="{3287D894-4481-469F-AE71-7F9E8F92679F}" type="presParOf" srcId="{7A52D6B9-C7A3-49FF-AF71-92B04ECB2EB3}" destId="{2BA88272-170E-4935-B77F-F5F1143295AA}" srcOrd="1" destOrd="0" presId="urn:microsoft.com/office/officeart/2005/8/layout/StepDownProcess"/>
+    <dgm:cxn modelId="{72644CF6-0AD5-4C67-AD9B-0C0663395E87}" type="presParOf" srcId="{7A52D6B9-C7A3-49FF-AF71-92B04ECB2EB3}" destId="{0B3B84AC-938F-457C-909B-F66ED71EB7B4}" srcOrd="2" destOrd="0" presId="urn:microsoft.com/office/officeart/2005/8/layout/StepDownProcess"/>
+    <dgm:cxn modelId="{71D2E110-1AC0-4E32-97A4-CB183D06024E}" type="presParOf" srcId="{8A781059-DDA9-497E-8613-5445EDB52CF3}" destId="{BCF17F61-58D8-4CE1-9140-9143B7492291}" srcOrd="1" destOrd="0" presId="urn:microsoft.com/office/officeart/2005/8/layout/StepDownProcess"/>
+    <dgm:cxn modelId="{F9D65408-4D2D-463F-ABAA-7D616ECB9740}" type="presParOf" srcId="{8A781059-DDA9-497E-8613-5445EDB52CF3}" destId="{162D8ACE-B9D9-41BC-B2A2-34A21D95A24C}" srcOrd="2" destOrd="0" presId="urn:microsoft.com/office/officeart/2005/8/layout/StepDownProcess"/>
+    <dgm:cxn modelId="{101313E1-9562-4218-B329-B074B99BFCCF}" type="presParOf" srcId="{162D8ACE-B9D9-41BC-B2A2-34A21D95A24C}" destId="{AAA495A4-53F0-4EAB-B19C-378C608EA8AD}" srcOrd="0" destOrd="0" presId="urn:microsoft.com/office/officeart/2005/8/layout/StepDownProcess"/>
+    <dgm:cxn modelId="{D39D69DE-76B5-4BB4-8C34-D684F9A687FD}" type="presParOf" srcId="{162D8ACE-B9D9-41BC-B2A2-34A21D95A24C}" destId="{699E7647-938C-4444-9B23-7D8CA3770712}" srcOrd="1" destOrd="0" presId="urn:microsoft.com/office/officeart/2005/8/layout/StepDownProcess"/>
+    <dgm:cxn modelId="{6EEFFF41-708E-4965-ACFC-CBC1B9AB82D9}" type="presParOf" srcId="{162D8ACE-B9D9-41BC-B2A2-34A21D95A24C}" destId="{632DA3B5-B0F2-494F-B9FC-1542F9C589D4}" srcOrd="2" destOrd="0" presId="urn:microsoft.com/office/officeart/2005/8/layout/StepDownProcess"/>
+    <dgm:cxn modelId="{96F792B9-AFF6-49EB-9BB8-F18BD86734E3}" type="presParOf" srcId="{8A781059-DDA9-497E-8613-5445EDB52CF3}" destId="{7CA6AC14-87F7-4453-B7D5-4C8597103B0A}" srcOrd="3" destOrd="0" presId="urn:microsoft.com/office/officeart/2005/8/layout/StepDownProcess"/>
+    <dgm:cxn modelId="{63B5755B-75DF-46A8-823E-603661E5DADF}" type="presParOf" srcId="{8A781059-DDA9-497E-8613-5445EDB52CF3}" destId="{3211E69D-5009-4C86-A96B-5E680B686B05}" srcOrd="4" destOrd="0" presId="urn:microsoft.com/office/officeart/2005/8/layout/StepDownProcess"/>
+    <dgm:cxn modelId="{587CC829-393D-40A1-B566-E082B869B489}" type="presParOf" srcId="{3211E69D-5009-4C86-A96B-5E680B686B05}" destId="{8707CF70-2BA9-4284-A502-2BDF75A51BE6}" srcOrd="0" destOrd="0" presId="urn:microsoft.com/office/officeart/2005/8/layout/StepDownProcess"/>
+    <dgm:cxn modelId="{13323A42-009B-45EA-B821-91A78E1ECBE3}" type="presParOf" srcId="{3211E69D-5009-4C86-A96B-5E680B686B05}" destId="{C5B5DBD7-56DE-4B46-8EC5-F2AD05812196}" srcOrd="1" destOrd="0" presId="urn:microsoft.com/office/officeart/2005/8/layout/StepDownProcess"/>
+    <dgm:cxn modelId="{109D957E-67B8-4BED-B2B5-79B2157D52D0}" type="presParOf" srcId="{3211E69D-5009-4C86-A96B-5E680B686B05}" destId="{3A3633D6-FB12-461F-8612-F6270D66E58E}" srcOrd="2" destOrd="0" presId="urn:microsoft.com/office/officeart/2005/8/layout/StepDownProcess"/>
+    <dgm:cxn modelId="{D4DD8576-EAE6-4FF4-ADDB-08118AC46814}" type="presParOf" srcId="{8A781059-DDA9-497E-8613-5445EDB52CF3}" destId="{CD0F5BCD-4207-4906-AAEE-68959C75CBFC}" srcOrd="5" destOrd="0" presId="urn:microsoft.com/office/officeart/2005/8/layout/StepDownProcess"/>
+    <dgm:cxn modelId="{21C1F603-26D3-430F-897A-80619BFD6E4B}" type="presParOf" srcId="{8A781059-DDA9-497E-8613-5445EDB52CF3}" destId="{E89AD89A-8A02-437F-9795-B2E53A2309CB}" srcOrd="6" destOrd="0" presId="urn:microsoft.com/office/officeart/2005/8/layout/StepDownProcess"/>
+    <dgm:cxn modelId="{47440320-967D-438D-9BB9-C41DB229633D}" type="presParOf" srcId="{E89AD89A-8A02-437F-9795-B2E53A2309CB}" destId="{1E3EC8DE-3BF6-494A-8A88-200D6A6133F0}" srcOrd="0" destOrd="0" presId="urn:microsoft.com/office/officeart/2005/8/layout/StepDownProcess"/>
+    <dgm:cxn modelId="{495A6FCA-C7A1-4A33-8326-053E8BF727D8}" type="presParOf" srcId="{E89AD89A-8A02-437F-9795-B2E53A2309CB}" destId="{6371D646-3A5B-42D7-9009-C5E5A3E1EC2B}" srcOrd="1" destOrd="0" presId="urn:microsoft.com/office/officeart/2005/8/layout/StepDownProcess"/>
+    <dgm:cxn modelId="{DCA9669D-2ED2-4034-B10B-2A5FF7F2BC26}" type="presParOf" srcId="{E89AD89A-8A02-437F-9795-B2E53A2309CB}" destId="{31F43388-8B1B-4DA9-9795-06D00AC3E9C8}" srcOrd="2" destOrd="0" presId="urn:microsoft.com/office/officeart/2005/8/layout/StepDownProcess"/>
+    <dgm:cxn modelId="{D4A093B5-7D09-45C8-AC13-8153203EC73E}" type="presParOf" srcId="{8A781059-DDA9-497E-8613-5445EDB52CF3}" destId="{741E191D-1866-457C-874A-AF72AECF7858}" srcOrd="7" destOrd="0" presId="urn:microsoft.com/office/officeart/2005/8/layout/StepDownProcess"/>
+    <dgm:cxn modelId="{9FF0FE2A-408E-4B3D-A9E5-1D64D9C8E3E6}" type="presParOf" srcId="{8A781059-DDA9-497E-8613-5445EDB52CF3}" destId="{E4419706-DCEB-409E-94A4-035C092446DC}" srcOrd="8" destOrd="0" presId="urn:microsoft.com/office/officeart/2005/8/layout/StepDownProcess"/>
+    <dgm:cxn modelId="{B2F5FFD9-E0E2-4C1B-AB31-BDBE9752997F}" type="presParOf" srcId="{E4419706-DCEB-409E-94A4-035C092446DC}" destId="{D16181EC-2972-492A-A361-E129EE7F9699}" srcOrd="0" destOrd="0" presId="urn:microsoft.com/office/officeart/2005/8/layout/StepDownProcess"/>
+  </dgm:cxnLst>
+  <dgm:bg/>
+  <dgm:whole/>
+  <dgm:extLst>
+    <a:ext uri="http://schemas.microsoft.com/office/drawing/2008/diagram">
+      <dsp:dataModelExt xmlns:dsp="http://schemas.microsoft.com/office/drawing/2008/diagram" relId="rId6" minVer="http://schemas.openxmlformats.org/drawingml/2006/diagram"/>
+    </a:ext>
+  </dgm:extLst>
+</dgm:dataModel>
+</file>
+
+<file path=ppt/diagrams/drawing1.xml><?xml version="1.0" encoding="utf-8"?>
+<dsp:drawing xmlns:dgm="http://schemas.openxmlformats.org/drawingml/2006/diagram" xmlns:dsp="http://schemas.microsoft.com/office/drawing/2008/diagram" xmlns:a="http://schemas.openxmlformats.org/drawingml/2006/main">
+  <dsp:spTree>
+    <dsp:nvGrpSpPr>
+      <dsp:cNvPr id="0" name=""/>
+      <dsp:cNvGrpSpPr/>
+    </dsp:nvGrpSpPr>
+    <dsp:grpSpPr/>
+    <dsp:sp modelId="{E6803CD7-0CDA-41E6-8A33-26BEDB2B5354}">
+      <dsp:nvSpPr>
+        <dsp:cNvPr id="0" name=""/>
+        <dsp:cNvSpPr/>
+      </dsp:nvSpPr>
+      <dsp:spPr>
+        <a:xfrm rot="5400000">
+          <a:off x="1279256" y="949999"/>
+          <a:ext cx="826770" cy="941248"/>
+        </a:xfrm>
+        <a:prstGeom prst="bentUpArrow">
+          <a:avLst>
+            <a:gd name="adj1" fmla="val 32840"/>
+            <a:gd name="adj2" fmla="val 25000"/>
+            <a:gd name="adj3" fmla="val 35780"/>
+          </a:avLst>
+        </a:prstGeom>
+        <a:solidFill>
+          <a:schemeClr val="accent5">
+            <a:tint val="40000"/>
+            <a:hueOff val="0"/>
+            <a:satOff val="0"/>
+            <a:lumOff val="0"/>
+            <a:alphaOff val="0"/>
+          </a:schemeClr>
+        </a:solidFill>
+        <a:ln w="12700" cap="flat" cmpd="sng" algn="ctr">
+          <a:solidFill>
+            <a:schemeClr val="accent5">
+              <a:shade val="80000"/>
+              <a:hueOff val="0"/>
+              <a:satOff val="0"/>
+              <a:lumOff val="0"/>
+              <a:alphaOff val="0"/>
+            </a:schemeClr>
+          </a:solidFill>
+          <a:prstDash val="solid"/>
+          <a:miter lim="800000"/>
+        </a:ln>
+        <a:effectLst/>
+      </dsp:spPr>
+      <dsp:style>
+        <a:lnRef idx="2">
+          <a:scrgbClr r="0" g="0" b="0"/>
+        </a:lnRef>
+        <a:fillRef idx="1">
+          <a:scrgbClr r="0" g="0" b="0"/>
+        </a:fillRef>
+        <a:effectRef idx="0">
+          <a:scrgbClr r="0" g="0" b="0"/>
+        </a:effectRef>
+        <a:fontRef idx="minor"/>
+      </dsp:style>
+    </dsp:sp>
+    <dsp:sp modelId="{2BA88272-170E-4935-B77F-F5F1143295AA}">
+      <dsp:nvSpPr>
+        <dsp:cNvPr id="0" name=""/>
+        <dsp:cNvSpPr/>
+      </dsp:nvSpPr>
+      <dsp:spPr>
+        <a:xfrm>
+          <a:off x="1060212" y="33507"/>
+          <a:ext cx="1391794" cy="974210"/>
+        </a:xfrm>
+        <a:prstGeom prst="roundRect">
+          <a:avLst>
+            <a:gd name="adj" fmla="val 16670"/>
+          </a:avLst>
+        </a:prstGeom>
+        <a:solidFill>
+          <a:schemeClr val="lt1">
+            <a:hueOff val="0"/>
+            <a:satOff val="0"/>
+            <a:lumOff val="0"/>
+            <a:alphaOff val="0"/>
+          </a:schemeClr>
+        </a:solidFill>
+        <a:ln w="12700" cap="flat" cmpd="sng" algn="ctr">
+          <a:solidFill>
+            <a:schemeClr val="accent5">
+              <a:shade val="80000"/>
+              <a:hueOff val="0"/>
+              <a:satOff val="0"/>
+              <a:lumOff val="0"/>
+              <a:alphaOff val="0"/>
+            </a:schemeClr>
+          </a:solidFill>
+          <a:prstDash val="solid"/>
+          <a:miter lim="800000"/>
+        </a:ln>
+        <a:effectLst/>
+      </dsp:spPr>
+      <dsp:style>
+        <a:lnRef idx="2">
+          <a:scrgbClr r="0" g="0" b="0"/>
+        </a:lnRef>
+        <a:fillRef idx="1">
+          <a:scrgbClr r="0" g="0" b="0"/>
+        </a:fillRef>
+        <a:effectRef idx="0">
+          <a:scrgbClr r="0" g="0" b="0"/>
+        </a:effectRef>
+        <a:fontRef idx="minor">
+          <a:schemeClr val="lt1"/>
+        </a:fontRef>
+      </dsp:style>
+      <dsp:txBody>
+        <a:bodyPr spcFirstLastPara="0" vert="horz" wrap="square" lIns="53340" tIns="53340" rIns="53340" bIns="53340" numCol="1" spcCol="1270" anchor="ctr" anchorCtr="0">
+          <a:noAutofit/>
+        </a:bodyPr>
+        <a:lstStyle/>
+        <a:p>
+          <a:pPr lvl="0" algn="ctr" defTabSz="622300">
+            <a:lnSpc>
+              <a:spcPct val="90000"/>
+            </a:lnSpc>
+            <a:spcBef>
+              <a:spcPct val="0"/>
+            </a:spcBef>
+            <a:spcAft>
+              <a:spcPct val="35000"/>
+            </a:spcAft>
+          </a:pPr>
+          <a:r>
+            <a:rPr lang="es-ES" sz="1400" kern="1200" dirty="0" smtClean="0"/>
+            <a:t>Requisitos software</a:t>
+          </a:r>
+          <a:endParaRPr lang="es-ES" sz="1400" kern="1200" dirty="0"/>
+        </a:p>
+      </dsp:txBody>
+      <dsp:txXfrm>
+        <a:off x="1107778" y="81073"/>
+        <a:ext cx="1296662" cy="879078"/>
+      </dsp:txXfrm>
+    </dsp:sp>
+    <dsp:sp modelId="{0B3B84AC-938F-457C-909B-F66ED71EB7B4}">
+      <dsp:nvSpPr>
+        <dsp:cNvPr id="0" name=""/>
+        <dsp:cNvSpPr/>
+      </dsp:nvSpPr>
+      <dsp:spPr>
+        <a:xfrm>
+          <a:off x="2452006" y="126421"/>
+          <a:ext cx="1012258" cy="787400"/>
+        </a:xfrm>
+        <a:prstGeom prst="rect">
+          <a:avLst/>
+        </a:prstGeom>
+        <a:noFill/>
+        <a:ln>
+          <a:noFill/>
+        </a:ln>
+        <a:effectLst/>
+      </dsp:spPr>
+      <dsp:style>
+        <a:lnRef idx="0">
+          <a:scrgbClr r="0" g="0" b="0"/>
+        </a:lnRef>
+        <a:fillRef idx="0">
+          <a:scrgbClr r="0" g="0" b="0"/>
+        </a:fillRef>
+        <a:effectRef idx="0">
+          <a:scrgbClr r="0" g="0" b="0"/>
+        </a:effectRef>
+        <a:fontRef idx="minor"/>
+      </dsp:style>
+    </dsp:sp>
+    <dsp:sp modelId="{AAA495A4-53F0-4EAB-B19C-378C608EA8AD}">
+      <dsp:nvSpPr>
+        <dsp:cNvPr id="0" name=""/>
+        <dsp:cNvSpPr/>
+      </dsp:nvSpPr>
+      <dsp:spPr>
+        <a:xfrm rot="5400000">
+          <a:off x="2433201" y="2044359"/>
+          <a:ext cx="826770" cy="941248"/>
+        </a:xfrm>
+        <a:prstGeom prst="bentUpArrow">
+          <a:avLst>
+            <a:gd name="adj1" fmla="val 32840"/>
+            <a:gd name="adj2" fmla="val 25000"/>
+            <a:gd name="adj3" fmla="val 35780"/>
+          </a:avLst>
+        </a:prstGeom>
+        <a:solidFill>
+          <a:schemeClr val="accent5">
+            <a:tint val="40000"/>
+            <a:hueOff val="0"/>
+            <a:satOff val="0"/>
+            <a:lumOff val="0"/>
+            <a:alphaOff val="0"/>
+          </a:schemeClr>
+        </a:solidFill>
+        <a:ln w="12700" cap="flat" cmpd="sng" algn="ctr">
+          <a:solidFill>
+            <a:schemeClr val="accent5">
+              <a:shade val="80000"/>
+              <a:hueOff val="0"/>
+              <a:satOff val="0"/>
+              <a:lumOff val="0"/>
+              <a:alphaOff val="0"/>
+            </a:schemeClr>
+          </a:solidFill>
+          <a:prstDash val="solid"/>
+          <a:miter lim="800000"/>
+        </a:ln>
+        <a:effectLst/>
+      </dsp:spPr>
+      <dsp:style>
+        <a:lnRef idx="2">
+          <a:scrgbClr r="0" g="0" b="0"/>
+        </a:lnRef>
+        <a:fillRef idx="1">
+          <a:scrgbClr r="0" g="0" b="0"/>
+        </a:fillRef>
+        <a:effectRef idx="0">
+          <a:scrgbClr r="0" g="0" b="0"/>
+        </a:effectRef>
+        <a:fontRef idx="minor"/>
+      </dsp:style>
+    </dsp:sp>
+    <dsp:sp modelId="{699E7647-938C-4444-9B23-7D8CA3770712}">
+      <dsp:nvSpPr>
+        <dsp:cNvPr id="0" name=""/>
+        <dsp:cNvSpPr/>
+      </dsp:nvSpPr>
+      <dsp:spPr>
+        <a:xfrm>
+          <a:off x="2214157" y="1127868"/>
+          <a:ext cx="1391794" cy="974210"/>
+        </a:xfrm>
+        <a:prstGeom prst="roundRect">
+          <a:avLst>
+            <a:gd name="adj" fmla="val 16670"/>
+          </a:avLst>
+        </a:prstGeom>
+        <a:solidFill>
+          <a:schemeClr val="lt1">
+            <a:hueOff val="0"/>
+            <a:satOff val="0"/>
+            <a:lumOff val="0"/>
+            <a:alphaOff val="0"/>
+          </a:schemeClr>
+        </a:solidFill>
+        <a:ln w="12700" cap="flat" cmpd="sng" algn="ctr">
+          <a:solidFill>
+            <a:schemeClr val="accent5">
+              <a:shade val="80000"/>
+              <a:hueOff val="0"/>
+              <a:satOff val="0"/>
+              <a:lumOff val="0"/>
+              <a:alphaOff val="0"/>
+            </a:schemeClr>
+          </a:solidFill>
+          <a:prstDash val="solid"/>
+          <a:miter lim="800000"/>
+        </a:ln>
+        <a:effectLst/>
+      </dsp:spPr>
+      <dsp:style>
+        <a:lnRef idx="2">
+          <a:scrgbClr r="0" g="0" b="0"/>
+        </a:lnRef>
+        <a:fillRef idx="1">
+          <a:scrgbClr r="0" g="0" b="0"/>
+        </a:fillRef>
+        <a:effectRef idx="0">
+          <a:scrgbClr r="0" g="0" b="0"/>
+        </a:effectRef>
+        <a:fontRef idx="minor">
+          <a:schemeClr val="lt1"/>
+        </a:fontRef>
+      </dsp:style>
+      <dsp:txBody>
+        <a:bodyPr spcFirstLastPara="0" vert="horz" wrap="square" lIns="53340" tIns="53340" rIns="53340" bIns="53340" numCol="1" spcCol="1270" anchor="ctr" anchorCtr="0">
+          <a:noAutofit/>
+        </a:bodyPr>
+        <a:lstStyle/>
+        <a:p>
+          <a:pPr lvl="0" algn="ctr" defTabSz="622300">
+            <a:lnSpc>
+              <a:spcPct val="90000"/>
+            </a:lnSpc>
+            <a:spcBef>
+              <a:spcPct val="0"/>
+            </a:spcBef>
+            <a:spcAft>
+              <a:spcPct val="35000"/>
+            </a:spcAft>
+          </a:pPr>
+          <a:r>
+            <a:rPr lang="es-ES" sz="1400" kern="1200" dirty="0" smtClean="0"/>
+            <a:t>Diseño</a:t>
+          </a:r>
+          <a:endParaRPr lang="es-ES" sz="1400" kern="1200" dirty="0"/>
+        </a:p>
+      </dsp:txBody>
+      <dsp:txXfrm>
+        <a:off x="2261723" y="1175434"/>
+        <a:ext cx="1296662" cy="879078"/>
+      </dsp:txXfrm>
+    </dsp:sp>
+    <dsp:sp modelId="{632DA3B5-B0F2-494F-B9FC-1542F9C589D4}">
+      <dsp:nvSpPr>
+        <dsp:cNvPr id="0" name=""/>
+        <dsp:cNvSpPr/>
+      </dsp:nvSpPr>
+      <dsp:spPr>
+        <a:xfrm>
+          <a:off x="3605951" y="1220781"/>
+          <a:ext cx="1012258" cy="787400"/>
+        </a:xfrm>
+        <a:prstGeom prst="rect">
+          <a:avLst/>
+        </a:prstGeom>
+        <a:noFill/>
+        <a:ln>
+          <a:noFill/>
+        </a:ln>
+        <a:effectLst/>
+      </dsp:spPr>
+      <dsp:style>
+        <a:lnRef idx="0">
+          <a:scrgbClr r="0" g="0" b="0"/>
+        </a:lnRef>
+        <a:fillRef idx="0">
+          <a:scrgbClr r="0" g="0" b="0"/>
+        </a:fillRef>
+        <a:effectRef idx="0">
+          <a:scrgbClr r="0" g="0" b="0"/>
+        </a:effectRef>
+        <a:fontRef idx="minor"/>
+      </dsp:style>
+    </dsp:sp>
+    <dsp:sp modelId="{8707CF70-2BA9-4284-A502-2BDF75A51BE6}">
+      <dsp:nvSpPr>
+        <dsp:cNvPr id="0" name=""/>
+        <dsp:cNvSpPr/>
+      </dsp:nvSpPr>
+      <dsp:spPr>
+        <a:xfrm rot="5400000">
+          <a:off x="3587146" y="3138719"/>
+          <a:ext cx="826770" cy="941248"/>
+        </a:xfrm>
+        <a:prstGeom prst="bentUpArrow">
+          <a:avLst>
+            <a:gd name="adj1" fmla="val 32840"/>
+            <a:gd name="adj2" fmla="val 25000"/>
+            <a:gd name="adj3" fmla="val 35780"/>
+          </a:avLst>
+        </a:prstGeom>
+        <a:solidFill>
+          <a:schemeClr val="accent5">
+            <a:tint val="40000"/>
+            <a:hueOff val="0"/>
+            <a:satOff val="0"/>
+            <a:lumOff val="0"/>
+            <a:alphaOff val="0"/>
+          </a:schemeClr>
+        </a:solidFill>
+        <a:ln w="12700" cap="flat" cmpd="sng" algn="ctr">
+          <a:solidFill>
+            <a:schemeClr val="accent5">
+              <a:shade val="80000"/>
+              <a:hueOff val="0"/>
+              <a:satOff val="0"/>
+              <a:lumOff val="0"/>
+              <a:alphaOff val="0"/>
+            </a:schemeClr>
+          </a:solidFill>
+          <a:prstDash val="solid"/>
+          <a:miter lim="800000"/>
+        </a:ln>
+        <a:effectLst/>
+      </dsp:spPr>
+      <dsp:style>
+        <a:lnRef idx="2">
+          <a:scrgbClr r="0" g="0" b="0"/>
+        </a:lnRef>
+        <a:fillRef idx="1">
+          <a:scrgbClr r="0" g="0" b="0"/>
+        </a:fillRef>
+        <a:effectRef idx="0">
+          <a:scrgbClr r="0" g="0" b="0"/>
+        </a:effectRef>
+        <a:fontRef idx="minor"/>
+      </dsp:style>
+    </dsp:sp>
+    <dsp:sp modelId="{C5B5DBD7-56DE-4B46-8EC5-F2AD05812196}">
+      <dsp:nvSpPr>
+        <dsp:cNvPr id="0" name=""/>
+        <dsp:cNvSpPr/>
+      </dsp:nvSpPr>
+      <dsp:spPr>
+        <a:xfrm>
+          <a:off x="3368102" y="2222228"/>
+          <a:ext cx="1391794" cy="974210"/>
+        </a:xfrm>
+        <a:prstGeom prst="roundRect">
+          <a:avLst>
+            <a:gd name="adj" fmla="val 16670"/>
+          </a:avLst>
+        </a:prstGeom>
+        <a:solidFill>
+          <a:schemeClr val="lt1">
+            <a:hueOff val="0"/>
+            <a:satOff val="0"/>
+            <a:lumOff val="0"/>
+            <a:alphaOff val="0"/>
+          </a:schemeClr>
+        </a:solidFill>
+        <a:ln w="12700" cap="flat" cmpd="sng" algn="ctr">
+          <a:solidFill>
+            <a:schemeClr val="accent5">
+              <a:shade val="80000"/>
+              <a:hueOff val="0"/>
+              <a:satOff val="0"/>
+              <a:lumOff val="0"/>
+              <a:alphaOff val="0"/>
+            </a:schemeClr>
+          </a:solidFill>
+          <a:prstDash val="solid"/>
+          <a:miter lim="800000"/>
+        </a:ln>
+        <a:effectLst/>
+      </dsp:spPr>
+      <dsp:style>
+        <a:lnRef idx="2">
+          <a:scrgbClr r="0" g="0" b="0"/>
+        </a:lnRef>
+        <a:fillRef idx="1">
+          <a:scrgbClr r="0" g="0" b="0"/>
+        </a:fillRef>
+        <a:effectRef idx="0">
+          <a:scrgbClr r="0" g="0" b="0"/>
+        </a:effectRef>
+        <a:fontRef idx="minor">
+          <a:schemeClr val="lt1"/>
+        </a:fontRef>
+      </dsp:style>
+      <dsp:txBody>
+        <a:bodyPr spcFirstLastPara="0" vert="horz" wrap="square" lIns="53340" tIns="53340" rIns="53340" bIns="53340" numCol="1" spcCol="1270" anchor="ctr" anchorCtr="0">
+          <a:noAutofit/>
+        </a:bodyPr>
+        <a:lstStyle/>
+        <a:p>
+          <a:pPr lvl="0" algn="ctr" defTabSz="622300">
+            <a:lnSpc>
+              <a:spcPct val="90000"/>
+            </a:lnSpc>
+            <a:spcBef>
+              <a:spcPct val="0"/>
+            </a:spcBef>
+            <a:spcAft>
+              <a:spcPct val="35000"/>
+            </a:spcAft>
+          </a:pPr>
+          <a:r>
+            <a:rPr lang="es-ES" sz="1400" kern="1200" dirty="0" smtClean="0"/>
+            <a:t>Implementación</a:t>
+          </a:r>
+          <a:endParaRPr lang="es-ES" sz="1400" kern="1200" dirty="0"/>
+        </a:p>
+      </dsp:txBody>
+      <dsp:txXfrm>
+        <a:off x="3415668" y="2269794"/>
+        <a:ext cx="1296662" cy="879078"/>
+      </dsp:txXfrm>
+    </dsp:sp>
+    <dsp:sp modelId="{3A3633D6-FB12-461F-8612-F6270D66E58E}">
+      <dsp:nvSpPr>
+        <dsp:cNvPr id="0" name=""/>
+        <dsp:cNvSpPr/>
+      </dsp:nvSpPr>
+      <dsp:spPr>
+        <a:xfrm>
+          <a:off x="4759897" y="2315141"/>
+          <a:ext cx="1012258" cy="787400"/>
+        </a:xfrm>
+        <a:prstGeom prst="rect">
+          <a:avLst/>
+        </a:prstGeom>
+        <a:noFill/>
+        <a:ln>
+          <a:noFill/>
+        </a:ln>
+        <a:effectLst/>
+      </dsp:spPr>
+      <dsp:style>
+        <a:lnRef idx="0">
+          <a:scrgbClr r="0" g="0" b="0"/>
+        </a:lnRef>
+        <a:fillRef idx="0">
+          <a:scrgbClr r="0" g="0" b="0"/>
+        </a:fillRef>
+        <a:effectRef idx="0">
+          <a:scrgbClr r="0" g="0" b="0"/>
+        </a:effectRef>
+        <a:fontRef idx="minor"/>
+      </dsp:style>
+    </dsp:sp>
+    <dsp:sp modelId="{1E3EC8DE-3BF6-494A-8A88-200D6A6133F0}">
+      <dsp:nvSpPr>
+        <dsp:cNvPr id="0" name=""/>
+        <dsp:cNvSpPr/>
+      </dsp:nvSpPr>
+      <dsp:spPr>
+        <a:xfrm rot="5400000">
+          <a:off x="4741091" y="4233079"/>
+          <a:ext cx="826770" cy="941248"/>
+        </a:xfrm>
+        <a:prstGeom prst="bentUpArrow">
+          <a:avLst>
+            <a:gd name="adj1" fmla="val 32840"/>
+            <a:gd name="adj2" fmla="val 25000"/>
+            <a:gd name="adj3" fmla="val 35780"/>
+          </a:avLst>
+        </a:prstGeom>
+        <a:solidFill>
+          <a:schemeClr val="accent5">
+            <a:tint val="40000"/>
+            <a:hueOff val="0"/>
+            <a:satOff val="0"/>
+            <a:lumOff val="0"/>
+            <a:alphaOff val="0"/>
+          </a:schemeClr>
+        </a:solidFill>
+        <a:ln w="12700" cap="flat" cmpd="sng" algn="ctr">
+          <a:solidFill>
+            <a:schemeClr val="accent5">
+              <a:shade val="80000"/>
+              <a:hueOff val="0"/>
+              <a:satOff val="0"/>
+              <a:lumOff val="0"/>
+              <a:alphaOff val="0"/>
+            </a:schemeClr>
+          </a:solidFill>
+          <a:prstDash val="solid"/>
+          <a:miter lim="800000"/>
+        </a:ln>
+        <a:effectLst/>
+      </dsp:spPr>
+      <dsp:style>
+        <a:lnRef idx="2">
+          <a:scrgbClr r="0" g="0" b="0"/>
+        </a:lnRef>
+        <a:fillRef idx="1">
+          <a:scrgbClr r="0" g="0" b="0"/>
+        </a:fillRef>
+        <a:effectRef idx="0">
+          <a:scrgbClr r="0" g="0" b="0"/>
+        </a:effectRef>
+        <a:fontRef idx="minor"/>
+      </dsp:style>
+    </dsp:sp>
+    <dsp:sp modelId="{6371D646-3A5B-42D7-9009-C5E5A3E1EC2B}">
+      <dsp:nvSpPr>
+        <dsp:cNvPr id="0" name=""/>
+        <dsp:cNvSpPr/>
+      </dsp:nvSpPr>
+      <dsp:spPr>
+        <a:xfrm>
+          <a:off x="4522048" y="3316588"/>
+          <a:ext cx="1391794" cy="974210"/>
+        </a:xfrm>
+        <a:prstGeom prst="roundRect">
+          <a:avLst>
+            <a:gd name="adj" fmla="val 16670"/>
+          </a:avLst>
+        </a:prstGeom>
+        <a:solidFill>
+          <a:schemeClr val="lt1">
+            <a:hueOff val="0"/>
+            <a:satOff val="0"/>
+            <a:lumOff val="0"/>
+            <a:alphaOff val="0"/>
+          </a:schemeClr>
+        </a:solidFill>
+        <a:ln w="12700" cap="flat" cmpd="sng" algn="ctr">
+          <a:solidFill>
+            <a:schemeClr val="accent5">
+              <a:shade val="80000"/>
+              <a:hueOff val="0"/>
+              <a:satOff val="0"/>
+              <a:lumOff val="0"/>
+              <a:alphaOff val="0"/>
+            </a:schemeClr>
+          </a:solidFill>
+          <a:prstDash val="solid"/>
+          <a:miter lim="800000"/>
+        </a:ln>
+        <a:effectLst/>
+      </dsp:spPr>
+      <dsp:style>
+        <a:lnRef idx="2">
+          <a:scrgbClr r="0" g="0" b="0"/>
+        </a:lnRef>
+        <a:fillRef idx="1">
+          <a:scrgbClr r="0" g="0" b="0"/>
+        </a:fillRef>
+        <a:effectRef idx="0">
+          <a:scrgbClr r="0" g="0" b="0"/>
+        </a:effectRef>
+        <a:fontRef idx="minor">
+          <a:schemeClr val="lt1"/>
+        </a:fontRef>
+      </dsp:style>
+      <dsp:txBody>
+        <a:bodyPr spcFirstLastPara="0" vert="horz" wrap="square" lIns="53340" tIns="53340" rIns="53340" bIns="53340" numCol="1" spcCol="1270" anchor="ctr" anchorCtr="0">
+          <a:noAutofit/>
+        </a:bodyPr>
+        <a:lstStyle/>
+        <a:p>
+          <a:pPr lvl="0" algn="ctr" defTabSz="622300">
+            <a:lnSpc>
+              <a:spcPct val="90000"/>
+            </a:lnSpc>
+            <a:spcBef>
+              <a:spcPct val="0"/>
+            </a:spcBef>
+            <a:spcAft>
+              <a:spcPct val="35000"/>
+            </a:spcAft>
+          </a:pPr>
+          <a:r>
+            <a:rPr lang="es-ES" sz="1400" kern="1200" dirty="0" smtClean="0"/>
+            <a:t>Verificación</a:t>
+          </a:r>
+          <a:endParaRPr lang="es-ES" sz="1400" kern="1200" dirty="0"/>
+        </a:p>
+      </dsp:txBody>
+      <dsp:txXfrm>
+        <a:off x="4569614" y="3364154"/>
+        <a:ext cx="1296662" cy="879078"/>
+      </dsp:txXfrm>
+    </dsp:sp>
+    <dsp:sp modelId="{31F43388-8B1B-4DA9-9795-06D00AC3E9C8}">
+      <dsp:nvSpPr>
+        <dsp:cNvPr id="0" name=""/>
+        <dsp:cNvSpPr/>
+      </dsp:nvSpPr>
+      <dsp:spPr>
+        <a:xfrm>
+          <a:off x="5913842" y="3409501"/>
+          <a:ext cx="1012258" cy="787400"/>
+        </a:xfrm>
+        <a:prstGeom prst="rect">
+          <a:avLst/>
+        </a:prstGeom>
+        <a:noFill/>
+        <a:ln>
+          <a:noFill/>
+        </a:ln>
+        <a:effectLst/>
+      </dsp:spPr>
+      <dsp:style>
+        <a:lnRef idx="0">
+          <a:scrgbClr r="0" g="0" b="0"/>
+        </a:lnRef>
+        <a:fillRef idx="0">
+          <a:scrgbClr r="0" g="0" b="0"/>
+        </a:fillRef>
+        <a:effectRef idx="0">
+          <a:scrgbClr r="0" g="0" b="0"/>
+        </a:effectRef>
+        <a:fontRef idx="minor"/>
+      </dsp:style>
+    </dsp:sp>
+    <dsp:sp modelId="{D16181EC-2972-492A-A361-E129EE7F9699}">
+      <dsp:nvSpPr>
+        <dsp:cNvPr id="0" name=""/>
+        <dsp:cNvSpPr/>
+      </dsp:nvSpPr>
+      <dsp:spPr>
+        <a:xfrm>
+          <a:off x="5675993" y="4410948"/>
+          <a:ext cx="1391794" cy="974210"/>
+        </a:xfrm>
+        <a:prstGeom prst="roundRect">
+          <a:avLst>
+            <a:gd name="adj" fmla="val 16670"/>
+          </a:avLst>
+        </a:prstGeom>
+        <a:solidFill>
+          <a:schemeClr val="lt1">
+            <a:hueOff val="0"/>
+            <a:satOff val="0"/>
+            <a:lumOff val="0"/>
+            <a:alphaOff val="0"/>
+          </a:schemeClr>
+        </a:solidFill>
+        <a:ln w="12700" cap="flat" cmpd="sng" algn="ctr">
+          <a:solidFill>
+            <a:schemeClr val="accent5">
+              <a:shade val="80000"/>
+              <a:hueOff val="0"/>
+              <a:satOff val="0"/>
+              <a:lumOff val="0"/>
+              <a:alphaOff val="0"/>
+            </a:schemeClr>
+          </a:solidFill>
+          <a:prstDash val="solid"/>
+          <a:miter lim="800000"/>
+        </a:ln>
+        <a:effectLst/>
+      </dsp:spPr>
+      <dsp:style>
+        <a:lnRef idx="2">
+          <a:scrgbClr r="0" g="0" b="0"/>
+        </a:lnRef>
+        <a:fillRef idx="1">
+          <a:scrgbClr r="0" g="0" b="0"/>
+        </a:fillRef>
+        <a:effectRef idx="0">
+          <a:scrgbClr r="0" g="0" b="0"/>
+        </a:effectRef>
+        <a:fontRef idx="minor">
+          <a:schemeClr val="lt1"/>
+        </a:fontRef>
+      </dsp:style>
+      <dsp:txBody>
+        <a:bodyPr spcFirstLastPara="0" vert="horz" wrap="square" lIns="53340" tIns="53340" rIns="53340" bIns="53340" numCol="1" spcCol="1270" anchor="ctr" anchorCtr="0">
+          <a:noAutofit/>
+        </a:bodyPr>
+        <a:lstStyle/>
+        <a:p>
+          <a:pPr lvl="0" algn="ctr" defTabSz="622300">
+            <a:lnSpc>
+              <a:spcPct val="90000"/>
+            </a:lnSpc>
+            <a:spcBef>
+              <a:spcPct val="0"/>
+            </a:spcBef>
+            <a:spcAft>
+              <a:spcPct val="35000"/>
+            </a:spcAft>
+          </a:pPr>
+          <a:r>
+            <a:rPr lang="es-ES" sz="1400" kern="1200" dirty="0" smtClean="0"/>
+            <a:t>Instalación y mantenimiento</a:t>
+          </a:r>
+          <a:endParaRPr lang="es-ES" sz="1400" kern="1200" dirty="0"/>
+        </a:p>
+      </dsp:txBody>
+      <dsp:txXfrm>
+        <a:off x="5723559" y="4458514"/>
+        <a:ext cx="1296662" cy="879078"/>
+      </dsp:txXfrm>
+    </dsp:sp>
+  </dsp:spTree>
+</dsp:drawing>
+</file>
+
+<file path=ppt/diagrams/layout1.xml><?xml version="1.0" encoding="utf-8"?>
+<dgm:layoutDef xmlns:dgm="http://schemas.openxmlformats.org/drawingml/2006/diagram" xmlns:a="http://schemas.openxmlformats.org/drawingml/2006/main" uniqueId="urn:microsoft.com/office/officeart/2005/8/layout/StepDownProcess">
+  <dgm:title val=""/>
+  <dgm:desc val=""/>
+  <dgm:catLst>
+    <dgm:cat type="process" pri="1600"/>
+  </dgm:catLst>
+  <dgm:sampData>
+    <dgm:dataModel>
+      <dgm:ptLst>
+        <dgm:pt modelId="0" type="doc"/>
+        <dgm:pt modelId="10">
+          <dgm:prSet phldr="1"/>
+        </dgm:pt>
+        <dgm:pt modelId="11">
+          <dgm:prSet phldr="1"/>
+        </dgm:pt>
+        <dgm:pt modelId="20">
+          <dgm:prSet phldr="1"/>
+        </dgm:pt>
+        <dgm:pt modelId="21">
+          <dgm:prSet phldr="1"/>
+        </dgm:pt>
+        <dgm:pt modelId="30">
+          <dgm:prSet phldr="1"/>
+        </dgm:pt>
+        <dgm:pt modelId="31">
+          <dgm:prSet phldr="1"/>
+        </dgm:pt>
+      </dgm:ptLst>
+      <dgm:cxnLst>
+        <dgm:cxn modelId="60" srcId="0" destId="10" srcOrd="0" destOrd="0"/>
+        <dgm:cxn modelId="12" srcId="10" destId="11" srcOrd="0" destOrd="0"/>
+        <dgm:cxn modelId="70" srcId="0" destId="20" srcOrd="1" destOrd="0"/>
+        <dgm:cxn modelId="22" srcId="20" destId="21" srcOrd="0" destOrd="0"/>
+        <dgm:cxn modelId="80" srcId="0" destId="30" srcOrd="2" destOrd="0"/>
+        <dgm:cxn modelId="32" srcId="30" destId="31" srcOrd="0" destOrd="0"/>
+      </dgm:cxnLst>
+      <dgm:bg/>
+      <dgm:whole/>
+    </dgm:dataModel>
+  </dgm:sampData>
+  <dgm:styleData>
+    <dgm:dataModel>
+      <dgm:ptLst>
+        <dgm:pt modelId="0" type="doc"/>
+        <dgm:pt modelId="10">
+          <dgm:prSet phldr="1"/>
+        </dgm:pt>
+        <dgm:pt modelId="20">
+          <dgm:prSet phldr="1"/>
+        </dgm:pt>
+      </dgm:ptLst>
+      <dgm:cxnLst>
+        <dgm:cxn modelId="60" srcId="0" destId="10" srcOrd="0" destOrd="0"/>
+        <dgm:cxn modelId="70" srcId="0" destId="20" srcOrd="1" destOrd="0"/>
+      </dgm:cxnLst>
+      <dgm:bg/>
+      <dgm:whole/>
+    </dgm:dataModel>
+  </dgm:styleData>
+  <dgm:clrData>
+    <dgm:dataModel>
+      <dgm:ptLst>
+        <dgm:pt modelId="0" type="doc"/>
+        <dgm:pt modelId="10">
+          <dgm:prSet phldr="1"/>
+        </dgm:pt>
+        <dgm:pt modelId="20">
+          <dgm:prSet phldr="1"/>
+        </dgm:pt>
+        <dgm:pt modelId="30">
+          <dgm:prSet phldr="1"/>
+        </dgm:pt>
+        <dgm:pt modelId="40">
+          <dgm:prSet phldr="1"/>
+        </dgm:pt>
+      </dgm:ptLst>
+      <dgm:cxnLst>
+        <dgm:cxn modelId="60" srcId="0" destId="10" srcOrd="0" destOrd="0"/>
+        <dgm:cxn modelId="70" srcId="0" destId="20" srcOrd="1" destOrd="0"/>
+        <dgm:cxn modelId="80" srcId="0" destId="30" srcOrd="2" destOrd="0"/>
+        <dgm:cxn modelId="90" srcId="0" destId="40" srcOrd="3" destOrd="0"/>
+      </dgm:cxnLst>
+      <dgm:bg/>
+      <dgm:whole/>
+    </dgm:dataModel>
+  </dgm:clrData>
+  <dgm:layoutNode name="rootnode">
+    <dgm:varLst>
+      <dgm:chMax/>
+      <dgm:chPref/>
+      <dgm:dir/>
+      <dgm:animLvl val="lvl"/>
+    </dgm:varLst>
+    <dgm:choose name="Name0">
+      <dgm:if name="Name1" func="var" arg="dir" op="equ" val="norm">
+        <dgm:alg type="snake">
+          <dgm:param type="grDir" val="tL"/>
+          <dgm:param type="flowDir" val="row"/>
+          <dgm:param type="off" val="off"/>
+          <dgm:param type="bkpt" val="fixed"/>
+          <dgm:param type="bkPtFixedVal" val="1"/>
+        </dgm:alg>
+      </dgm:if>
+      <dgm:else name="Name2">
+        <dgm:alg type="snake">
+          <dgm:param type="grDir" val="tR"/>
+          <dgm:param type="flowDir" val="row"/>
+          <dgm:param type="off" val="off"/>
+          <dgm:param type="bkpt" val="fixed"/>
+          <dgm:param type="bkPtFixedVal" val="1"/>
+        </dgm:alg>
+      </dgm:else>
+    </dgm:choose>
+    <dgm:shape xmlns:r="http://schemas.openxmlformats.org/officeDocument/2006/relationships" r:blip="">
+      <dgm:adjLst/>
+    </dgm:shape>
+    <dgm:choose name="Name3">
+      <dgm:if name="Name4" func="var" arg="dir" op="equ" val="norm">
+        <dgm:constrLst>
+          <dgm:constr type="alignOff" forName="rootnode" val="0.48"/>
+          <dgm:constr type="primFontSz" for="des" forName="ParentText" val="65"/>
+          <dgm:constr type="primFontSz" for="des" forName="ChildText" refType="primFontSz" refFor="des" refForName="ParentText" op="lte"/>
+          <dgm:constr type="w" for="ch" forName="composite" refType="w"/>
+          <dgm:constr type="h" for="ch" forName="composite" refType="h"/>
+          <dgm:constr type="sp" refType="h" refFor="ch" refForName="composite" op="equ" fact="-0.38"/>
+        </dgm:constrLst>
+      </dgm:if>
+      <dgm:else name="Name5">
+        <dgm:constrLst>
+          <dgm:constr type="alignOff" forName="rootnode" val="0.48"/>
+          <dgm:constr type="primFontSz" for="des" forName="ParentText" val="65"/>
+          <dgm:constr type="primFontSz" for="des" forName="ChildText" refType="primFontSz" refFor="des" refForName="ParentText" op="lte"/>
+          <dgm:constr type="w" for="ch" forName="composite" refType="w"/>
+          <dgm:constr type="h" for="ch" forName="composite" refType="h"/>
+          <dgm:constr type="sp" refType="h" refFor="ch" refForName="composite" op="equ" fact="-0.38"/>
+        </dgm:constrLst>
+      </dgm:else>
+    </dgm:choose>
+    <dgm:forEach name="nodesForEach" axis="ch" ptType="node">
+      <dgm:layoutNode name="composite">
+        <dgm:alg type="composite">
+          <dgm:param type="ar" val="1.2439"/>
+        </dgm:alg>
+        <dgm:shape xmlns:r="http://schemas.openxmlformats.org/officeDocument/2006/relationships" r:blip="">
+          <dgm:adjLst/>
+        </dgm:shape>
+        <dgm:choose name="Name6">
+          <dgm:if name="Name7" func="var" arg="dir" op="equ" val="norm">
+            <dgm:constrLst>
+              <dgm:constr type="l" for="ch" forName="bentUpArrow1" refType="w" fact="0.07"/>
+              <dgm:constr type="t" for="ch" forName="bentUpArrow1" refType="h" fact="0.524"/>
+              <dgm:constr type="w" for="ch" forName="bentUpArrow1" refType="w" fact="0.3844"/>
+              <dgm:constr type="h" for="ch" forName="bentUpArrow1" refType="h" fact="0.42"/>
+              <dgm:constr type="l" for="ch" forName="ParentText" refType="w" fact="0"/>
+              <dgm:constr type="t" for="ch" forName="ParentText" refType="h" fact="0"/>
+              <dgm:constr type="w" for="ch" forName="ParentText" refType="w" fact="0.5684"/>
+              <dgm:constr type="h" for="ch" forName="ParentText" refType="h" fact="0.4949"/>
+              <dgm:constr type="l" for="ch" forName="ChildText" refType="w" refFor="ch" refForName="ParentText"/>
+              <dgm:constr type="t" for="ch" forName="ChildText" refType="h" fact="0.05"/>
+              <dgm:constr type="w" for="ch" forName="ChildText" refType="w" fact="0.4134"/>
+              <dgm:constr type="h" for="ch" forName="ChildText" refType="h" fact="0.4"/>
+              <dgm:constr type="l" for="ch" forName="FinalChildText" refType="w" refFor="ch" refForName="ParentText"/>
+              <dgm:constr type="t" for="ch" forName="FinalChildText" refType="h" fact="0.05"/>
+              <dgm:constr type="w" for="ch" forName="FinalChildText" refType="w" fact="0.4134"/>
+              <dgm:constr type="h" for="ch" forName="FinalChildText" refType="h" fact="0.4"/>
+            </dgm:constrLst>
+          </dgm:if>
+          <dgm:else name="Name8">
+            <dgm:constrLst>
+              <dgm:constr type="r" for="ch" forName="bentUpArrow1" refType="w" fact="0.97"/>
+              <dgm:constr type="t" for="ch" forName="bentUpArrow1" refType="h" fact="0.524"/>
+              <dgm:constr type="w" for="ch" forName="bentUpArrow1" refType="w" fact="0.3844"/>
+              <dgm:constr type="h" for="ch" forName="bentUpArrow1" refType="h" fact="0.42"/>
+              <dgm:constr type="l" for="ch" forName="ParentText" refType="w" fact="0.4316"/>
+              <dgm:constr type="t" for="ch" forName="ParentText" refType="h" fact="0"/>
+              <dgm:constr type="w" for="ch" forName="ParentText" refType="w" fact="0.5684"/>
+              <dgm:constr type="h" for="ch" forName="ParentText" refType="h" fact="0.4949"/>
+              <dgm:constr type="l" for="ch" forName="ChildText" refType="w" fact="0"/>
+              <dgm:constr type="t" for="ch" forName="ChildText" refType="h" fact="0.05"/>
+              <dgm:constr type="w" for="ch" forName="ChildText" refType="w" fact="0.4134"/>
+              <dgm:constr type="h" for="ch" forName="ChildText" refType="h" fact="0.4"/>
+              <dgm:constr type="l" for="ch" forName="FinalChildText" refType="w" fact="0"/>
+              <dgm:constr type="t" for="ch" forName="FinalChildText" refType="h" fact="0.05"/>
+              <dgm:constr type="w" for="ch" forName="FinalChildText" refType="w" fact="0.4134"/>
+              <dgm:constr type="h" for="ch" forName="FinalChildText" refType="h" fact="0.4"/>
+            </dgm:constrLst>
+          </dgm:else>
+        </dgm:choose>
+        <dgm:choose name="Name9">
+          <dgm:if name="Name10" axis="followSib" ptType="node" func="cnt" op="gte" val="1">
+            <dgm:layoutNode name="bentUpArrow1" styleLbl="alignImgPlace1">
+              <dgm:alg type="sp"/>
+              <dgm:choose name="Name11">
+                <dgm:if name="Name12" func="var" arg="dir" op="equ" val="norm">
+                  <dgm:shape xmlns:r="http://schemas.openxmlformats.org/officeDocument/2006/relationships" rot="90" type="bentUpArrow" r:blip="">
+                    <dgm:adjLst>
+                      <dgm:adj idx="1" val="0.3284"/>
+                      <dgm:adj idx="2" val="0.25"/>
+                      <dgm:adj idx="3" val="0.3578"/>
+                    </dgm:adjLst>
+                  </dgm:shape>
+                </dgm:if>
+                <dgm:else name="Name13">
+                  <dgm:shape xmlns:r="http://schemas.openxmlformats.org/officeDocument/2006/relationships" rot="180" type="bentArrow" r:blip="">
+                    <dgm:adjLst>
+                      <dgm:adj idx="1" val="0.3284"/>
+                      <dgm:adj idx="2" val="0.25"/>
+                      <dgm:adj idx="3" val="0.3578"/>
+                      <dgm:adj idx="4" val="0"/>
+                    </dgm:adjLst>
+                  </dgm:shape>
+                </dgm:else>
+              </dgm:choose>
+              <dgm:presOf/>
+            </dgm:layoutNode>
+          </dgm:if>
+          <dgm:else name="Name14"/>
+        </dgm:choose>
+        <dgm:layoutNode name="ParentText" styleLbl="node1">
+          <dgm:varLst>
+            <dgm:chMax val="1"/>
+            <dgm:chPref val="1"/>
+            <dgm:bulletEnabled val="1"/>
+          </dgm:varLst>
+          <dgm:alg type="tx"/>
+          <dgm:shape xmlns:r="http://schemas.openxmlformats.org/officeDocument/2006/relationships" type="roundRect" r:blip="">
+            <dgm:adjLst>
+              <dgm:adj idx="1" val="0.1667"/>
+            </dgm:adjLst>
+          </dgm:shape>
+          <dgm:presOf axis="self" ptType="node"/>
+          <dgm:constrLst>
+            <dgm:constr type="lMarg" refType="primFontSz" fact="0.3"/>
+            <dgm:constr type="rMarg" refType="primFontSz" fact="0.3"/>
+            <dgm:constr type="tMarg" refType="primFontSz" fact="0.3"/>
+            <dgm:constr type="bMarg" refType="primFontSz" fact="0.3"/>
+          </dgm:constrLst>
+          <dgm:ruleLst>
+            <dgm:rule type="primFontSz" val="5" fact="NaN" max="NaN"/>
+          </dgm:ruleLst>
+        </dgm:layoutNode>
+        <dgm:choose name="Name15">
+          <dgm:if name="Name16" axis="followSib" ptType="node" func="cnt" op="equ" val="0">
+            <dgm:choose name="Name17">
+              <dgm:if name="Name18" axis="ch" ptType="node" func="cnt" op="gte" val="1">
+                <dgm:layoutNode name="FinalChildText" styleLbl="revTx">
+                  <dgm:varLst>
+                    <dgm:chMax val="0"/>
+                    <dgm:chPref val="0"/>
+                    <dgm:bulletEnabled val="1"/>
+                  </dgm:varLst>
+                  <dgm:alg type="tx">
+                    <dgm:param type="stBulletLvl" val="1"/>
+                    <dgm:param type="txAnchorVertCh" val="mid"/>
+                    <dgm:param type="parTxLTRAlign" val="l"/>
+                  </dgm:alg>
+                  <dgm:shape xmlns:r="http://schemas.openxmlformats.org/officeDocument/2006/relationships" type="rect" r:blip="">
+                    <dgm:adjLst/>
+                  </dgm:shape>
+                  <dgm:presOf axis="des" ptType="node"/>
+                  <dgm:constrLst>
+                    <dgm:constr type="lMarg" refType="primFontSz" fact="0.3"/>
+                    <dgm:constr type="rMarg" refType="primFontSz" fact="0.3"/>
+                    <dgm:constr type="tMarg" refType="primFontSz" fact="0.3"/>
+                    <dgm:constr type="bMarg" refType="primFontSz" fact="0.3"/>
+                  </dgm:constrLst>
+                  <dgm:ruleLst>
+                    <dgm:rule type="primFontSz" val="5" fact="NaN" max="NaN"/>
+                  </dgm:ruleLst>
+                </dgm:layoutNode>
+              </dgm:if>
+              <dgm:else name="Name19"/>
+            </dgm:choose>
+          </dgm:if>
+          <dgm:else name="Name20">
+            <dgm:layoutNode name="ChildText" styleLbl="revTx">
+              <dgm:varLst>
+                <dgm:chMax val="0"/>
+                <dgm:chPref val="0"/>
+                <dgm:bulletEnabled val="1"/>
+              </dgm:varLst>
+              <dgm:alg type="tx">
+                <dgm:param type="stBulletLvl" val="1"/>
+                <dgm:param type="txAnchorVertCh" val="mid"/>
+                <dgm:param type="parTxLTRAlign" val="l"/>
+              </dgm:alg>
+              <dgm:shape xmlns:r="http://schemas.openxmlformats.org/officeDocument/2006/relationships" type="rect" r:blip="">
+                <dgm:adjLst/>
+              </dgm:shape>
+              <dgm:presOf axis="des" ptType="node"/>
+              <dgm:constrLst>
+                <dgm:constr type="lMarg" refType="primFontSz" fact="0.3"/>
+                <dgm:constr type="rMarg" refType="primFontSz" fact="0.3"/>
+                <dgm:constr type="tMarg" refType="primFontSz" fact="0.3"/>
+                <dgm:constr type="bMarg" refType="primFontSz" fact="0.3"/>
+              </dgm:constrLst>
+              <dgm:ruleLst>
+                <dgm:rule type="primFontSz" val="5" fact="NaN" max="NaN"/>
+              </dgm:ruleLst>
+            </dgm:layoutNode>
+          </dgm:else>
+        </dgm:choose>
+      </dgm:layoutNode>
+      <dgm:forEach name="sibTransForEach" axis="followSib" ptType="sibTrans" cnt="1">
+        <dgm:layoutNode name="sibTrans">
+          <dgm:alg type="sp"/>
+          <dgm:shape xmlns:r="http://schemas.openxmlformats.org/officeDocument/2006/relationships" r:blip="">
+            <dgm:adjLst/>
+          </dgm:shape>
+        </dgm:layoutNode>
+      </dgm:forEach>
+    </dgm:forEach>
+  </dgm:layoutNode>
+</dgm:layoutDef>
+</file>
+
+<file path=ppt/diagrams/quickStyle1.xml><?xml version="1.0" encoding="utf-8"?>
+<dgm:styleDef xmlns:dgm="http://schemas.openxmlformats.org/drawingml/2006/diagram" xmlns:a="http://schemas.openxmlformats.org/drawingml/2006/main" uniqueId="urn:microsoft.com/office/officeart/2005/8/quickstyle/simple1">
+  <dgm:title val=""/>
+  <dgm:desc val=""/>
+  <dgm:catLst>
+    <dgm:cat type="simple" pri="10100"/>
+  </dgm:catLst>
+  <dgm:scene3d>
+    <a:camera prst="orthographicFront"/>
+    <a:lightRig rig="threePt" dir="t"/>
+  </dgm:scene3d>
+  <dgm:styleLbl name="node0">
+    <dgm:scene3d>
+      <a:camera prst="orthographicFront"/>
+      <a:lightRig rig="threePt" dir="t"/>
+    </dgm:scene3d>
+    <dgm:sp3d/>
+    <dgm:txPr/>
+    <dgm:style>
+      <a:lnRef idx="2">
+        <a:scrgbClr r="0" g="0" b="0"/>
+      </a:lnRef>
+      <a:fillRef idx="1">
+        <a:scrgbClr r="0" g="0" b="0"/>
+      </a:fillRef>
+      <a:effectRef idx="0">
+        <a:scrgbClr r="0" g="0" b="0"/>
+      </a:effectRef>
+      <a:fontRef idx="minor">
+        <a:schemeClr val="lt1"/>
+      </a:fontRef>
+    </dgm:style>
+  </dgm:styleLbl>
+  <dgm:styleLbl name="lnNode1">
+    <dgm:scene3d>
+      <a:camera prst="orthographicFront"/>
+      <a:lightRig rig="threePt" dir="t"/>
+    </dgm:scene3d>
+    <dgm:sp3d/>
+    <dgm:txPr/>
+    <dgm:style>
+      <a:lnRef idx="2">
+        <a:scrgbClr r="0" g="0" b="0"/>
+      </a:lnRef>
+      <a:fillRef idx="1">
+        <a:scrgbClr r="0" g="0" b="0"/>
+      </a:fillRef>
+      <a:effectRef idx="0">
+        <a:scrgbClr r="0" g="0" b="0"/>
+      </a:effectRef>
+      <a:fontRef idx="minor">
+        <a:schemeClr val="lt1"/>
+      </a:fontRef>
+    </dgm:style>
+  </dgm:styleLbl>
+  <dgm:styleLbl name="vennNode1">
+    <dgm:scene3d>
+      <a:camera prst="orthographicFront"/>
+      <a:lightRig rig="threePt" dir="t"/>
+    </dgm:scene3d>
+    <dgm:sp3d/>
+    <dgm:txPr/>
+    <dgm:style>
+      <a:lnRef idx="2">
+        <a:scrgbClr r="0" g="0" b="0"/>
+      </a:lnRef>
+      <a:fillRef idx="1">
+        <a:scrgbClr r="0" g="0" b="0"/>
+      </a:fillRef>
+      <a:effectRef idx="0">
+        <a:scrgbClr r="0" g="0" b="0"/>
+      </a:effectRef>
+      <a:fontRef idx="minor">
+        <a:schemeClr val="tx1"/>
+      </a:fontRef>
+    </dgm:style>
+  </dgm:styleLbl>
+  <dgm:styleLbl name="alignNode1">
+    <dgm:scene3d>
+      <a:camera prst="orthographicFront"/>
+      <a:lightRig rig="threePt" dir="t"/>
+    </dgm:scene3d>
+    <dgm:sp3d/>
+    <dgm:txPr/>
+    <dgm:style>
+      <a:lnRef idx="2">
+        <a:scrgbClr r="0" g="0" b="0"/>
+      </a:lnRef>
+      <a:fillRef idx="1">
+        <a:scrgbClr r="0" g="0" b="0"/>
+      </a:fillRef>
+      <a:effectRef idx="0">
+        <a:scrgbClr r="0" g="0" b="0"/>
+      </a:effectRef>
+      <a:fontRef idx="minor">
+        <a:schemeClr val="lt1"/>
+      </a:fontRef>
+    </dgm:style>
+  </dgm:styleLbl>
+  <dgm:styleLbl name="node1">
+    <dgm:scene3d>
+      <a:camera prst="orthographicFront"/>
+      <a:lightRig rig="threePt" dir="t"/>
+    </dgm:scene3d>
+    <dgm:sp3d/>
+    <dgm:txPr/>
+    <dgm:style>
+      <a:lnRef idx="2">
+        <a:scrgbClr r="0" g="0" b="0"/>
+      </a:lnRef>
+      <a:fillRef idx="1">
+        <a:scrgbClr r="0" g="0" b="0"/>
+      </a:fillRef>
+      <a:effectRef idx="0">
+        <a:scrgbClr r="0" g="0" b="0"/>
+      </a:effectRef>
+      <a:fontRef idx="minor">
+        <a:schemeClr val="lt1"/>
+      </a:fontRef>
+    </dgm:style>
+  </dgm:styleLbl>
+  <dgm:styleLbl name="node2">
+    <dgm:scene3d>
+      <a:camera prst="orthographicFront"/>
+      <a:lightRig rig="threePt" dir="t"/>
+    </dgm:scene3d>
+    <dgm:sp3d/>
+    <dgm:txPr/>
+    <dgm:style>
+      <a:lnRef idx="2">
+        <a:scrgbClr r="0" g="0" b="0"/>
+      </a:lnRef>
+      <a:fillRef idx="1">
+        <a:scrgbClr r="0" g="0" b="0"/>
+      </a:fillRef>
+      <a:effectRef idx="0">
+        <a:scrgbClr r="0" g="0" b="0"/>
+      </a:effectRef>
+      <a:fontRef idx="minor">
+        <a:schemeClr val="lt1"/>
+      </a:fontRef>
+    </dgm:style>
+  </dgm:styleLbl>
+  <dgm:styleLbl name="node3">
+    <dgm:scene3d>
+      <a:camera prst="orthographicFront"/>
+      <a:lightRig rig="threePt" dir="t"/>
+    </dgm:scene3d>
+    <dgm:sp3d/>
+    <dgm:txPr/>
+    <dgm:style>
+      <a:lnRef idx="2">
+        <a:scrgbClr r="0" g="0" b="0"/>
+      </a:lnRef>
+      <a:fillRef idx="1">
+        <a:scrgbClr r="0" g="0" b="0"/>
+      </a:fillRef>
+      <a:effectRef idx="0">
+        <a:scrgbClr r="0" g="0" b="0"/>
+      </a:effectRef>
+      <a:fontRef idx="minor">
+        <a:schemeClr val="lt1"/>
+      </a:fontRef>
+    </dgm:style>
+  </dgm:styleLbl>
+  <dgm:styleLbl name="node4">
+    <dgm:scene3d>
+      <a:camera prst="orthographicFront"/>
+      <a:lightRig rig="threePt" dir="t"/>
+    </dgm:scene3d>
+    <dgm:sp3d/>
+    <dgm:txPr/>
+    <dgm:style>
+      <a:lnRef idx="2">
+        <a:scrgbClr r="0" g="0" b="0"/>
+      </a:lnRef>
+      <a:fillRef idx="1">
+        <a:scrgbClr r="0" g="0" b="0"/>
+      </a:fillRef>
+      <a:effectRef idx="0">
+        <a:scrgbClr r="0" g="0" b="0"/>
+      </a:effectRef>
+      <a:fontRef idx="minor">
+        <a:schemeClr val="lt1"/>
+      </a:fontRef>
+    </dgm:style>
+  </dgm:styleLbl>
+  <dgm:styleLbl name="fgImgPlace1">
+    <dgm:scene3d>
+      <a:camera prst="orthographicFront"/>
+      <a:lightRig rig="threePt" dir="t"/>
+    </dgm:scene3d>
+    <dgm:sp3d/>
+    <dgm:txPr/>
+    <dgm:style>
+      <a:lnRef idx="2">
+        <a:scrgbClr r="0" g="0" b="0"/>
+      </a:lnRef>
+      <a:fillRef idx="1">
+        <a:scrgbClr r="0" g="0" b="0"/>
+      </a:fillRef>
+      <a:effectRef idx="0">
+        <a:scrgbClr r="0" g="0" b="0"/>
+      </a:effectRef>
+      <a:fontRef idx="minor"/>
+    </dgm:style>
+  </dgm:styleLbl>
+  <dgm:styleLbl name="alignImgPlace1">
+    <dgm:scene3d>
+      <a:camera prst="orthographicFront"/>
+      <a:lightRig rig="threePt" dir="t"/>
+    </dgm:scene3d>
+    <dgm:sp3d/>
+    <dgm:txPr/>
+    <dgm:style>
+      <a:lnRef idx="2">
+        <a:scrgbClr r="0" g="0" b="0"/>
+      </a:lnRef>
+      <a:fillRef idx="1">
+        <a:scrgbClr r="0" g="0" b="0"/>
+      </a:fillRef>
+      <a:effectRef idx="0">
+        <a:scrgbClr r="0" g="0" b="0"/>
+      </a:effectRef>
+      <a:fontRef idx="minor"/>
+    </dgm:style>
+  </dgm:styleLbl>
+  <dgm:styleLbl name="bgImgPlace1">
+    <dgm:scene3d>
+      <a:camera prst="orthographicFront"/>
+      <a:lightRig rig="threePt" dir="t"/>
+    </dgm:scene3d>
+    <dgm:sp3d/>
+    <dgm:txPr/>
+    <dgm:style>
+      <a:lnRef idx="2">
+        <a:scrgbClr r="0" g="0" b="0"/>
+      </a:lnRef>
+      <a:fillRef idx="1">
+        <a:scrgbClr r="0" g="0" b="0"/>
+      </a:fillRef>
+      <a:effectRef idx="0">
+        <a:scrgbClr r="0" g="0" b="0"/>
+      </a:effectRef>
+      <a:fontRef idx="minor"/>
+    </dgm:style>
+  </dgm:styleLbl>
+  <dgm:styleLbl name="sibTrans2D1">
+    <dgm:scene3d>
+      <a:camera prst="orthographicFront"/>
+      <a:lightRig rig="threePt" dir="t"/>
+    </dgm:scene3d>
+    <dgm:sp3d/>
+    <dgm:txPr/>
+    <dgm:style>
+      <a:lnRef idx="0">
+        <a:scrgbClr r="0" g="0" b="0"/>
+      </a:lnRef>
+      <a:fillRef idx="1">
+        <a:scrgbClr r="0" g="0" b="0"/>
+      </a:fillRef>
+      <a:effectRef idx="0">
+        <a:scrgbClr r="0" g="0" b="0"/>
+      </a:effectRef>
+      <a:fontRef idx="minor">
+        <a:schemeClr val="lt1"/>
+      </a:fontRef>
+    </dgm:style>
+  </dgm:styleLbl>
+  <dgm:styleLbl name="fgSibTrans2D1">
+    <dgm:scene3d>
+      <a:camera prst="orthographicFront"/>
+      <a:lightRig rig="threePt" dir="t"/>
+    </dgm:scene3d>
+    <dgm:sp3d/>
+    <dgm:txPr/>
+    <dgm:style>
+      <a:lnRef idx="0">
+        <a:scrgbClr r="0" g="0" b="0"/>
+      </a:lnRef>
+      <a:fillRef idx="1">
+        <a:scrgbClr r="0" g="0" b="0"/>
+      </a:fillRef>
+      <a:effectRef idx="0">
+        <a:scrgbClr r="0" g="0" b="0"/>
+      </a:effectRef>
+      <a:fontRef idx="minor">
+        <a:schemeClr val="lt1"/>
+      </a:fontRef>
+    </dgm:style>
+  </dgm:styleLbl>
+  <dgm:styleLbl name="bgSibTrans2D1">
+    <dgm:scene3d>
+      <a:camera prst="orthographicFront"/>
+      <a:lightRig rig="threePt" dir="t"/>
+    </dgm:scene3d>
+    <dgm:sp3d/>
+    <dgm:txPr/>
+    <dgm:style>
+      <a:lnRef idx="0">
+        <a:scrgbClr r="0" g="0" b="0"/>
+      </a:lnRef>
+      <a:fillRef idx="1">
+        <a:scrgbClr r="0" g="0" b="0"/>
+      </a:fillRef>
+      <a:effectRef idx="0">
+        <a:scrgbClr r="0" g="0" b="0"/>
+      </a:effectRef>
+      <a:fontRef idx="minor">
+        <a:schemeClr val="lt1"/>
+      </a:fontRef>
+    </dgm:style>
+  </dgm:styleLbl>
+  <dgm:styleLbl name="sibTrans1D1">
+    <dgm:scene3d>
+      <a:camera prst="orthographicFront"/>
+      <a:lightRig rig="threePt" dir="t"/>
+    </dgm:scene3d>
+    <dgm:sp3d/>
+    <dgm:txPr/>
+    <dgm:style>
+      <a:lnRef idx="1">
+        <a:scrgbClr r="0" g="0" b="0"/>
+      </a:lnRef>
+      <a:fillRef idx="0">
+        <a:scrgbClr r="0" g="0" b="0"/>
+      </a:fillRef>
+      <a:effectRef idx="0">
+        <a:scrgbClr r="0" g="0" b="0"/>
+      </a:effectRef>
+      <a:fontRef idx="minor"/>
+    </dgm:style>
+  </dgm:styleLbl>
+  <dgm:styleLbl name="callout">
+    <dgm:scene3d>
+      <a:camera prst="orthographicFront"/>
+      <a:lightRig rig="threePt" dir="t"/>
+    </dgm:scene3d>
+    <dgm:sp3d/>
+    <dgm:txPr/>
+    <dgm:style>
+      <a:lnRef idx="2">
+        <a:scrgbClr r="0" g="0" b="0"/>
+      </a:lnRef>
+      <a:fillRef idx="1">
+        <a:scrgbClr r="0" g="0" b="0"/>
+      </a:fillRef>
+      <a:effectRef idx="0">
+        <a:scrgbClr r="0" g="0" b="0"/>
+      </a:effectRef>
+      <a:fontRef idx="minor"/>
+    </dgm:style>
+  </dgm:styleLbl>
+  <dgm:styleLbl name="asst0">
+    <dgm:scene3d>
+      <a:camera prst="orthographicFront"/>
+      <a:lightRig rig="threePt" dir="t"/>
+    </dgm:scene3d>
+    <dgm:sp3d/>
+    <dgm:txPr/>
+    <dgm:style>
+      <a:lnRef idx="2">
+        <a:scrgbClr r="0" g="0" b="0"/>
+      </a:lnRef>
+      <a:fillRef idx="1">
+        <a:scrgbClr r="0" g="0" b="0"/>
+      </a:fillRef>
+      <a:effectRef idx="0">
+        <a:scrgbClr r="0" g="0" b="0"/>
+      </a:effectRef>
+      <a:fontRef idx="minor">
+        <a:schemeClr val="lt1"/>
+      </a:fontRef>
+    </dgm:style>
+  </dgm:styleLbl>
+  <dgm:styleLbl name="asst1">
+    <dgm:scene3d>
+      <a:camera prst="orthographicFront"/>
+      <a:lightRig rig="threePt" dir="t"/>
+    </dgm:scene3d>
+    <dgm:sp3d/>
+    <dgm:txPr/>
+    <dgm:style>
+      <a:lnRef idx="2">
+        <a:scrgbClr r="0" g="0" b="0"/>
+      </a:lnRef>
+      <a:fillRef idx="1">
+        <a:scrgbClr r="0" g="0" b="0"/>
+      </a:fillRef>
+      <a:effectRef idx="0">
+        <a:scrgbClr r="0" g="0" b="0"/>
+      </a:effectRef>
+      <a:fontRef idx="minor">
+        <a:schemeClr val="lt1"/>
+      </a:fontRef>
+    </dgm:style>
+  </dgm:styleLbl>
+  <dgm:styleLbl name="asst2">
+    <dgm:scene3d>
+      <a:camera prst="orthographicFront"/>
+      <a:lightRig rig="threePt" dir="t"/>
+    </dgm:scene3d>
+    <dgm:sp3d/>
+    <dgm:txPr/>
+    <dgm:style>
+      <a:lnRef idx="2">
+        <a:scrgbClr r="0" g="0" b="0"/>
+      </a:lnRef>
+      <a:fillRef idx="1">
+        <a:scrgbClr r="0" g="0" b="0"/>
+      </a:fillRef>
+      <a:effectRef idx="0">
+        <a:scrgbClr r="0" g="0" b="0"/>
+      </a:effectRef>
+      <a:fontRef idx="minor">
+        <a:schemeClr val="lt1"/>
+      </a:fontRef>
+    </dgm:style>
+  </dgm:styleLbl>
+  <dgm:styleLbl name="asst3">
+    <dgm:scene3d>
+      <a:camera prst="orthographicFront"/>
+      <a:lightRig rig="threePt" dir="t"/>
+    </dgm:scene3d>
+    <dgm:sp3d/>
+    <dgm:txPr/>
+    <dgm:style>
+      <a:lnRef idx="2">
+        <a:scrgbClr r="0" g="0" b="0"/>
+      </a:lnRef>
+      <a:fillRef idx="1">
+        <a:scrgbClr r="0" g="0" b="0"/>
+      </a:fillRef>
+      <a:effectRef idx="0">
+        <a:scrgbClr r="0" g="0" b="0"/>
+      </a:effectRef>
+      <a:fontRef idx="minor">
+        <a:schemeClr val="lt1"/>
+      </a:fontRef>
+    </dgm:style>
+  </dgm:styleLbl>
+  <dgm:styleLbl name="asst4">
+    <dgm:scene3d>
+      <a:camera prst="orthographicFront"/>
+      <a:lightRig rig="threePt" dir="t"/>
+    </dgm:scene3d>
+    <dgm:sp3d/>
+    <dgm:txPr/>
+    <dgm:style>
+      <a:lnRef idx="2">
+        <a:scrgbClr r="0" g="0" b="0"/>
+      </a:lnRef>
+      <a:fillRef idx="1">
+        <a:scrgbClr r="0" g="0" b="0"/>
+      </a:fillRef>
+      <a:effectRef idx="0">
+        <a:scrgbClr r="0" g="0" b="0"/>
+      </a:effectRef>
+      <a:fontRef idx="minor">
+        <a:schemeClr val="lt1"/>
+      </a:fontRef>
+    </dgm:style>
+  </dgm:styleLbl>
+  <dgm:styleLbl name="parChTrans2D1">
+    <dgm:scene3d>
+      <a:camera prst="orthographicFront"/>
+      <a:lightRig rig="threePt" dir="t"/>
+    </dgm:scene3d>
+    <dgm:sp3d/>
+    <dgm:txPr/>
+    <dgm:style>
+      <a:lnRef idx="2">
+        <a:scrgbClr r="0" g="0" b="0"/>
+      </a:lnRef>
+      <a:fillRef idx="1">
+        <a:scrgbClr r="0" g="0" b="0"/>
+      </a:fillRef>
+      <a:effectRef idx="0">
+        <a:scrgbClr r="0" g="0" b="0"/>
+      </a:effectRef>
+      <a:fontRef idx="minor">
+        <a:schemeClr val="lt1"/>
+      </a:fontRef>
+    </dgm:style>
+  </dgm:styleLbl>
+  <dgm:styleLbl name="parChTrans2D2">
+    <dgm:scene3d>
+      <a:camera prst="orthographicFront"/>
+      <a:lightRig rig="threePt" dir="t"/>
+    </dgm:scene3d>
+    <dgm:sp3d/>
+    <dgm:txPr/>
+    <dgm:style>
+      <a:lnRef idx="2">
+        <a:scrgbClr r="0" g="0" b="0"/>
+      </a:lnRef>
+      <a:fillRef idx="1">
+        <a:scrgbClr r="0" g="0" b="0"/>
+      </a:fillRef>
+      <a:effectRef idx="0">
+        <a:scrgbClr r="0" g="0" b="0"/>
+      </a:effectRef>
+      <a:fontRef idx="minor">
+        <a:schemeClr val="lt1"/>
+      </a:fontRef>
+    </dgm:style>
+  </dgm:styleLbl>
+  <dgm:styleLbl name="parChTrans2D3">
+    <dgm:scene3d>
+      <a:camera prst="orthographicFront"/>
+      <a:lightRig rig="threePt" dir="t"/>
+    </dgm:scene3d>
+    <dgm:sp3d/>
+    <dgm:txPr/>
+    <dgm:style>
+      <a:lnRef idx="2">
+        <a:scrgbClr r="0" g="0" b="0"/>
+      </a:lnRef>
+      <a:fillRef idx="1">
+        <a:scrgbClr r="0" g="0" b="0"/>
+      </a:fillRef>
+      <a:effectRef idx="0">
+        <a:scrgbClr r="0" g="0" b="0"/>
+      </a:effectRef>
+      <a:fontRef idx="minor">
+        <a:schemeClr val="lt1"/>
+      </a:fontRef>
+    </dgm:style>
+  </dgm:styleLbl>
+  <dgm:styleLbl name="parChTrans2D4">
+    <dgm:scene3d>
+      <a:camera prst="orthographicFront"/>
+      <a:lightRig rig="threePt" dir="t"/>
+    </dgm:scene3d>
+    <dgm:sp3d/>
+    <dgm:txPr/>
+    <dgm:style>
+      <a:lnRef idx="2">
+        <a:scrgbClr r="0" g="0" b="0"/>
+      </a:lnRef>
+      <a:fillRef idx="1">
+        <a:scrgbClr r="0" g="0" b="0"/>
+      </a:fillRef>
+      <a:effectRef idx="0">
+        <a:scrgbClr r="0" g="0" b="0"/>
+      </a:effectRef>
+      <a:fontRef idx="minor">
+        <a:schemeClr val="lt1"/>
+      </a:fontRef>
+    </dgm:style>
+  </dgm:styleLbl>
+  <dgm:styleLbl name="parChTrans1D1">
+    <dgm:scene3d>
+      <a:camera prst="orthographicFront"/>
+      <a:lightRig rig="threePt" dir="t"/>
+    </dgm:scene3d>
+    <dgm:sp3d/>
+    <dgm:txPr/>
+    <dgm:style>
+      <a:lnRef idx="2">
+        <a:scrgbClr r="0" g="0" b="0"/>
+      </a:lnRef>
+      <a:fillRef idx="0">
+        <a:scrgbClr r="0" g="0" b="0"/>
+      </a:fillRef>
+      <a:effectRef idx="0">
+        <a:scrgbClr r="0" g="0" b="0"/>
+      </a:effectRef>
+      <a:fontRef idx="minor"/>
+    </dgm:style>
+  </dgm:styleLbl>
+  <dgm:styleLbl name="parChTrans1D2">
+    <dgm:scene3d>
+      <a:camera prst="orthographicFront"/>
+      <a:lightRig rig="threePt" dir="t"/>
+    </dgm:scene3d>
+    <dgm:sp3d/>
+    <dgm:txPr/>
+    <dgm:style>
+      <a:lnRef idx="2">
+        <a:scrgbClr r="0" g="0" b="0"/>
+      </a:lnRef>
+      <a:fillRef idx="0">
+        <a:scrgbClr r="0" g="0" b="0"/>
+      </a:fillRef>
+      <a:effectRef idx="0">
+        <a:scrgbClr r="0" g="0" b="0"/>
+      </a:effectRef>
+      <a:fontRef idx="minor"/>
+    </dgm:style>
+  </dgm:styleLbl>
+  <dgm:styleLbl name="parChTrans1D3">
+    <dgm:scene3d>
+      <a:camera prst="orthographicFront"/>
+      <a:lightRig rig="threePt" dir="t"/>
+    </dgm:scene3d>
+    <dgm:sp3d/>
+    <dgm:txPr/>
+    <dgm:style>
+      <a:lnRef idx="2">
+        <a:scrgbClr r="0" g="0" b="0"/>
+      </a:lnRef>
+      <a:fillRef idx="0">
+        <a:scrgbClr r="0" g="0" b="0"/>
+      </a:fillRef>
+      <a:effectRef idx="0">
+        <a:scrgbClr r="0" g="0" b="0"/>
+      </a:effectRef>
+      <a:fontRef idx="minor"/>
+    </dgm:style>
+  </dgm:styleLbl>
+  <dgm:styleLbl name="parChTrans1D4">
+    <dgm:scene3d>
+      <a:camera prst="orthographicFront"/>
+      <a:lightRig rig="threePt" dir="t"/>
+    </dgm:scene3d>
+    <dgm:sp3d/>
+    <dgm:txPr/>
+    <dgm:style>
+      <a:lnRef idx="2">
+        <a:scrgbClr r="0" g="0" b="0"/>
+      </a:lnRef>
+      <a:fillRef idx="0">
+        <a:scrgbClr r="0" g="0" b="0"/>
+      </a:fillRef>
+      <a:effectRef idx="0">
+        <a:scrgbClr r="0" g="0" b="0"/>
+      </a:effectRef>
+      <a:fontRef idx="minor"/>
+    </dgm:style>
+  </dgm:styleLbl>
+  <dgm:styleLbl name="fgAcc1">
+    <dgm:scene3d>
+      <a:camera prst="orthographicFront"/>
+      <a:lightRig rig="threePt" dir="t"/>
+    </dgm:scene3d>
+    <dgm:sp3d/>
+    <dgm:txPr/>
+    <dgm:style>
+      <a:lnRef idx="2">
+        <a:scrgbClr r="0" g="0" b="0"/>
+      </a:lnRef>
+      <a:fillRef idx="1">
+        <a:scrgbClr r="0" g="0" b="0"/>
+      </a:fillRef>
+      <a:effectRef idx="0">
+        <a:scrgbClr r="0" g="0" b="0"/>
+      </a:effectRef>
+      <a:fontRef idx="minor"/>
+    </dgm:style>
+  </dgm:styleLbl>
+  <dgm:styleLbl name="conFgAcc1">
+    <dgm:scene3d>
+      <a:camera prst="orthographicFront"/>
+      <a:lightRig rig="threePt" dir="t"/>
+    </dgm:scene3d>
+    <dgm:sp3d/>
+    <dgm:txPr/>
+    <dgm:style>
+      <a:lnRef idx="2">
+        <a:scrgbClr r="0" g="0" b="0"/>
+      </a:lnRef>
+      <a:fillRef idx="1">
+        <a:scrgbClr r="0" g="0" b="0"/>
+      </a:fillRef>
+      <a:effectRef idx="0">
+        <a:scrgbClr r="0" g="0" b="0"/>
+      </a:effectRef>
+      <a:fontRef idx="minor"/>
+    </dgm:style>
+  </dgm:styleLbl>
+  <dgm:styleLbl name="alignAcc1">
+    <dgm:scene3d>
+      <a:camera prst="orthographicFront"/>
+      <a:lightRig rig="threePt" dir="t"/>
+    </dgm:scene3d>
+    <dgm:sp3d/>
+    <dgm:txPr/>
+    <dgm:style>
+      <a:lnRef idx="2">
+        <a:scrgbClr r="0" g="0" b="0"/>
+      </a:lnRef>
+      <a:fillRef idx="1">
+        <a:scrgbClr r="0" g="0" b="0"/>
+      </a:fillRef>
+      <a:effectRef idx="0">
+        <a:scrgbClr r="0" g="0" b="0"/>
+      </a:effectRef>
+      <a:fontRef idx="minor"/>
+    </dgm:style>
+  </dgm:styleLbl>
+  <dgm:styleLbl name="trAlignAcc1">
+    <dgm:scene3d>
+      <a:camera prst="orthographicFront"/>
+      <a:lightRig rig="threePt" dir="t"/>
+    </dgm:scene3d>
+    <dgm:sp3d/>
+    <dgm:txPr/>
+    <dgm:style>
+      <a:lnRef idx="1">
+        <a:scrgbClr r="0" g="0" b="0"/>
+      </a:lnRef>
+      <a:fillRef idx="1">
+        <a:scrgbClr r="0" g="0" b="0"/>
+      </a:fillRef>
+      <a:effectRef idx="0">
+        <a:scrgbClr r="0" g="0" b="0"/>
+      </a:effectRef>
+      <a:fontRef idx="minor"/>
+    </dgm:style>
+  </dgm:styleLbl>
+  <dgm:styleLbl name="bgAcc1">
+    <dgm:scene3d>
+      <a:camera prst="orthographicFront"/>
+      <a:lightRig rig="threePt" dir="t"/>
+    </dgm:scene3d>
+    <dgm:sp3d/>
+    <dgm:txPr/>
+    <dgm:style>
+      <a:lnRef idx="2">
+        <a:scrgbClr r="0" g="0" b="0"/>
+      </a:lnRef>
+      <a:fillRef idx="1">
+        <a:scrgbClr r="0" g="0" b="0"/>
+      </a:fillRef>
+      <a:effectRef idx="0">
+        <a:scrgbClr r="0" g="0" b="0"/>
+      </a:effectRef>
+      <a:fontRef idx="minor"/>
+    </dgm:style>
+  </dgm:styleLbl>
+  <dgm:styleLbl name="solidFgAcc1">
+    <dgm:scene3d>
+      <a:camera prst="orthographicFront"/>
+      <a:lightRig rig="threePt" dir="t"/>
+    </dgm:scene3d>
+    <dgm:sp3d/>
+    <dgm:txPr/>
+    <dgm:style>
+      <a:lnRef idx="2">
+        <a:scrgbClr r="0" g="0" b="0"/>
+      </a:lnRef>
+      <a:fillRef idx="1">
+        <a:scrgbClr r="0" g="0" b="0"/>
+      </a:fillRef>
+      <a:effectRef idx="0">
+        <a:scrgbClr r="0" g="0" b="0"/>
+      </a:effectRef>
+      <a:fontRef idx="minor"/>
+    </dgm:style>
+  </dgm:styleLbl>
+  <dgm:styleLbl name="solidAlignAcc1">
+    <dgm:scene3d>
+      <a:camera prst="orthographicFront"/>
+      <a:lightRig rig="threePt" dir="t"/>
+    </dgm:scene3d>
+    <dgm:sp3d/>
+    <dgm:txPr/>
+    <dgm:style>
+      <a:lnRef idx="2">
+        <a:scrgbClr r="0" g="0" b="0"/>
+      </a:lnRef>
+      <a:fillRef idx="1">
+        <a:scrgbClr r="0" g="0" b="0"/>
+      </a:fillRef>
+      <a:effectRef idx="0">
+        <a:scrgbClr r="0" g="0" b="0"/>
+      </a:effectRef>
+      <a:fontRef idx="minor"/>
+    </dgm:style>
+  </dgm:styleLbl>
+  <dgm:styleLbl name="solidBgAcc1">
+    <dgm:scene3d>
+      <a:camera prst="orthographicFront"/>
+      <a:lightRig rig="threePt" dir="t"/>
+    </dgm:scene3d>
+    <dgm:sp3d/>
+    <dgm:txPr/>
+    <dgm:style>
+      <a:lnRef idx="2">
+        <a:scrgbClr r="0" g="0" b="0"/>
+      </a:lnRef>
+      <a:fillRef idx="1">
+        <a:scrgbClr r="0" g="0" b="0"/>
+      </a:fillRef>
+      <a:effectRef idx="0">
+        <a:scrgbClr r="0" g="0" b="0"/>
+      </a:effectRef>
+      <a:fontRef idx="minor"/>
+    </dgm:style>
+  </dgm:styleLbl>
+  <dgm:styleLbl name="fgAccFollowNode1">
+    <dgm:scene3d>
+      <a:camera prst="orthographicFront"/>
+      <a:lightRig rig="threePt" dir="t"/>
+    </dgm:scene3d>
+    <dgm:sp3d/>
+    <dgm:txPr/>
+    <dgm:style>
+      <a:lnRef idx="2">
+        <a:scrgbClr r="0" g="0" b="0"/>
+      </a:lnRef>
+      <a:fillRef idx="1">
+        <a:scrgbClr r="0" g="0" b="0"/>
+      </a:fillRef>
+      <a:effectRef idx="0">
+        <a:scrgbClr r="0" g="0" b="0"/>
+      </a:effectRef>
+      <a:fontRef idx="minor"/>
+    </dgm:style>
+  </dgm:styleLbl>
+  <dgm:styleLbl name="alignAccFollowNode1">
+    <dgm:scene3d>
+      <a:camera prst="orthographicFront"/>
+      <a:lightRig rig="threePt" dir="t"/>
+    </dgm:scene3d>
+    <dgm:sp3d/>
+    <dgm:txPr/>
+    <dgm:style>
+      <a:lnRef idx="2">
+        <a:scrgbClr r="0" g="0" b="0"/>
+      </a:lnRef>
+      <a:fillRef idx="1">
+        <a:scrgbClr r="0" g="0" b="0"/>
+      </a:fillRef>
+      <a:effectRef idx="0">
+        <a:scrgbClr r="0" g="0" b="0"/>
+      </a:effectRef>
+      <a:fontRef idx="minor"/>
+    </dgm:style>
+  </dgm:styleLbl>
+  <dgm:styleLbl name="bgAccFollowNode1">
+    <dgm:scene3d>
+      <a:camera prst="orthographicFront"/>
+      <a:lightRig rig="threePt" dir="t"/>
+    </dgm:scene3d>
+    <dgm:sp3d/>
+    <dgm:txPr/>
+    <dgm:style>
+      <a:lnRef idx="2">
+        <a:scrgbClr r="0" g="0" b="0"/>
+      </a:lnRef>
+      <a:fillRef idx="1">
+        <a:scrgbClr r="0" g="0" b="0"/>
+      </a:fillRef>
+      <a:effectRef idx="0">
+        <a:scrgbClr r="0" g="0" b="0"/>
+      </a:effectRef>
+      <a:fontRef idx="minor"/>
+    </dgm:style>
+  </dgm:styleLbl>
+  <dgm:styleLbl name="fgAcc0">
+    <dgm:scene3d>
+      <a:camera prst="orthographicFront"/>
+      <a:lightRig rig="threePt" dir="t"/>
+    </dgm:scene3d>
+    <dgm:sp3d/>
+    <dgm:txPr/>
+    <dgm:style>
+      <a:lnRef idx="2">
+        <a:scrgbClr r="0" g="0" b="0"/>
+      </a:lnRef>
+      <a:fillRef idx="1">
+        <a:scrgbClr r="0" g="0" b="0"/>
+      </a:fillRef>
+      <a:effectRef idx="0">
+        <a:scrgbClr r="0" g="0" b="0"/>
+      </a:effectRef>
+      <a:fontRef idx="minor"/>
+    </dgm:style>
+  </dgm:styleLbl>
+  <dgm:styleLbl name="fgAcc2">
+    <dgm:scene3d>
+      <a:camera prst="orthographicFront"/>
+      <a:lightRig rig="threePt" dir="t"/>
+    </dgm:scene3d>
+    <dgm:sp3d/>
+    <dgm:txPr/>
+    <dgm:style>
+      <a:lnRef idx="2">
+        <a:scrgbClr r="0" g="0" b="0"/>
+      </a:lnRef>
+      <a:fillRef idx="1">
+        <a:scrgbClr r="0" g="0" b="0"/>
+      </a:fillRef>
+      <a:effectRef idx="0">
+        <a:scrgbClr r="0" g="0" b="0"/>
+      </a:effectRef>
+      <a:fontRef idx="minor"/>
+    </dgm:style>
+  </dgm:styleLbl>
+  <dgm:styleLbl name="fgAcc3">
+    <dgm:scene3d>
+      <a:camera prst="orthographicFront"/>
+      <a:lightRig rig="threePt" dir="t"/>
+    </dgm:scene3d>
+    <dgm:sp3d/>
+    <dgm:txPr/>
+    <dgm:style>
+      <a:lnRef idx="2">
+        <a:scrgbClr r="0" g="0" b="0"/>
+      </a:lnRef>
+      <a:fillRef idx="1">
+        <a:scrgbClr r="0" g="0" b="0"/>
+      </a:fillRef>
+      <a:effectRef idx="0">
+        <a:scrgbClr r="0" g="0" b="0"/>
+      </a:effectRef>
+      <a:fontRef idx="minor"/>
+    </dgm:style>
+  </dgm:styleLbl>
+  <dgm:styleLbl name="fgAcc4">
+    <dgm:scene3d>
+      <a:camera prst="orthographicFront"/>
+      <a:lightRig rig="threePt" dir="t"/>
+    </dgm:scene3d>
+    <dgm:sp3d/>
+    <dgm:txPr/>
+    <dgm:style>
+      <a:lnRef idx="2">
+        <a:scrgbClr r="0" g="0" b="0"/>
+      </a:lnRef>
+      <a:fillRef idx="1">
+        <a:scrgbClr r="0" g="0" b="0"/>
+      </a:fillRef>
+      <a:effectRef idx="0">
+        <a:scrgbClr r="0" g="0" b="0"/>
+      </a:effectRef>
+      <a:fontRef idx="minor"/>
+    </dgm:style>
+  </dgm:styleLbl>
+  <dgm:styleLbl name="bgShp">
+    <dgm:scene3d>
+      <a:camera prst="orthographicFront"/>
+      <a:lightRig rig="threePt" dir="t"/>
+    </dgm:scene3d>
+    <dgm:sp3d/>
+    <dgm:txPr/>
+    <dgm:style>
+      <a:lnRef idx="0">
+        <a:scrgbClr r="0" g="0" b="0"/>
+      </a:lnRef>
+      <a:fillRef idx="1">
+        <a:scrgbClr r="0" g="0" b="0"/>
+      </a:fillRef>
+      <a:effectRef idx="0">
+        <a:scrgbClr r="0" g="0" b="0"/>
+      </a:effectRef>
+      <a:fontRef idx="minor"/>
+    </dgm:style>
+  </dgm:styleLbl>
+  <dgm:styleLbl name="dkBgShp">
+    <dgm:scene3d>
+      <a:camera prst="orthographicFront"/>
+      <a:lightRig rig="threePt" dir="t"/>
+    </dgm:scene3d>
+    <dgm:sp3d/>
+    <dgm:txPr/>
+    <dgm:style>
+      <a:lnRef idx="0">
+        <a:scrgbClr r="0" g="0" b="0"/>
+      </a:lnRef>
+      <a:fillRef idx="1">
+        <a:scrgbClr r="0" g="0" b="0"/>
+      </a:fillRef>
+      <a:effectRef idx="0">
+        <a:scrgbClr r="0" g="0" b="0"/>
+      </a:effectRef>
+      <a:fontRef idx="minor"/>
+    </dgm:style>
+  </dgm:styleLbl>
+  <dgm:styleLbl name="trBgShp">
+    <dgm:scene3d>
+      <a:camera prst="orthographicFront"/>
+      <a:lightRig rig="threePt" dir="t"/>
+    </dgm:scene3d>
+    <dgm:sp3d/>
+    <dgm:txPr/>
+    <dgm:style>
+      <a:lnRef idx="0">
+        <a:scrgbClr r="0" g="0" b="0"/>
+      </a:lnRef>
+      <a:fillRef idx="1">
+        <a:scrgbClr r="0" g="0" b="0"/>
+      </a:fillRef>
+      <a:effectRef idx="0">
+        <a:scrgbClr r="0" g="0" b="0"/>
+      </a:effectRef>
+      <a:fontRef idx="minor"/>
+    </dgm:style>
+  </dgm:styleLbl>
+  <dgm:styleLbl name="fgShp">
+    <dgm:scene3d>
+      <a:camera prst="orthographicFront"/>
+      <a:lightRig rig="threePt" dir="t"/>
+    </dgm:scene3d>
+    <dgm:sp3d/>
+    <dgm:txPr/>
+    <dgm:style>
+      <a:lnRef idx="2">
+        <a:scrgbClr r="0" g="0" b="0"/>
+      </a:lnRef>
+      <a:fillRef idx="1">
+        <a:scrgbClr r="0" g="0" b="0"/>
+      </a:fillRef>
+      <a:effectRef idx="0">
+        <a:scrgbClr r="0" g="0" b="0"/>
+      </a:effectRef>
+      <a:fontRef idx="minor"/>
+    </dgm:style>
+  </dgm:styleLbl>
+  <dgm:styleLbl name="revTx">
+    <dgm:scene3d>
+      <a:camera prst="orthographicFront"/>
+      <a:lightRig rig="threePt" dir="t"/>
+    </dgm:scene3d>
+    <dgm:sp3d/>
+    <dgm:txPr/>
+    <dgm:style>
+      <a:lnRef idx="0">
+        <a:scrgbClr r="0" g="0" b="0"/>
+      </a:lnRef>
+      <a:fillRef idx="0">
+        <a:scrgbClr r="0" g="0" b="0"/>
+      </a:fillRef>
+      <a:effectRef idx="0">
+        <a:scrgbClr r="0" g="0" b="0"/>
+      </a:effectRef>
+      <a:fontRef idx="minor"/>
+    </dgm:style>
+  </dgm:styleLbl>
+</dgm:styleDef>
+</file>
+
 <file path=ppt/slideLayouts/slideLayout1.xml><?xml version="1.0" encoding="utf-8"?>
 <p:sldLayout xmlns:a="http://schemas.openxmlformats.org/drawingml/2006/main" xmlns:r="http://schemas.openxmlformats.org/officeDocument/2006/relationships" xmlns:p="http://schemas.openxmlformats.org/presentationml/2006/main" type="title" preserve="1">
   <p:cSld name="Diapositiva de título">
@@ -1641,7 +4993,7 @@
           <a:p>
             <a:fld id="{BACAB49F-3C56-4061-AA8F-163AE124D091}" type="datetimeFigureOut">
               <a:rPr lang="es-ES" smtClean="0"/>
-              <a:t>28/03/2021</a:t>
+              <a:t>02/04/2021</a:t>
             </a:fld>
             <a:endParaRPr lang="es-ES"/>
           </a:p>
@@ -1811,7 +5163,7 @@
           <a:p>
             <a:fld id="{BACAB49F-3C56-4061-AA8F-163AE124D091}" type="datetimeFigureOut">
               <a:rPr lang="es-ES" smtClean="0"/>
-              <a:t>28/03/2021</a:t>
+              <a:t>02/04/2021</a:t>
             </a:fld>
             <a:endParaRPr lang="es-ES"/>
           </a:p>
@@ -1991,7 +5343,7 @@
           <a:p>
             <a:fld id="{BACAB49F-3C56-4061-AA8F-163AE124D091}" type="datetimeFigureOut">
               <a:rPr lang="es-ES" smtClean="0"/>
-              <a:t>28/03/2021</a:t>
+              <a:t>02/04/2021</a:t>
             </a:fld>
             <a:endParaRPr lang="es-ES"/>
           </a:p>
@@ -2161,7 +5513,7 @@
           <a:p>
             <a:fld id="{BACAB49F-3C56-4061-AA8F-163AE124D091}" type="datetimeFigureOut">
               <a:rPr lang="es-ES" smtClean="0"/>
-              <a:t>28/03/2021</a:t>
+              <a:t>02/04/2021</a:t>
             </a:fld>
             <a:endParaRPr lang="es-ES"/>
           </a:p>
@@ -2407,7 +5759,7 @@
           <a:p>
             <a:fld id="{BACAB49F-3C56-4061-AA8F-163AE124D091}" type="datetimeFigureOut">
               <a:rPr lang="es-ES" smtClean="0"/>
-              <a:t>28/03/2021</a:t>
+              <a:t>02/04/2021</a:t>
             </a:fld>
             <a:endParaRPr lang="es-ES"/>
           </a:p>
@@ -2639,7 +5991,7 @@
           <a:p>
             <a:fld id="{BACAB49F-3C56-4061-AA8F-163AE124D091}" type="datetimeFigureOut">
               <a:rPr lang="es-ES" smtClean="0"/>
-              <a:t>28/03/2021</a:t>
+              <a:t>02/04/2021</a:t>
             </a:fld>
             <a:endParaRPr lang="es-ES"/>
           </a:p>
@@ -3006,7 +6358,7 @@
           <a:p>
             <a:fld id="{BACAB49F-3C56-4061-AA8F-163AE124D091}" type="datetimeFigureOut">
               <a:rPr lang="es-ES" smtClean="0"/>
-              <a:t>28/03/2021</a:t>
+              <a:t>02/04/2021</a:t>
             </a:fld>
             <a:endParaRPr lang="es-ES"/>
           </a:p>
@@ -3124,7 +6476,7 @@
           <a:p>
             <a:fld id="{BACAB49F-3C56-4061-AA8F-163AE124D091}" type="datetimeFigureOut">
               <a:rPr lang="es-ES" smtClean="0"/>
-              <a:t>28/03/2021</a:t>
+              <a:t>02/04/2021</a:t>
             </a:fld>
             <a:endParaRPr lang="es-ES"/>
           </a:p>
@@ -3219,7 +6571,7 @@
           <a:p>
             <a:fld id="{BACAB49F-3C56-4061-AA8F-163AE124D091}" type="datetimeFigureOut">
               <a:rPr lang="es-ES" smtClean="0"/>
-              <a:t>28/03/2021</a:t>
+              <a:t>02/04/2021</a:t>
             </a:fld>
             <a:endParaRPr lang="es-ES"/>
           </a:p>
@@ -3496,7 +6848,7 @@
           <a:p>
             <a:fld id="{BACAB49F-3C56-4061-AA8F-163AE124D091}" type="datetimeFigureOut">
               <a:rPr lang="es-ES" smtClean="0"/>
-              <a:t>28/03/2021</a:t>
+              <a:t>02/04/2021</a:t>
             </a:fld>
             <a:endParaRPr lang="es-ES"/>
           </a:p>
@@ -3749,7 +7101,7 @@
           <a:p>
             <a:fld id="{BACAB49F-3C56-4061-AA8F-163AE124D091}" type="datetimeFigureOut">
               <a:rPr lang="es-ES" smtClean="0"/>
-              <a:t>28/03/2021</a:t>
+              <a:t>02/04/2021</a:t>
             </a:fld>
             <a:endParaRPr lang="es-ES"/>
           </a:p>
@@ -3962,7 +7314,7 @@
           <a:p>
             <a:fld id="{BACAB49F-3C56-4061-AA8F-163AE124D091}" type="datetimeFigureOut">
               <a:rPr lang="es-ES" smtClean="0"/>
-              <a:t>28/03/2021</a:t>
+              <a:t>02/04/2021</a:t>
             </a:fld>
             <a:endParaRPr lang="es-ES"/>
           </a:p>
@@ -4590,6 +7942,58 @@
 </p:sld>
 </file>
 
+<file path=ppt/slides/slide2.xml><?xml version="1.0" encoding="utf-8"?>
+<p:sld xmlns:a="http://schemas.openxmlformats.org/drawingml/2006/main" xmlns:r="http://schemas.openxmlformats.org/officeDocument/2006/relationships" xmlns:p="http://schemas.openxmlformats.org/presentationml/2006/main">
+  <p:cSld>
+    <p:spTree>
+      <p:nvGrpSpPr>
+        <p:cNvPr id="1" name=""/>
+        <p:cNvGrpSpPr/>
+        <p:nvPr/>
+      </p:nvGrpSpPr>
+      <p:grpSpPr>
+        <a:xfrm>
+          <a:off x="0" y="0"/>
+          <a:ext cx="0" cy="0"/>
+          <a:chOff x="0" y="0"/>
+          <a:chExt cx="0" cy="0"/>
+        </a:xfrm>
+      </p:grpSpPr>
+      <p:graphicFrame>
+        <p:nvGraphicFramePr>
+          <p:cNvPr id="6" name="Diagrama 5"/>
+          <p:cNvGraphicFramePr/>
+          <p:nvPr>
+            <p:extLst>
+              <p:ext uri="{D42A27DB-BD31-4B8C-83A1-F6EECF244321}">
+                <p14:modId xmlns:p14="http://schemas.microsoft.com/office/powerpoint/2010/main" val="4230297038"/>
+              </p:ext>
+            </p:extLst>
+          </p:nvPr>
+        </p:nvGraphicFramePr>
+        <p:xfrm>
+          <a:off x="2032000" y="719666"/>
+          <a:ext cx="8128000" cy="5418667"/>
+        </p:xfrm>
+        <a:graphic>
+          <a:graphicData uri="http://schemas.openxmlformats.org/drawingml/2006/diagram">
+            <dgm:relIds xmlns:dgm="http://schemas.openxmlformats.org/drawingml/2006/diagram" xmlns:r="http://schemas.openxmlformats.org/officeDocument/2006/relationships" r:dm="rId2" r:lo="rId3" r:qs="rId4" r:cs="rId5"/>
+          </a:graphicData>
+        </a:graphic>
+      </p:graphicFrame>
+    </p:spTree>
+    <p:extLst>
+      <p:ext uri="{BB962C8B-B14F-4D97-AF65-F5344CB8AC3E}">
+        <p14:creationId xmlns:p14="http://schemas.microsoft.com/office/powerpoint/2010/main" val="3646112825"/>
+      </p:ext>
+    </p:extLst>
+  </p:cSld>
+  <p:clrMapOvr>
+    <a:masterClrMapping/>
+  </p:clrMapOvr>
+</p:sld>
+</file>
+
 <file path=ppt/theme/theme1.xml><?xml version="1.0" encoding="utf-8"?>
 <a:theme xmlns:a="http://schemas.openxmlformats.org/drawingml/2006/main" name="Tema de Office">
   <a:themeElements>

</xml_diff>

<commit_message>
Añadido código al tfg, arreglado bug con la tablet
</commit_message>
<xml_diff>
--- a/Infografias.pptx
+++ b/Infografias.pptx
@@ -7,6 +7,7 @@
   <p:sldIdLst>
     <p:sldId id="256" r:id="rId2"/>
     <p:sldId id="257" r:id="rId3"/>
+    <p:sldId id="258" r:id="rId4"/>
   </p:sldIdLst>
   <p:sldSz cx="12192000" cy="6858000"/>
   <p:notesSz cx="6858000" cy="9144000"/>
@@ -2532,6 +2533,13 @@
         </dgm:presLayoutVars>
       </dgm:prSet>
       <dgm:spPr/>
+      <dgm:t>
+        <a:bodyPr/>
+        <a:lstStyle/>
+        <a:p>
+          <a:endParaRPr lang="es-ES"/>
+        </a:p>
+      </dgm:t>
     </dgm:pt>
     <dgm:pt modelId="{7A52D6B9-C7A3-49FF-AF71-92B04ECB2EB3}" type="pres">
       <dgm:prSet presAssocID="{EDC3B893-2DE6-465C-A086-FA09B20A320D}" presName="composite" presStyleCnt="0"/>
@@ -2596,6 +2604,13 @@
         </dgm:presLayoutVars>
       </dgm:prSet>
       <dgm:spPr/>
+      <dgm:t>
+        <a:bodyPr/>
+        <a:lstStyle/>
+        <a:p>
+          <a:endParaRPr lang="es-ES"/>
+        </a:p>
+      </dgm:t>
     </dgm:pt>
     <dgm:pt modelId="{632DA3B5-B0F2-494F-B9FC-1542F9C589D4}" type="pres">
       <dgm:prSet presAssocID="{E90A7B7F-C043-4CF5-B459-871488D90643}" presName="ChildText" presStyleLbl="revTx" presStyleIdx="1" presStyleCnt="4">
@@ -2635,6 +2650,13 @@
         </dgm:presLayoutVars>
       </dgm:prSet>
       <dgm:spPr/>
+      <dgm:t>
+        <a:bodyPr/>
+        <a:lstStyle/>
+        <a:p>
+          <a:endParaRPr lang="es-ES"/>
+        </a:p>
+      </dgm:t>
     </dgm:pt>
     <dgm:pt modelId="{3A3633D6-FB12-461F-8612-F6270D66E58E}" type="pres">
       <dgm:prSet presAssocID="{C963126C-24D9-4CD0-A634-48E45F49C5DE}" presName="ChildText" presStyleLbl="revTx" presStyleIdx="2" presStyleCnt="4">
@@ -2667,6 +2689,13 @@
         </dgm:presLayoutVars>
       </dgm:prSet>
       <dgm:spPr/>
+      <dgm:t>
+        <a:bodyPr/>
+        <a:lstStyle/>
+        <a:p>
+          <a:endParaRPr lang="es-ES"/>
+        </a:p>
+      </dgm:t>
     </dgm:pt>
     <dgm:pt modelId="{31F43388-8B1B-4DA9-9795-06D00AC3E9C8}" type="pres">
       <dgm:prSet presAssocID="{4A66FC27-468B-4BD2-8DCA-B5C193A98BBD}" presName="ChildText" presStyleLbl="revTx" presStyleIdx="3" presStyleCnt="4">
@@ -2705,17 +2734,17 @@
     </dgm:pt>
   </dgm:ptLst>
   <dgm:cxnLst>
+    <dgm:cxn modelId="{D981A90D-46C4-4271-B808-D70A709E6643}" type="presOf" srcId="{EDC3B893-2DE6-465C-A086-FA09B20A320D}" destId="{2BA88272-170E-4935-B77F-F5F1143295AA}" srcOrd="0" destOrd="0" presId="urn:microsoft.com/office/officeart/2005/8/layout/StepDownProcess"/>
+    <dgm:cxn modelId="{1E05FB7E-EC0E-4FD6-B3DB-23627115BA87}" type="presOf" srcId="{C963126C-24D9-4CD0-A634-48E45F49C5DE}" destId="{C5B5DBD7-56DE-4B46-8EC5-F2AD05812196}" srcOrd="0" destOrd="0" presId="urn:microsoft.com/office/officeart/2005/8/layout/StepDownProcess"/>
+    <dgm:cxn modelId="{F871793D-0736-4E3C-B0BD-E0F3CA31A06C}" type="presOf" srcId="{10B536A7-6E30-404E-BA80-F79D95CADD30}" destId="{8A781059-DDA9-497E-8613-5445EDB52CF3}" srcOrd="0" destOrd="0" presId="urn:microsoft.com/office/officeart/2005/8/layout/StepDownProcess"/>
+    <dgm:cxn modelId="{F18315FA-3F58-4F50-9D76-91B450172A79}" type="presOf" srcId="{E90A7B7F-C043-4CF5-B459-871488D90643}" destId="{699E7647-938C-4444-9B23-7D8CA3770712}" srcOrd="0" destOrd="0" presId="urn:microsoft.com/office/officeart/2005/8/layout/StepDownProcess"/>
+    <dgm:cxn modelId="{E677E61E-97EE-4D69-AE59-42F461A56A46}" type="presOf" srcId="{179228B3-389D-40F4-AB8B-BEAD5A6314A1}" destId="{D16181EC-2972-492A-A361-E129EE7F9699}" srcOrd="0" destOrd="0" presId="urn:microsoft.com/office/officeart/2005/8/layout/StepDownProcess"/>
+    <dgm:cxn modelId="{B2DCFDF6-8F2E-467F-863B-BA09B3B6EF73}" type="presOf" srcId="{4A66FC27-468B-4BD2-8DCA-B5C193A98BBD}" destId="{6371D646-3A5B-42D7-9009-C5E5A3E1EC2B}" srcOrd="0" destOrd="0" presId="urn:microsoft.com/office/officeart/2005/8/layout/StepDownProcess"/>
+    <dgm:cxn modelId="{50F8FEDB-F51C-472C-BB84-613A4EE4017D}" srcId="{10B536A7-6E30-404E-BA80-F79D95CADD30}" destId="{EDC3B893-2DE6-465C-A086-FA09B20A320D}" srcOrd="0" destOrd="0" parTransId="{4AC02CC2-0FB0-42E7-8A95-ADDA50419CD2}" sibTransId="{410EC82D-F1E4-4144-8972-DA59DEC93A24}"/>
+    <dgm:cxn modelId="{F5BF2D68-3C0D-4471-9087-AF89D79EC340}" srcId="{10B536A7-6E30-404E-BA80-F79D95CADD30}" destId="{4A66FC27-468B-4BD2-8DCA-B5C193A98BBD}" srcOrd="3" destOrd="0" parTransId="{3E8D3D35-8D87-40B0-AD1A-4AB625FB757E}" sibTransId="{FB05280D-551C-4D87-A18D-4E28E3EFE770}"/>
+    <dgm:cxn modelId="{0369377F-41F0-4CC5-82A6-6D5625703756}" srcId="{10B536A7-6E30-404E-BA80-F79D95CADD30}" destId="{179228B3-389D-40F4-AB8B-BEAD5A6314A1}" srcOrd="4" destOrd="0" parTransId="{0BBDD2C8-5DE2-4B88-8818-77B914584AC9}" sibTransId="{4E33100D-E9DD-4D50-825E-BF814EB5660B}"/>
+    <dgm:cxn modelId="{83D3C1C1-8B90-4D2E-ABCB-1E96F3D88BE7}" srcId="{10B536A7-6E30-404E-BA80-F79D95CADD30}" destId="{C963126C-24D9-4CD0-A634-48E45F49C5DE}" srcOrd="2" destOrd="0" parTransId="{9329C171-081B-426F-9254-AC652C4774F6}" sibTransId="{9A17AD42-0B00-406A-8100-E3566A66F3D3}"/>
     <dgm:cxn modelId="{910CB811-7DEB-4DB5-A1B8-74C928CFDF94}" srcId="{10B536A7-6E30-404E-BA80-F79D95CADD30}" destId="{E90A7B7F-C043-4CF5-B459-871488D90643}" srcOrd="1" destOrd="0" parTransId="{BC9783CF-43D6-456A-980C-384662AC20DA}" sibTransId="{A0E79249-7065-4962-8735-A6C688F5445B}"/>
-    <dgm:cxn modelId="{1E05FB7E-EC0E-4FD6-B3DB-23627115BA87}" type="presOf" srcId="{C963126C-24D9-4CD0-A634-48E45F49C5DE}" destId="{C5B5DBD7-56DE-4B46-8EC5-F2AD05812196}" srcOrd="0" destOrd="0" presId="urn:microsoft.com/office/officeart/2005/8/layout/StepDownProcess"/>
-    <dgm:cxn modelId="{50F8FEDB-F51C-472C-BB84-613A4EE4017D}" srcId="{10B536A7-6E30-404E-BA80-F79D95CADD30}" destId="{EDC3B893-2DE6-465C-A086-FA09B20A320D}" srcOrd="0" destOrd="0" parTransId="{4AC02CC2-0FB0-42E7-8A95-ADDA50419CD2}" sibTransId="{410EC82D-F1E4-4144-8972-DA59DEC93A24}"/>
-    <dgm:cxn modelId="{F871793D-0736-4E3C-B0BD-E0F3CA31A06C}" type="presOf" srcId="{10B536A7-6E30-404E-BA80-F79D95CADD30}" destId="{8A781059-DDA9-497E-8613-5445EDB52CF3}" srcOrd="0" destOrd="0" presId="urn:microsoft.com/office/officeart/2005/8/layout/StepDownProcess"/>
-    <dgm:cxn modelId="{83D3C1C1-8B90-4D2E-ABCB-1E96F3D88BE7}" srcId="{10B536A7-6E30-404E-BA80-F79D95CADD30}" destId="{C963126C-24D9-4CD0-A634-48E45F49C5DE}" srcOrd="2" destOrd="0" parTransId="{9329C171-081B-426F-9254-AC652C4774F6}" sibTransId="{9A17AD42-0B00-406A-8100-E3566A66F3D3}"/>
-    <dgm:cxn modelId="{B2DCFDF6-8F2E-467F-863B-BA09B3B6EF73}" type="presOf" srcId="{4A66FC27-468B-4BD2-8DCA-B5C193A98BBD}" destId="{6371D646-3A5B-42D7-9009-C5E5A3E1EC2B}" srcOrd="0" destOrd="0" presId="urn:microsoft.com/office/officeart/2005/8/layout/StepDownProcess"/>
-    <dgm:cxn modelId="{F18315FA-3F58-4F50-9D76-91B450172A79}" type="presOf" srcId="{E90A7B7F-C043-4CF5-B459-871488D90643}" destId="{699E7647-938C-4444-9B23-7D8CA3770712}" srcOrd="0" destOrd="0" presId="urn:microsoft.com/office/officeart/2005/8/layout/StepDownProcess"/>
-    <dgm:cxn modelId="{0369377F-41F0-4CC5-82A6-6D5625703756}" srcId="{10B536A7-6E30-404E-BA80-F79D95CADD30}" destId="{179228B3-389D-40F4-AB8B-BEAD5A6314A1}" srcOrd="4" destOrd="0" parTransId="{0BBDD2C8-5DE2-4B88-8818-77B914584AC9}" sibTransId="{4E33100D-E9DD-4D50-825E-BF814EB5660B}"/>
-    <dgm:cxn modelId="{E677E61E-97EE-4D69-AE59-42F461A56A46}" type="presOf" srcId="{179228B3-389D-40F4-AB8B-BEAD5A6314A1}" destId="{D16181EC-2972-492A-A361-E129EE7F9699}" srcOrd="0" destOrd="0" presId="urn:microsoft.com/office/officeart/2005/8/layout/StepDownProcess"/>
-    <dgm:cxn modelId="{D981A90D-46C4-4271-B808-D70A709E6643}" type="presOf" srcId="{EDC3B893-2DE6-465C-A086-FA09B20A320D}" destId="{2BA88272-170E-4935-B77F-F5F1143295AA}" srcOrd="0" destOrd="0" presId="urn:microsoft.com/office/officeart/2005/8/layout/StepDownProcess"/>
-    <dgm:cxn modelId="{F5BF2D68-3C0D-4471-9087-AF89D79EC340}" srcId="{10B536A7-6E30-404E-BA80-F79D95CADD30}" destId="{4A66FC27-468B-4BD2-8DCA-B5C193A98BBD}" srcOrd="3" destOrd="0" parTransId="{3E8D3D35-8D87-40B0-AD1A-4AB625FB757E}" sibTransId="{FB05280D-551C-4D87-A18D-4E28E3EFE770}"/>
     <dgm:cxn modelId="{54B9D7AC-CD47-4F51-BED3-BD1371A7B696}" type="presParOf" srcId="{8A781059-DDA9-497E-8613-5445EDB52CF3}" destId="{7A52D6B9-C7A3-49FF-AF71-92B04ECB2EB3}" srcOrd="0" destOrd="0" presId="urn:microsoft.com/office/officeart/2005/8/layout/StepDownProcess"/>
     <dgm:cxn modelId="{988016CA-EAC2-4AC4-83D4-1DDFB46A7634}" type="presParOf" srcId="{7A52D6B9-C7A3-49FF-AF71-92B04ECB2EB3}" destId="{E6803CD7-0CDA-41E6-8A33-26BEDB2B5354}" srcOrd="0" destOrd="0" presId="urn:microsoft.com/office/officeart/2005/8/layout/StepDownProcess"/>
     <dgm:cxn modelId="{3287D894-4481-469F-AE71-7F9E8F92679F}" type="presParOf" srcId="{7A52D6B9-C7A3-49FF-AF71-92B04ECB2EB3}" destId="{2BA88272-170E-4935-B77F-F5F1143295AA}" srcOrd="1" destOrd="0" presId="urn:microsoft.com/office/officeart/2005/8/layout/StepDownProcess"/>
@@ -4993,7 +5022,7 @@
           <a:p>
             <a:fld id="{BACAB49F-3C56-4061-AA8F-163AE124D091}" type="datetimeFigureOut">
               <a:rPr lang="es-ES" smtClean="0"/>
-              <a:t>02/04/2021</a:t>
+              <a:t>16/05/2021</a:t>
             </a:fld>
             <a:endParaRPr lang="es-ES"/>
           </a:p>
@@ -5163,7 +5192,7 @@
           <a:p>
             <a:fld id="{BACAB49F-3C56-4061-AA8F-163AE124D091}" type="datetimeFigureOut">
               <a:rPr lang="es-ES" smtClean="0"/>
-              <a:t>02/04/2021</a:t>
+              <a:t>16/05/2021</a:t>
             </a:fld>
             <a:endParaRPr lang="es-ES"/>
           </a:p>
@@ -5343,7 +5372,7 @@
           <a:p>
             <a:fld id="{BACAB49F-3C56-4061-AA8F-163AE124D091}" type="datetimeFigureOut">
               <a:rPr lang="es-ES" smtClean="0"/>
-              <a:t>02/04/2021</a:t>
+              <a:t>16/05/2021</a:t>
             </a:fld>
             <a:endParaRPr lang="es-ES"/>
           </a:p>
@@ -5513,7 +5542,7 @@
           <a:p>
             <a:fld id="{BACAB49F-3C56-4061-AA8F-163AE124D091}" type="datetimeFigureOut">
               <a:rPr lang="es-ES" smtClean="0"/>
-              <a:t>02/04/2021</a:t>
+              <a:t>16/05/2021</a:t>
             </a:fld>
             <a:endParaRPr lang="es-ES"/>
           </a:p>
@@ -5759,7 +5788,7 @@
           <a:p>
             <a:fld id="{BACAB49F-3C56-4061-AA8F-163AE124D091}" type="datetimeFigureOut">
               <a:rPr lang="es-ES" smtClean="0"/>
-              <a:t>02/04/2021</a:t>
+              <a:t>16/05/2021</a:t>
             </a:fld>
             <a:endParaRPr lang="es-ES"/>
           </a:p>
@@ -5991,7 +6020,7 @@
           <a:p>
             <a:fld id="{BACAB49F-3C56-4061-AA8F-163AE124D091}" type="datetimeFigureOut">
               <a:rPr lang="es-ES" smtClean="0"/>
-              <a:t>02/04/2021</a:t>
+              <a:t>16/05/2021</a:t>
             </a:fld>
             <a:endParaRPr lang="es-ES"/>
           </a:p>
@@ -6358,7 +6387,7 @@
           <a:p>
             <a:fld id="{BACAB49F-3C56-4061-AA8F-163AE124D091}" type="datetimeFigureOut">
               <a:rPr lang="es-ES" smtClean="0"/>
-              <a:t>02/04/2021</a:t>
+              <a:t>16/05/2021</a:t>
             </a:fld>
             <a:endParaRPr lang="es-ES"/>
           </a:p>
@@ -6476,7 +6505,7 @@
           <a:p>
             <a:fld id="{BACAB49F-3C56-4061-AA8F-163AE124D091}" type="datetimeFigureOut">
               <a:rPr lang="es-ES" smtClean="0"/>
-              <a:t>02/04/2021</a:t>
+              <a:t>16/05/2021</a:t>
             </a:fld>
             <a:endParaRPr lang="es-ES"/>
           </a:p>
@@ -6571,7 +6600,7 @@
           <a:p>
             <a:fld id="{BACAB49F-3C56-4061-AA8F-163AE124D091}" type="datetimeFigureOut">
               <a:rPr lang="es-ES" smtClean="0"/>
-              <a:t>02/04/2021</a:t>
+              <a:t>16/05/2021</a:t>
             </a:fld>
             <a:endParaRPr lang="es-ES"/>
           </a:p>
@@ -6848,7 +6877,7 @@
           <a:p>
             <a:fld id="{BACAB49F-3C56-4061-AA8F-163AE124D091}" type="datetimeFigureOut">
               <a:rPr lang="es-ES" smtClean="0"/>
-              <a:t>02/04/2021</a:t>
+              <a:t>16/05/2021</a:t>
             </a:fld>
             <a:endParaRPr lang="es-ES"/>
           </a:p>
@@ -7101,7 +7130,7 @@
           <a:p>
             <a:fld id="{BACAB49F-3C56-4061-AA8F-163AE124D091}" type="datetimeFigureOut">
               <a:rPr lang="es-ES" smtClean="0"/>
-              <a:t>02/04/2021</a:t>
+              <a:t>16/05/2021</a:t>
             </a:fld>
             <a:endParaRPr lang="es-ES"/>
           </a:p>
@@ -7314,7 +7343,7 @@
           <a:p>
             <a:fld id="{BACAB49F-3C56-4061-AA8F-163AE124D091}" type="datetimeFigureOut">
               <a:rPr lang="es-ES" smtClean="0"/>
-              <a:t>02/04/2021</a:t>
+              <a:t>16/05/2021</a:t>
             </a:fld>
             <a:endParaRPr lang="es-ES"/>
           </a:p>
@@ -7994,6 +8023,696 @@
 </p:sld>
 </file>
 
+<file path=ppt/slides/slide3.xml><?xml version="1.0" encoding="utf-8"?>
+<p:sld xmlns:a="http://schemas.openxmlformats.org/drawingml/2006/main" xmlns:r="http://schemas.openxmlformats.org/officeDocument/2006/relationships" xmlns:p="http://schemas.openxmlformats.org/presentationml/2006/main">
+  <p:cSld>
+    <p:spTree>
+      <p:nvGrpSpPr>
+        <p:cNvPr id="1" name=""/>
+        <p:cNvGrpSpPr/>
+        <p:nvPr/>
+      </p:nvGrpSpPr>
+      <p:grpSpPr>
+        <a:xfrm>
+          <a:off x="0" y="0"/>
+          <a:ext cx="0" cy="0"/>
+          <a:chOff x="0" y="0"/>
+          <a:chExt cx="0" cy="0"/>
+        </a:xfrm>
+      </p:grpSpPr>
+      <p:pic>
+        <p:nvPicPr>
+          <p:cNvPr id="6" name="Imagen 5"/>
+          <p:cNvPicPr>
+            <a:picLocks noChangeAspect="1"/>
+          </p:cNvPicPr>
+          <p:nvPr/>
+        </p:nvPicPr>
+        <p:blipFill>
+          <a:blip r:embed="rId2" cstate="print">
+            <a:extLst>
+              <a:ext uri="{28A0092B-C50C-407E-A947-70E740481C1C}">
+                <a14:useLocalDpi xmlns:a14="http://schemas.microsoft.com/office/drawing/2010/main" val="0"/>
+              </a:ext>
+            </a:extLst>
+          </a:blip>
+          <a:stretch>
+            <a:fillRect/>
+          </a:stretch>
+        </p:blipFill>
+        <p:spPr>
+          <a:xfrm>
+            <a:off x="863021" y="168906"/>
+            <a:ext cx="727359" cy="831268"/>
+          </a:xfrm>
+          <a:prstGeom prst="rect">
+            <a:avLst/>
+          </a:prstGeom>
+        </p:spPr>
+      </p:pic>
+      <p:pic>
+        <p:nvPicPr>
+          <p:cNvPr id="7" name="Imagen 6"/>
+          <p:cNvPicPr>
+            <a:picLocks noChangeAspect="1"/>
+          </p:cNvPicPr>
+          <p:nvPr/>
+        </p:nvPicPr>
+        <p:blipFill>
+          <a:blip r:embed="rId3" cstate="print">
+            <a:extLst>
+              <a:ext uri="{28A0092B-C50C-407E-A947-70E740481C1C}">
+                <a14:useLocalDpi xmlns:a14="http://schemas.microsoft.com/office/drawing/2010/main" val="0"/>
+              </a:ext>
+            </a:extLst>
+          </a:blip>
+          <a:stretch>
+            <a:fillRect/>
+          </a:stretch>
+        </p:blipFill>
+        <p:spPr>
+          <a:xfrm>
+            <a:off x="788290" y="2464640"/>
+            <a:ext cx="915248" cy="732198"/>
+          </a:xfrm>
+          <a:prstGeom prst="rect">
+            <a:avLst/>
+          </a:prstGeom>
+        </p:spPr>
+      </p:pic>
+      <p:pic>
+        <p:nvPicPr>
+          <p:cNvPr id="8" name="Imagen 7"/>
+          <p:cNvPicPr>
+            <a:picLocks noChangeAspect="1"/>
+          </p:cNvPicPr>
+          <p:nvPr/>
+        </p:nvPicPr>
+        <p:blipFill>
+          <a:blip r:embed="rId4" cstate="print">
+            <a:extLst>
+              <a:ext uri="{28A0092B-C50C-407E-A947-70E740481C1C}">
+                <a14:useLocalDpi xmlns:a14="http://schemas.microsoft.com/office/drawing/2010/main" val="0"/>
+              </a:ext>
+            </a:extLst>
+          </a:blip>
+          <a:stretch>
+            <a:fillRect/>
+          </a:stretch>
+        </p:blipFill>
+        <p:spPr>
+          <a:xfrm>
+            <a:off x="869384" y="3609083"/>
+            <a:ext cx="804230" cy="714871"/>
+          </a:xfrm>
+          <a:prstGeom prst="rect">
+            <a:avLst/>
+          </a:prstGeom>
+        </p:spPr>
+      </p:pic>
+      <p:pic>
+        <p:nvPicPr>
+          <p:cNvPr id="9" name="Imagen 8"/>
+          <p:cNvPicPr>
+            <a:picLocks noChangeAspect="1"/>
+          </p:cNvPicPr>
+          <p:nvPr/>
+        </p:nvPicPr>
+        <p:blipFill>
+          <a:blip r:embed="rId5" cstate="print">
+            <a:extLst>
+              <a:ext uri="{28A0092B-C50C-407E-A947-70E740481C1C}">
+                <a14:useLocalDpi xmlns:a14="http://schemas.microsoft.com/office/drawing/2010/main" val="0"/>
+              </a:ext>
+            </a:extLst>
+          </a:blip>
+          <a:stretch>
+            <a:fillRect/>
+          </a:stretch>
+        </p:blipFill>
+        <p:spPr>
+          <a:xfrm>
+            <a:off x="848798" y="4689359"/>
+            <a:ext cx="815889" cy="815889"/>
+          </a:xfrm>
+          <a:prstGeom prst="rect">
+            <a:avLst/>
+          </a:prstGeom>
+        </p:spPr>
+      </p:pic>
+      <p:pic>
+        <p:nvPicPr>
+          <p:cNvPr id="10" name="Imagen 9"/>
+          <p:cNvPicPr>
+            <a:picLocks noChangeAspect="1"/>
+          </p:cNvPicPr>
+          <p:nvPr/>
+        </p:nvPicPr>
+        <p:blipFill>
+          <a:blip r:embed="rId6" cstate="print">
+            <a:extLst>
+              <a:ext uri="{28A0092B-C50C-407E-A947-70E740481C1C}">
+                <a14:useLocalDpi xmlns:a14="http://schemas.microsoft.com/office/drawing/2010/main" val="0"/>
+              </a:ext>
+            </a:extLst>
+          </a:blip>
+          <a:stretch>
+            <a:fillRect/>
+          </a:stretch>
+        </p:blipFill>
+        <p:spPr>
+          <a:xfrm>
+            <a:off x="774491" y="5769635"/>
+            <a:ext cx="890196" cy="791285"/>
+          </a:xfrm>
+          <a:prstGeom prst="rect">
+            <a:avLst/>
+          </a:prstGeom>
+        </p:spPr>
+      </p:pic>
+      <p:pic>
+        <p:nvPicPr>
+          <p:cNvPr id="11" name="Imagen 10"/>
+          <p:cNvPicPr>
+            <a:picLocks noChangeAspect="1"/>
+          </p:cNvPicPr>
+          <p:nvPr/>
+        </p:nvPicPr>
+        <p:blipFill>
+          <a:blip r:embed="rId7" cstate="print">
+            <a:extLst>
+              <a:ext uri="{28A0092B-C50C-407E-A947-70E740481C1C}">
+                <a14:useLocalDpi xmlns:a14="http://schemas.microsoft.com/office/drawing/2010/main" val="0"/>
+              </a:ext>
+            </a:extLst>
+          </a:blip>
+          <a:stretch>
+            <a:fillRect/>
+          </a:stretch>
+        </p:blipFill>
+        <p:spPr>
+          <a:xfrm>
+            <a:off x="6808937" y="790925"/>
+            <a:ext cx="837875" cy="837875"/>
+          </a:xfrm>
+          <a:prstGeom prst="rect">
+            <a:avLst/>
+          </a:prstGeom>
+        </p:spPr>
+      </p:pic>
+      <p:pic>
+        <p:nvPicPr>
+          <p:cNvPr id="12" name="Imagen 11"/>
+          <p:cNvPicPr>
+            <a:picLocks noChangeAspect="1"/>
+          </p:cNvPicPr>
+          <p:nvPr/>
+        </p:nvPicPr>
+        <p:blipFill>
+          <a:blip r:embed="rId8" cstate="print">
+            <a:extLst>
+              <a:ext uri="{28A0092B-C50C-407E-A947-70E740481C1C}">
+                <a14:useLocalDpi xmlns:a14="http://schemas.microsoft.com/office/drawing/2010/main" val="0"/>
+              </a:ext>
+            </a:extLst>
+          </a:blip>
+          <a:stretch>
+            <a:fillRect/>
+          </a:stretch>
+        </p:blipFill>
+        <p:spPr>
+          <a:xfrm>
+            <a:off x="6860444" y="1946620"/>
+            <a:ext cx="786368" cy="786368"/>
+          </a:xfrm>
+          <a:prstGeom prst="rect">
+            <a:avLst/>
+          </a:prstGeom>
+        </p:spPr>
+      </p:pic>
+      <p:pic>
+        <p:nvPicPr>
+          <p:cNvPr id="13" name="Imagen 12"/>
+          <p:cNvPicPr>
+            <a:picLocks noChangeAspect="1"/>
+          </p:cNvPicPr>
+          <p:nvPr/>
+        </p:nvPicPr>
+        <p:blipFill>
+          <a:blip r:embed="rId9" cstate="print">
+            <a:extLst>
+              <a:ext uri="{28A0092B-C50C-407E-A947-70E740481C1C}">
+                <a14:useLocalDpi xmlns:a14="http://schemas.microsoft.com/office/drawing/2010/main" val="0"/>
+              </a:ext>
+            </a:extLst>
+          </a:blip>
+          <a:stretch>
+            <a:fillRect/>
+          </a:stretch>
+        </p:blipFill>
+        <p:spPr>
+          <a:xfrm>
+            <a:off x="6841780" y="3050808"/>
+            <a:ext cx="805032" cy="805032"/>
+          </a:xfrm>
+          <a:prstGeom prst="rect">
+            <a:avLst/>
+          </a:prstGeom>
+        </p:spPr>
+      </p:pic>
+      <p:pic>
+        <p:nvPicPr>
+          <p:cNvPr id="14" name="Imagen 13"/>
+          <p:cNvPicPr>
+            <a:picLocks noChangeAspect="1"/>
+          </p:cNvPicPr>
+          <p:nvPr/>
+        </p:nvPicPr>
+        <p:blipFill>
+          <a:blip r:embed="rId10" cstate="print">
+            <a:extLst>
+              <a:ext uri="{28A0092B-C50C-407E-A947-70E740481C1C}">
+                <a14:useLocalDpi xmlns:a14="http://schemas.microsoft.com/office/drawing/2010/main" val="0"/>
+              </a:ext>
+            </a:extLst>
+          </a:blip>
+          <a:stretch>
+            <a:fillRect/>
+          </a:stretch>
+        </p:blipFill>
+        <p:spPr>
+          <a:xfrm>
+            <a:off x="6808937" y="5277848"/>
+            <a:ext cx="831937" cy="831937"/>
+          </a:xfrm>
+          <a:prstGeom prst="rect">
+            <a:avLst/>
+          </a:prstGeom>
+        </p:spPr>
+      </p:pic>
+      <p:pic>
+        <p:nvPicPr>
+          <p:cNvPr id="15" name="Imagen 14"/>
+          <p:cNvPicPr>
+            <a:picLocks noChangeAspect="1"/>
+          </p:cNvPicPr>
+          <p:nvPr/>
+        </p:nvPicPr>
+        <p:blipFill>
+          <a:blip r:embed="rId11" cstate="print">
+            <a:extLst>
+              <a:ext uri="{28A0092B-C50C-407E-A947-70E740481C1C}">
+                <a14:useLocalDpi xmlns:a14="http://schemas.microsoft.com/office/drawing/2010/main" val="0"/>
+              </a:ext>
+            </a:extLst>
+          </a:blip>
+          <a:stretch>
+            <a:fillRect/>
+          </a:stretch>
+        </p:blipFill>
+        <p:spPr>
+          <a:xfrm>
+            <a:off x="6777621" y="4173660"/>
+            <a:ext cx="894567" cy="894567"/>
+          </a:xfrm>
+          <a:prstGeom prst="rect">
+            <a:avLst/>
+          </a:prstGeom>
+        </p:spPr>
+      </p:pic>
+      <p:pic>
+        <p:nvPicPr>
+          <p:cNvPr id="16" name="Imagen 15"/>
+          <p:cNvPicPr>
+            <a:picLocks noChangeAspect="1"/>
+          </p:cNvPicPr>
+          <p:nvPr/>
+        </p:nvPicPr>
+        <p:blipFill>
+          <a:blip r:embed="rId12" cstate="print">
+            <a:extLst>
+              <a:ext uri="{28A0092B-C50C-407E-A947-70E740481C1C}">
+                <a14:useLocalDpi xmlns:a14="http://schemas.microsoft.com/office/drawing/2010/main" val="0"/>
+              </a:ext>
+            </a:extLst>
+          </a:blip>
+          <a:stretch>
+            <a:fillRect/>
+          </a:stretch>
+        </p:blipFill>
+        <p:spPr>
+          <a:xfrm>
+            <a:off x="788290" y="1239740"/>
+            <a:ext cx="876822" cy="876822"/>
+          </a:xfrm>
+          <a:prstGeom prst="rect">
+            <a:avLst/>
+          </a:prstGeom>
+        </p:spPr>
+      </p:pic>
+      <p:sp>
+        <p:nvSpPr>
+          <p:cNvPr id="17" name="CuadroTexto 16"/>
+          <p:cNvSpPr txBox="1"/>
+          <p:nvPr/>
+        </p:nvSpPr>
+        <p:spPr>
+          <a:xfrm>
+            <a:off x="8134373" y="779723"/>
+            <a:ext cx="1164101" cy="584775"/>
+          </a:xfrm>
+          <a:prstGeom prst="rect">
+            <a:avLst/>
+          </a:prstGeom>
+          <a:noFill/>
+        </p:spPr>
+        <p:txBody>
+          <a:bodyPr wrap="none" rtlCol="0">
+            <a:spAutoFit/>
+          </a:bodyPr>
+          <a:lstStyle/>
+          <a:p>
+            <a:r>
+              <a:rPr lang="es-ES" sz="3200" dirty="0" smtClean="0"/>
+              <a:t>Carne</a:t>
+            </a:r>
+            <a:endParaRPr lang="es-ES" sz="3200" dirty="0"/>
+          </a:p>
+        </p:txBody>
+      </p:sp>
+      <p:sp>
+        <p:nvSpPr>
+          <p:cNvPr id="18" name="CuadroTexto 17"/>
+          <p:cNvSpPr txBox="1"/>
+          <p:nvPr/>
+        </p:nvSpPr>
+        <p:spPr>
+          <a:xfrm>
+            <a:off x="2250226" y="5872889"/>
+            <a:ext cx="1551643" cy="584775"/>
+          </a:xfrm>
+          <a:prstGeom prst="rect">
+            <a:avLst/>
+          </a:prstGeom>
+          <a:noFill/>
+        </p:spPr>
+        <p:txBody>
+          <a:bodyPr wrap="none" rtlCol="0">
+            <a:spAutoFit/>
+          </a:bodyPr>
+          <a:lstStyle/>
+          <a:p>
+            <a:r>
+              <a:rPr lang="es-ES" sz="3200" dirty="0" smtClean="0"/>
+              <a:t>Pescado</a:t>
+            </a:r>
+            <a:endParaRPr lang="es-ES" sz="3200" dirty="0"/>
+          </a:p>
+        </p:txBody>
+      </p:sp>
+      <p:sp>
+        <p:nvSpPr>
+          <p:cNvPr id="19" name="CuadroTexto 18"/>
+          <p:cNvSpPr txBox="1"/>
+          <p:nvPr/>
+        </p:nvSpPr>
+        <p:spPr>
+          <a:xfrm>
+            <a:off x="2250226" y="3696673"/>
+            <a:ext cx="2542491" cy="584775"/>
+          </a:xfrm>
+          <a:prstGeom prst="rect">
+            <a:avLst/>
+          </a:prstGeom>
+          <a:noFill/>
+        </p:spPr>
+        <p:txBody>
+          <a:bodyPr wrap="none" rtlCol="0">
+            <a:spAutoFit/>
+          </a:bodyPr>
+          <a:lstStyle/>
+          <a:p>
+            <a:r>
+              <a:rPr lang="es-ES" sz="3200" dirty="0" smtClean="0"/>
+              <a:t>Carbohidratos</a:t>
+            </a:r>
+            <a:endParaRPr lang="es-ES" sz="3200" dirty="0"/>
+          </a:p>
+        </p:txBody>
+      </p:sp>
+      <p:sp>
+        <p:nvSpPr>
+          <p:cNvPr id="20" name="CuadroTexto 19"/>
+          <p:cNvSpPr txBox="1"/>
+          <p:nvPr/>
+        </p:nvSpPr>
+        <p:spPr>
+          <a:xfrm>
+            <a:off x="2238691" y="2474604"/>
+            <a:ext cx="1495922" cy="584775"/>
+          </a:xfrm>
+          <a:prstGeom prst="rect">
+            <a:avLst/>
+          </a:prstGeom>
+          <a:noFill/>
+        </p:spPr>
+        <p:txBody>
+          <a:bodyPr wrap="none" rtlCol="0">
+            <a:spAutoFit/>
+          </a:bodyPr>
+          <a:lstStyle/>
+          <a:p>
+            <a:r>
+              <a:rPr lang="es-ES" sz="3200" dirty="0" smtClean="0"/>
+              <a:t>Bebidas</a:t>
+            </a:r>
+            <a:endParaRPr lang="es-ES" sz="3200" dirty="0"/>
+          </a:p>
+        </p:txBody>
+      </p:sp>
+      <p:sp>
+        <p:nvSpPr>
+          <p:cNvPr id="21" name="CuadroTexto 20"/>
+          <p:cNvSpPr txBox="1"/>
+          <p:nvPr/>
+        </p:nvSpPr>
+        <p:spPr>
+          <a:xfrm>
+            <a:off x="2202618" y="1255669"/>
+            <a:ext cx="1884811" cy="584775"/>
+          </a:xfrm>
+          <a:prstGeom prst="rect">
+            <a:avLst/>
+          </a:prstGeom>
+          <a:noFill/>
+        </p:spPr>
+        <p:txBody>
+          <a:bodyPr wrap="none" rtlCol="0">
+            <a:spAutoFit/>
+          </a:bodyPr>
+          <a:lstStyle/>
+          <a:p>
+            <a:r>
+              <a:rPr lang="es-ES" sz="3200" dirty="0" smtClean="0"/>
+              <a:t>Conservas</a:t>
+            </a:r>
+            <a:endParaRPr lang="es-ES" sz="3200" dirty="0"/>
+          </a:p>
+        </p:txBody>
+      </p:sp>
+      <p:sp>
+        <p:nvSpPr>
+          <p:cNvPr id="22" name="CuadroTexto 21"/>
+          <p:cNvSpPr txBox="1"/>
+          <p:nvPr/>
+        </p:nvSpPr>
+        <p:spPr>
+          <a:xfrm>
+            <a:off x="2250226" y="292152"/>
+            <a:ext cx="1062920" cy="584775"/>
+          </a:xfrm>
+          <a:prstGeom prst="rect">
+            <a:avLst/>
+          </a:prstGeom>
+          <a:noFill/>
+        </p:spPr>
+        <p:txBody>
+          <a:bodyPr wrap="none" rtlCol="0">
+            <a:spAutoFit/>
+          </a:bodyPr>
+          <a:lstStyle/>
+          <a:p>
+            <a:r>
+              <a:rPr lang="es-ES" sz="3200" dirty="0" smtClean="0"/>
+              <a:t>Fruta</a:t>
+            </a:r>
+            <a:endParaRPr lang="es-ES" sz="3200" dirty="0"/>
+          </a:p>
+        </p:txBody>
+      </p:sp>
+      <p:sp>
+        <p:nvSpPr>
+          <p:cNvPr id="23" name="CuadroTexto 22"/>
+          <p:cNvSpPr txBox="1"/>
+          <p:nvPr/>
+        </p:nvSpPr>
+        <p:spPr>
+          <a:xfrm>
+            <a:off x="2254684" y="4884352"/>
+            <a:ext cx="1780680" cy="584775"/>
+          </a:xfrm>
+          <a:prstGeom prst="rect">
+            <a:avLst/>
+          </a:prstGeom>
+          <a:noFill/>
+        </p:spPr>
+        <p:txBody>
+          <a:bodyPr wrap="none" rtlCol="0">
+            <a:spAutoFit/>
+          </a:bodyPr>
+          <a:lstStyle/>
+          <a:p>
+            <a:r>
+              <a:rPr lang="es-ES" sz="3200" dirty="0" smtClean="0"/>
+              <a:t>Vegetales</a:t>
+            </a:r>
+            <a:endParaRPr lang="es-ES" sz="3200" dirty="0"/>
+          </a:p>
+        </p:txBody>
+      </p:sp>
+      <p:sp>
+        <p:nvSpPr>
+          <p:cNvPr id="24" name="CuadroTexto 23"/>
+          <p:cNvSpPr txBox="1"/>
+          <p:nvPr/>
+        </p:nvSpPr>
+        <p:spPr>
+          <a:xfrm>
+            <a:off x="8161282" y="1946620"/>
+            <a:ext cx="2017925" cy="584775"/>
+          </a:xfrm>
+          <a:prstGeom prst="rect">
+            <a:avLst/>
+          </a:prstGeom>
+          <a:noFill/>
+        </p:spPr>
+        <p:txBody>
+          <a:bodyPr wrap="none" rtlCol="0">
+            <a:spAutoFit/>
+          </a:bodyPr>
+          <a:lstStyle/>
+          <a:p>
+            <a:r>
+              <a:rPr lang="es-ES" sz="3200" dirty="0" smtClean="0"/>
+              <a:t>Legumbres</a:t>
+            </a:r>
+            <a:endParaRPr lang="es-ES" sz="3200" dirty="0"/>
+          </a:p>
+        </p:txBody>
+      </p:sp>
+      <p:sp>
+        <p:nvSpPr>
+          <p:cNvPr id="25" name="CuadroTexto 24"/>
+          <p:cNvSpPr txBox="1"/>
+          <p:nvPr/>
+        </p:nvSpPr>
+        <p:spPr>
+          <a:xfrm>
+            <a:off x="8175331" y="3203850"/>
+            <a:ext cx="1441805" cy="584775"/>
+          </a:xfrm>
+          <a:prstGeom prst="rect">
+            <a:avLst/>
+          </a:prstGeom>
+          <a:noFill/>
+        </p:spPr>
+        <p:txBody>
+          <a:bodyPr wrap="none" rtlCol="0">
+            <a:spAutoFit/>
+          </a:bodyPr>
+          <a:lstStyle/>
+          <a:p>
+            <a:r>
+              <a:rPr lang="es-ES" sz="3200" dirty="0" smtClean="0"/>
+              <a:t>Lácteos</a:t>
+            </a:r>
+            <a:endParaRPr lang="es-ES" sz="3200" dirty="0"/>
+          </a:p>
+        </p:txBody>
+      </p:sp>
+      <p:sp>
+        <p:nvSpPr>
+          <p:cNvPr id="26" name="CuadroTexto 25"/>
+          <p:cNvSpPr txBox="1"/>
+          <p:nvPr/>
+        </p:nvSpPr>
+        <p:spPr>
+          <a:xfrm>
+            <a:off x="8175331" y="4323954"/>
+            <a:ext cx="1285929" cy="584775"/>
+          </a:xfrm>
+          <a:prstGeom prst="rect">
+            <a:avLst/>
+          </a:prstGeom>
+          <a:noFill/>
+        </p:spPr>
+        <p:txBody>
+          <a:bodyPr wrap="none" rtlCol="0">
+            <a:spAutoFit/>
+          </a:bodyPr>
+          <a:lstStyle/>
+          <a:p>
+            <a:r>
+              <a:rPr lang="es-ES" sz="3200" dirty="0" smtClean="0"/>
+              <a:t>Dulces</a:t>
+            </a:r>
+            <a:endParaRPr lang="es-ES" sz="3200" dirty="0"/>
+          </a:p>
+        </p:txBody>
+      </p:sp>
+      <p:sp>
+        <p:nvSpPr>
+          <p:cNvPr id="27" name="CuadroTexto 26"/>
+          <p:cNvSpPr txBox="1"/>
+          <p:nvPr/>
+        </p:nvSpPr>
+        <p:spPr>
+          <a:xfrm>
+            <a:off x="8190670" y="5444058"/>
+            <a:ext cx="1107804" cy="584775"/>
+          </a:xfrm>
+          <a:prstGeom prst="rect">
+            <a:avLst/>
+          </a:prstGeom>
+          <a:noFill/>
+        </p:spPr>
+        <p:txBody>
+          <a:bodyPr wrap="none" rtlCol="0">
+            <a:spAutoFit/>
+          </a:bodyPr>
+          <a:lstStyle/>
+          <a:p>
+            <a:r>
+              <a:rPr lang="es-ES" sz="3200" dirty="0" smtClean="0"/>
+              <a:t>Otros</a:t>
+            </a:r>
+            <a:endParaRPr lang="es-ES" sz="3200" dirty="0"/>
+          </a:p>
+        </p:txBody>
+      </p:sp>
+    </p:spTree>
+    <p:extLst>
+      <p:ext uri="{BB962C8B-B14F-4D97-AF65-F5344CB8AC3E}">
+        <p14:creationId xmlns:p14="http://schemas.microsoft.com/office/powerpoint/2010/main" val="1881496063"/>
+      </p:ext>
+    </p:extLst>
+  </p:cSld>
+  <p:clrMapOvr>
+    <a:masterClrMapping/>
+  </p:clrMapOvr>
+</p:sld>
+</file>
+
 <file path=ppt/theme/theme1.xml><?xml version="1.0" encoding="utf-8"?>
 <a:theme xmlns:a="http://schemas.openxmlformats.org/drawingml/2006/main" name="Tema de Office">
   <a:themeElements>

</xml_diff>

<commit_message>
Auto stash before merge of "developer" and "origin/developer"
</commit_message>
<xml_diff>
--- a/Infografias.pptx
+++ b/Infografias.pptx
@@ -2786,755 +2786,6 @@
       <dsp:cNvGrpSpPr/>
     </dsp:nvGrpSpPr>
     <dsp:grpSpPr/>
-    <dsp:sp modelId="{E6803CD7-0CDA-41E6-8A33-26BEDB2B5354}">
-      <dsp:nvSpPr>
-        <dsp:cNvPr id="0" name=""/>
-        <dsp:cNvSpPr/>
-      </dsp:nvSpPr>
-      <dsp:spPr>
-        <a:xfrm rot="5400000">
-          <a:off x="1279256" y="949999"/>
-          <a:ext cx="826770" cy="941248"/>
-        </a:xfrm>
-        <a:prstGeom prst="bentUpArrow">
-          <a:avLst>
-            <a:gd name="adj1" fmla="val 32840"/>
-            <a:gd name="adj2" fmla="val 25000"/>
-            <a:gd name="adj3" fmla="val 35780"/>
-          </a:avLst>
-        </a:prstGeom>
-        <a:solidFill>
-          <a:schemeClr val="accent5">
-            <a:tint val="40000"/>
-            <a:hueOff val="0"/>
-            <a:satOff val="0"/>
-            <a:lumOff val="0"/>
-            <a:alphaOff val="0"/>
-          </a:schemeClr>
-        </a:solidFill>
-        <a:ln w="12700" cap="flat" cmpd="sng" algn="ctr">
-          <a:solidFill>
-            <a:schemeClr val="accent5">
-              <a:shade val="80000"/>
-              <a:hueOff val="0"/>
-              <a:satOff val="0"/>
-              <a:lumOff val="0"/>
-              <a:alphaOff val="0"/>
-            </a:schemeClr>
-          </a:solidFill>
-          <a:prstDash val="solid"/>
-          <a:miter lim="800000"/>
-        </a:ln>
-        <a:effectLst/>
-      </dsp:spPr>
-      <dsp:style>
-        <a:lnRef idx="2">
-          <a:scrgbClr r="0" g="0" b="0"/>
-        </a:lnRef>
-        <a:fillRef idx="1">
-          <a:scrgbClr r="0" g="0" b="0"/>
-        </a:fillRef>
-        <a:effectRef idx="0">
-          <a:scrgbClr r="0" g="0" b="0"/>
-        </a:effectRef>
-        <a:fontRef idx="minor"/>
-      </dsp:style>
-    </dsp:sp>
-    <dsp:sp modelId="{2BA88272-170E-4935-B77F-F5F1143295AA}">
-      <dsp:nvSpPr>
-        <dsp:cNvPr id="0" name=""/>
-        <dsp:cNvSpPr/>
-      </dsp:nvSpPr>
-      <dsp:spPr>
-        <a:xfrm>
-          <a:off x="1060212" y="33507"/>
-          <a:ext cx="1391794" cy="974210"/>
-        </a:xfrm>
-        <a:prstGeom prst="roundRect">
-          <a:avLst>
-            <a:gd name="adj" fmla="val 16670"/>
-          </a:avLst>
-        </a:prstGeom>
-        <a:solidFill>
-          <a:schemeClr val="lt1">
-            <a:hueOff val="0"/>
-            <a:satOff val="0"/>
-            <a:lumOff val="0"/>
-            <a:alphaOff val="0"/>
-          </a:schemeClr>
-        </a:solidFill>
-        <a:ln w="12700" cap="flat" cmpd="sng" algn="ctr">
-          <a:solidFill>
-            <a:schemeClr val="accent5">
-              <a:shade val="80000"/>
-              <a:hueOff val="0"/>
-              <a:satOff val="0"/>
-              <a:lumOff val="0"/>
-              <a:alphaOff val="0"/>
-            </a:schemeClr>
-          </a:solidFill>
-          <a:prstDash val="solid"/>
-          <a:miter lim="800000"/>
-        </a:ln>
-        <a:effectLst/>
-      </dsp:spPr>
-      <dsp:style>
-        <a:lnRef idx="2">
-          <a:scrgbClr r="0" g="0" b="0"/>
-        </a:lnRef>
-        <a:fillRef idx="1">
-          <a:scrgbClr r="0" g="0" b="0"/>
-        </a:fillRef>
-        <a:effectRef idx="0">
-          <a:scrgbClr r="0" g="0" b="0"/>
-        </a:effectRef>
-        <a:fontRef idx="minor">
-          <a:schemeClr val="lt1"/>
-        </a:fontRef>
-      </dsp:style>
-      <dsp:txBody>
-        <a:bodyPr spcFirstLastPara="0" vert="horz" wrap="square" lIns="53340" tIns="53340" rIns="53340" bIns="53340" numCol="1" spcCol="1270" anchor="ctr" anchorCtr="0">
-          <a:noAutofit/>
-        </a:bodyPr>
-        <a:lstStyle/>
-        <a:p>
-          <a:pPr lvl="0" algn="ctr" defTabSz="622300">
-            <a:lnSpc>
-              <a:spcPct val="90000"/>
-            </a:lnSpc>
-            <a:spcBef>
-              <a:spcPct val="0"/>
-            </a:spcBef>
-            <a:spcAft>
-              <a:spcPct val="35000"/>
-            </a:spcAft>
-          </a:pPr>
-          <a:r>
-            <a:rPr lang="es-ES" sz="1400" kern="1200" dirty="0" smtClean="0"/>
-            <a:t>Requisitos software</a:t>
-          </a:r>
-          <a:endParaRPr lang="es-ES" sz="1400" kern="1200" dirty="0"/>
-        </a:p>
-      </dsp:txBody>
-      <dsp:txXfrm>
-        <a:off x="1107778" y="81073"/>
-        <a:ext cx="1296662" cy="879078"/>
-      </dsp:txXfrm>
-    </dsp:sp>
-    <dsp:sp modelId="{0B3B84AC-938F-457C-909B-F66ED71EB7B4}">
-      <dsp:nvSpPr>
-        <dsp:cNvPr id="0" name=""/>
-        <dsp:cNvSpPr/>
-      </dsp:nvSpPr>
-      <dsp:spPr>
-        <a:xfrm>
-          <a:off x="2452006" y="126421"/>
-          <a:ext cx="1012258" cy="787400"/>
-        </a:xfrm>
-        <a:prstGeom prst="rect">
-          <a:avLst/>
-        </a:prstGeom>
-        <a:noFill/>
-        <a:ln>
-          <a:noFill/>
-        </a:ln>
-        <a:effectLst/>
-      </dsp:spPr>
-      <dsp:style>
-        <a:lnRef idx="0">
-          <a:scrgbClr r="0" g="0" b="0"/>
-        </a:lnRef>
-        <a:fillRef idx="0">
-          <a:scrgbClr r="0" g="0" b="0"/>
-        </a:fillRef>
-        <a:effectRef idx="0">
-          <a:scrgbClr r="0" g="0" b="0"/>
-        </a:effectRef>
-        <a:fontRef idx="minor"/>
-      </dsp:style>
-    </dsp:sp>
-    <dsp:sp modelId="{AAA495A4-53F0-4EAB-B19C-378C608EA8AD}">
-      <dsp:nvSpPr>
-        <dsp:cNvPr id="0" name=""/>
-        <dsp:cNvSpPr/>
-      </dsp:nvSpPr>
-      <dsp:spPr>
-        <a:xfrm rot="5400000">
-          <a:off x="2433201" y="2044359"/>
-          <a:ext cx="826770" cy="941248"/>
-        </a:xfrm>
-        <a:prstGeom prst="bentUpArrow">
-          <a:avLst>
-            <a:gd name="adj1" fmla="val 32840"/>
-            <a:gd name="adj2" fmla="val 25000"/>
-            <a:gd name="adj3" fmla="val 35780"/>
-          </a:avLst>
-        </a:prstGeom>
-        <a:solidFill>
-          <a:schemeClr val="accent5">
-            <a:tint val="40000"/>
-            <a:hueOff val="0"/>
-            <a:satOff val="0"/>
-            <a:lumOff val="0"/>
-            <a:alphaOff val="0"/>
-          </a:schemeClr>
-        </a:solidFill>
-        <a:ln w="12700" cap="flat" cmpd="sng" algn="ctr">
-          <a:solidFill>
-            <a:schemeClr val="accent5">
-              <a:shade val="80000"/>
-              <a:hueOff val="0"/>
-              <a:satOff val="0"/>
-              <a:lumOff val="0"/>
-              <a:alphaOff val="0"/>
-            </a:schemeClr>
-          </a:solidFill>
-          <a:prstDash val="solid"/>
-          <a:miter lim="800000"/>
-        </a:ln>
-        <a:effectLst/>
-      </dsp:spPr>
-      <dsp:style>
-        <a:lnRef idx="2">
-          <a:scrgbClr r="0" g="0" b="0"/>
-        </a:lnRef>
-        <a:fillRef idx="1">
-          <a:scrgbClr r="0" g="0" b="0"/>
-        </a:fillRef>
-        <a:effectRef idx="0">
-          <a:scrgbClr r="0" g="0" b="0"/>
-        </a:effectRef>
-        <a:fontRef idx="minor"/>
-      </dsp:style>
-    </dsp:sp>
-    <dsp:sp modelId="{699E7647-938C-4444-9B23-7D8CA3770712}">
-      <dsp:nvSpPr>
-        <dsp:cNvPr id="0" name=""/>
-        <dsp:cNvSpPr/>
-      </dsp:nvSpPr>
-      <dsp:spPr>
-        <a:xfrm>
-          <a:off x="2214157" y="1127868"/>
-          <a:ext cx="1391794" cy="974210"/>
-        </a:xfrm>
-        <a:prstGeom prst="roundRect">
-          <a:avLst>
-            <a:gd name="adj" fmla="val 16670"/>
-          </a:avLst>
-        </a:prstGeom>
-        <a:solidFill>
-          <a:schemeClr val="lt1">
-            <a:hueOff val="0"/>
-            <a:satOff val="0"/>
-            <a:lumOff val="0"/>
-            <a:alphaOff val="0"/>
-          </a:schemeClr>
-        </a:solidFill>
-        <a:ln w="12700" cap="flat" cmpd="sng" algn="ctr">
-          <a:solidFill>
-            <a:schemeClr val="accent5">
-              <a:shade val="80000"/>
-              <a:hueOff val="0"/>
-              <a:satOff val="0"/>
-              <a:lumOff val="0"/>
-              <a:alphaOff val="0"/>
-            </a:schemeClr>
-          </a:solidFill>
-          <a:prstDash val="solid"/>
-          <a:miter lim="800000"/>
-        </a:ln>
-        <a:effectLst/>
-      </dsp:spPr>
-      <dsp:style>
-        <a:lnRef idx="2">
-          <a:scrgbClr r="0" g="0" b="0"/>
-        </a:lnRef>
-        <a:fillRef idx="1">
-          <a:scrgbClr r="0" g="0" b="0"/>
-        </a:fillRef>
-        <a:effectRef idx="0">
-          <a:scrgbClr r="0" g="0" b="0"/>
-        </a:effectRef>
-        <a:fontRef idx="minor">
-          <a:schemeClr val="lt1"/>
-        </a:fontRef>
-      </dsp:style>
-      <dsp:txBody>
-        <a:bodyPr spcFirstLastPara="0" vert="horz" wrap="square" lIns="53340" tIns="53340" rIns="53340" bIns="53340" numCol="1" spcCol="1270" anchor="ctr" anchorCtr="0">
-          <a:noAutofit/>
-        </a:bodyPr>
-        <a:lstStyle/>
-        <a:p>
-          <a:pPr lvl="0" algn="ctr" defTabSz="622300">
-            <a:lnSpc>
-              <a:spcPct val="90000"/>
-            </a:lnSpc>
-            <a:spcBef>
-              <a:spcPct val="0"/>
-            </a:spcBef>
-            <a:spcAft>
-              <a:spcPct val="35000"/>
-            </a:spcAft>
-          </a:pPr>
-          <a:r>
-            <a:rPr lang="es-ES" sz="1400" kern="1200" dirty="0" smtClean="0"/>
-            <a:t>Diseño</a:t>
-          </a:r>
-          <a:endParaRPr lang="es-ES" sz="1400" kern="1200" dirty="0"/>
-        </a:p>
-      </dsp:txBody>
-      <dsp:txXfrm>
-        <a:off x="2261723" y="1175434"/>
-        <a:ext cx="1296662" cy="879078"/>
-      </dsp:txXfrm>
-    </dsp:sp>
-    <dsp:sp modelId="{632DA3B5-B0F2-494F-B9FC-1542F9C589D4}">
-      <dsp:nvSpPr>
-        <dsp:cNvPr id="0" name=""/>
-        <dsp:cNvSpPr/>
-      </dsp:nvSpPr>
-      <dsp:spPr>
-        <a:xfrm>
-          <a:off x="3605951" y="1220781"/>
-          <a:ext cx="1012258" cy="787400"/>
-        </a:xfrm>
-        <a:prstGeom prst="rect">
-          <a:avLst/>
-        </a:prstGeom>
-        <a:noFill/>
-        <a:ln>
-          <a:noFill/>
-        </a:ln>
-        <a:effectLst/>
-      </dsp:spPr>
-      <dsp:style>
-        <a:lnRef idx="0">
-          <a:scrgbClr r="0" g="0" b="0"/>
-        </a:lnRef>
-        <a:fillRef idx="0">
-          <a:scrgbClr r="0" g="0" b="0"/>
-        </a:fillRef>
-        <a:effectRef idx="0">
-          <a:scrgbClr r="0" g="0" b="0"/>
-        </a:effectRef>
-        <a:fontRef idx="minor"/>
-      </dsp:style>
-    </dsp:sp>
-    <dsp:sp modelId="{8707CF70-2BA9-4284-A502-2BDF75A51BE6}">
-      <dsp:nvSpPr>
-        <dsp:cNvPr id="0" name=""/>
-        <dsp:cNvSpPr/>
-      </dsp:nvSpPr>
-      <dsp:spPr>
-        <a:xfrm rot="5400000">
-          <a:off x="3587146" y="3138719"/>
-          <a:ext cx="826770" cy="941248"/>
-        </a:xfrm>
-        <a:prstGeom prst="bentUpArrow">
-          <a:avLst>
-            <a:gd name="adj1" fmla="val 32840"/>
-            <a:gd name="adj2" fmla="val 25000"/>
-            <a:gd name="adj3" fmla="val 35780"/>
-          </a:avLst>
-        </a:prstGeom>
-        <a:solidFill>
-          <a:schemeClr val="accent5">
-            <a:tint val="40000"/>
-            <a:hueOff val="0"/>
-            <a:satOff val="0"/>
-            <a:lumOff val="0"/>
-            <a:alphaOff val="0"/>
-          </a:schemeClr>
-        </a:solidFill>
-        <a:ln w="12700" cap="flat" cmpd="sng" algn="ctr">
-          <a:solidFill>
-            <a:schemeClr val="accent5">
-              <a:shade val="80000"/>
-              <a:hueOff val="0"/>
-              <a:satOff val="0"/>
-              <a:lumOff val="0"/>
-              <a:alphaOff val="0"/>
-            </a:schemeClr>
-          </a:solidFill>
-          <a:prstDash val="solid"/>
-          <a:miter lim="800000"/>
-        </a:ln>
-        <a:effectLst/>
-      </dsp:spPr>
-      <dsp:style>
-        <a:lnRef idx="2">
-          <a:scrgbClr r="0" g="0" b="0"/>
-        </a:lnRef>
-        <a:fillRef idx="1">
-          <a:scrgbClr r="0" g="0" b="0"/>
-        </a:fillRef>
-        <a:effectRef idx="0">
-          <a:scrgbClr r="0" g="0" b="0"/>
-        </a:effectRef>
-        <a:fontRef idx="minor"/>
-      </dsp:style>
-    </dsp:sp>
-    <dsp:sp modelId="{C5B5DBD7-56DE-4B46-8EC5-F2AD05812196}">
-      <dsp:nvSpPr>
-        <dsp:cNvPr id="0" name=""/>
-        <dsp:cNvSpPr/>
-      </dsp:nvSpPr>
-      <dsp:spPr>
-        <a:xfrm>
-          <a:off x="3368102" y="2222228"/>
-          <a:ext cx="1391794" cy="974210"/>
-        </a:xfrm>
-        <a:prstGeom prst="roundRect">
-          <a:avLst>
-            <a:gd name="adj" fmla="val 16670"/>
-          </a:avLst>
-        </a:prstGeom>
-        <a:solidFill>
-          <a:schemeClr val="lt1">
-            <a:hueOff val="0"/>
-            <a:satOff val="0"/>
-            <a:lumOff val="0"/>
-            <a:alphaOff val="0"/>
-          </a:schemeClr>
-        </a:solidFill>
-        <a:ln w="12700" cap="flat" cmpd="sng" algn="ctr">
-          <a:solidFill>
-            <a:schemeClr val="accent5">
-              <a:shade val="80000"/>
-              <a:hueOff val="0"/>
-              <a:satOff val="0"/>
-              <a:lumOff val="0"/>
-              <a:alphaOff val="0"/>
-            </a:schemeClr>
-          </a:solidFill>
-          <a:prstDash val="solid"/>
-          <a:miter lim="800000"/>
-        </a:ln>
-        <a:effectLst/>
-      </dsp:spPr>
-      <dsp:style>
-        <a:lnRef idx="2">
-          <a:scrgbClr r="0" g="0" b="0"/>
-        </a:lnRef>
-        <a:fillRef idx="1">
-          <a:scrgbClr r="0" g="0" b="0"/>
-        </a:fillRef>
-        <a:effectRef idx="0">
-          <a:scrgbClr r="0" g="0" b="0"/>
-        </a:effectRef>
-        <a:fontRef idx="minor">
-          <a:schemeClr val="lt1"/>
-        </a:fontRef>
-      </dsp:style>
-      <dsp:txBody>
-        <a:bodyPr spcFirstLastPara="0" vert="horz" wrap="square" lIns="53340" tIns="53340" rIns="53340" bIns="53340" numCol="1" spcCol="1270" anchor="ctr" anchorCtr="0">
-          <a:noAutofit/>
-        </a:bodyPr>
-        <a:lstStyle/>
-        <a:p>
-          <a:pPr lvl="0" algn="ctr" defTabSz="622300">
-            <a:lnSpc>
-              <a:spcPct val="90000"/>
-            </a:lnSpc>
-            <a:spcBef>
-              <a:spcPct val="0"/>
-            </a:spcBef>
-            <a:spcAft>
-              <a:spcPct val="35000"/>
-            </a:spcAft>
-          </a:pPr>
-          <a:r>
-            <a:rPr lang="es-ES" sz="1400" kern="1200" dirty="0" smtClean="0"/>
-            <a:t>Implementación</a:t>
-          </a:r>
-          <a:endParaRPr lang="es-ES" sz="1400" kern="1200" dirty="0"/>
-        </a:p>
-      </dsp:txBody>
-      <dsp:txXfrm>
-        <a:off x="3415668" y="2269794"/>
-        <a:ext cx="1296662" cy="879078"/>
-      </dsp:txXfrm>
-    </dsp:sp>
-    <dsp:sp modelId="{3A3633D6-FB12-461F-8612-F6270D66E58E}">
-      <dsp:nvSpPr>
-        <dsp:cNvPr id="0" name=""/>
-        <dsp:cNvSpPr/>
-      </dsp:nvSpPr>
-      <dsp:spPr>
-        <a:xfrm>
-          <a:off x="4759897" y="2315141"/>
-          <a:ext cx="1012258" cy="787400"/>
-        </a:xfrm>
-        <a:prstGeom prst="rect">
-          <a:avLst/>
-        </a:prstGeom>
-        <a:noFill/>
-        <a:ln>
-          <a:noFill/>
-        </a:ln>
-        <a:effectLst/>
-      </dsp:spPr>
-      <dsp:style>
-        <a:lnRef idx="0">
-          <a:scrgbClr r="0" g="0" b="0"/>
-        </a:lnRef>
-        <a:fillRef idx="0">
-          <a:scrgbClr r="0" g="0" b="0"/>
-        </a:fillRef>
-        <a:effectRef idx="0">
-          <a:scrgbClr r="0" g="0" b="0"/>
-        </a:effectRef>
-        <a:fontRef idx="minor"/>
-      </dsp:style>
-    </dsp:sp>
-    <dsp:sp modelId="{1E3EC8DE-3BF6-494A-8A88-200D6A6133F0}">
-      <dsp:nvSpPr>
-        <dsp:cNvPr id="0" name=""/>
-        <dsp:cNvSpPr/>
-      </dsp:nvSpPr>
-      <dsp:spPr>
-        <a:xfrm rot="5400000">
-          <a:off x="4741091" y="4233079"/>
-          <a:ext cx="826770" cy="941248"/>
-        </a:xfrm>
-        <a:prstGeom prst="bentUpArrow">
-          <a:avLst>
-            <a:gd name="adj1" fmla="val 32840"/>
-            <a:gd name="adj2" fmla="val 25000"/>
-            <a:gd name="adj3" fmla="val 35780"/>
-          </a:avLst>
-        </a:prstGeom>
-        <a:solidFill>
-          <a:schemeClr val="accent5">
-            <a:tint val="40000"/>
-            <a:hueOff val="0"/>
-            <a:satOff val="0"/>
-            <a:lumOff val="0"/>
-            <a:alphaOff val="0"/>
-          </a:schemeClr>
-        </a:solidFill>
-        <a:ln w="12700" cap="flat" cmpd="sng" algn="ctr">
-          <a:solidFill>
-            <a:schemeClr val="accent5">
-              <a:shade val="80000"/>
-              <a:hueOff val="0"/>
-              <a:satOff val="0"/>
-              <a:lumOff val="0"/>
-              <a:alphaOff val="0"/>
-            </a:schemeClr>
-          </a:solidFill>
-          <a:prstDash val="solid"/>
-          <a:miter lim="800000"/>
-        </a:ln>
-        <a:effectLst/>
-      </dsp:spPr>
-      <dsp:style>
-        <a:lnRef idx="2">
-          <a:scrgbClr r="0" g="0" b="0"/>
-        </a:lnRef>
-        <a:fillRef idx="1">
-          <a:scrgbClr r="0" g="0" b="0"/>
-        </a:fillRef>
-        <a:effectRef idx="0">
-          <a:scrgbClr r="0" g="0" b="0"/>
-        </a:effectRef>
-        <a:fontRef idx="minor"/>
-      </dsp:style>
-    </dsp:sp>
-    <dsp:sp modelId="{6371D646-3A5B-42D7-9009-C5E5A3E1EC2B}">
-      <dsp:nvSpPr>
-        <dsp:cNvPr id="0" name=""/>
-        <dsp:cNvSpPr/>
-      </dsp:nvSpPr>
-      <dsp:spPr>
-        <a:xfrm>
-          <a:off x="4522048" y="3316588"/>
-          <a:ext cx="1391794" cy="974210"/>
-        </a:xfrm>
-        <a:prstGeom prst="roundRect">
-          <a:avLst>
-            <a:gd name="adj" fmla="val 16670"/>
-          </a:avLst>
-        </a:prstGeom>
-        <a:solidFill>
-          <a:schemeClr val="lt1">
-            <a:hueOff val="0"/>
-            <a:satOff val="0"/>
-            <a:lumOff val="0"/>
-            <a:alphaOff val="0"/>
-          </a:schemeClr>
-        </a:solidFill>
-        <a:ln w="12700" cap="flat" cmpd="sng" algn="ctr">
-          <a:solidFill>
-            <a:schemeClr val="accent5">
-              <a:shade val="80000"/>
-              <a:hueOff val="0"/>
-              <a:satOff val="0"/>
-              <a:lumOff val="0"/>
-              <a:alphaOff val="0"/>
-            </a:schemeClr>
-          </a:solidFill>
-          <a:prstDash val="solid"/>
-          <a:miter lim="800000"/>
-        </a:ln>
-        <a:effectLst/>
-      </dsp:spPr>
-      <dsp:style>
-        <a:lnRef idx="2">
-          <a:scrgbClr r="0" g="0" b="0"/>
-        </a:lnRef>
-        <a:fillRef idx="1">
-          <a:scrgbClr r="0" g="0" b="0"/>
-        </a:fillRef>
-        <a:effectRef idx="0">
-          <a:scrgbClr r="0" g="0" b="0"/>
-        </a:effectRef>
-        <a:fontRef idx="minor">
-          <a:schemeClr val="lt1"/>
-        </a:fontRef>
-      </dsp:style>
-      <dsp:txBody>
-        <a:bodyPr spcFirstLastPara="0" vert="horz" wrap="square" lIns="53340" tIns="53340" rIns="53340" bIns="53340" numCol="1" spcCol="1270" anchor="ctr" anchorCtr="0">
-          <a:noAutofit/>
-        </a:bodyPr>
-        <a:lstStyle/>
-        <a:p>
-          <a:pPr lvl="0" algn="ctr" defTabSz="622300">
-            <a:lnSpc>
-              <a:spcPct val="90000"/>
-            </a:lnSpc>
-            <a:spcBef>
-              <a:spcPct val="0"/>
-            </a:spcBef>
-            <a:spcAft>
-              <a:spcPct val="35000"/>
-            </a:spcAft>
-          </a:pPr>
-          <a:r>
-            <a:rPr lang="es-ES" sz="1400" kern="1200" dirty="0" smtClean="0"/>
-            <a:t>Verificación</a:t>
-          </a:r>
-          <a:endParaRPr lang="es-ES" sz="1400" kern="1200" dirty="0"/>
-        </a:p>
-      </dsp:txBody>
-      <dsp:txXfrm>
-        <a:off x="4569614" y="3364154"/>
-        <a:ext cx="1296662" cy="879078"/>
-      </dsp:txXfrm>
-    </dsp:sp>
-    <dsp:sp modelId="{31F43388-8B1B-4DA9-9795-06D00AC3E9C8}">
-      <dsp:nvSpPr>
-        <dsp:cNvPr id="0" name=""/>
-        <dsp:cNvSpPr/>
-      </dsp:nvSpPr>
-      <dsp:spPr>
-        <a:xfrm>
-          <a:off x="5913842" y="3409501"/>
-          <a:ext cx="1012258" cy="787400"/>
-        </a:xfrm>
-        <a:prstGeom prst="rect">
-          <a:avLst/>
-        </a:prstGeom>
-        <a:noFill/>
-        <a:ln>
-          <a:noFill/>
-        </a:ln>
-        <a:effectLst/>
-      </dsp:spPr>
-      <dsp:style>
-        <a:lnRef idx="0">
-          <a:scrgbClr r="0" g="0" b="0"/>
-        </a:lnRef>
-        <a:fillRef idx="0">
-          <a:scrgbClr r="0" g="0" b="0"/>
-        </a:fillRef>
-        <a:effectRef idx="0">
-          <a:scrgbClr r="0" g="0" b="0"/>
-        </a:effectRef>
-        <a:fontRef idx="minor"/>
-      </dsp:style>
-    </dsp:sp>
-    <dsp:sp modelId="{D16181EC-2972-492A-A361-E129EE7F9699}">
-      <dsp:nvSpPr>
-        <dsp:cNvPr id="0" name=""/>
-        <dsp:cNvSpPr/>
-      </dsp:nvSpPr>
-      <dsp:spPr>
-        <a:xfrm>
-          <a:off x="5675993" y="4410948"/>
-          <a:ext cx="1391794" cy="974210"/>
-        </a:xfrm>
-        <a:prstGeom prst="roundRect">
-          <a:avLst>
-            <a:gd name="adj" fmla="val 16670"/>
-          </a:avLst>
-        </a:prstGeom>
-        <a:solidFill>
-          <a:schemeClr val="lt1">
-            <a:hueOff val="0"/>
-            <a:satOff val="0"/>
-            <a:lumOff val="0"/>
-            <a:alphaOff val="0"/>
-          </a:schemeClr>
-        </a:solidFill>
-        <a:ln w="12700" cap="flat" cmpd="sng" algn="ctr">
-          <a:solidFill>
-            <a:schemeClr val="accent5">
-              <a:shade val="80000"/>
-              <a:hueOff val="0"/>
-              <a:satOff val="0"/>
-              <a:lumOff val="0"/>
-              <a:alphaOff val="0"/>
-            </a:schemeClr>
-          </a:solidFill>
-          <a:prstDash val="solid"/>
-          <a:miter lim="800000"/>
-        </a:ln>
-        <a:effectLst/>
-      </dsp:spPr>
-      <dsp:style>
-        <a:lnRef idx="2">
-          <a:scrgbClr r="0" g="0" b="0"/>
-        </a:lnRef>
-        <a:fillRef idx="1">
-          <a:scrgbClr r="0" g="0" b="0"/>
-        </a:fillRef>
-        <a:effectRef idx="0">
-          <a:scrgbClr r="0" g="0" b="0"/>
-        </a:effectRef>
-        <a:fontRef idx="minor">
-          <a:schemeClr val="lt1"/>
-        </a:fontRef>
-      </dsp:style>
-      <dsp:txBody>
-        <a:bodyPr spcFirstLastPara="0" vert="horz" wrap="square" lIns="53340" tIns="53340" rIns="53340" bIns="53340" numCol="1" spcCol="1270" anchor="ctr" anchorCtr="0">
-          <a:noAutofit/>
-        </a:bodyPr>
-        <a:lstStyle/>
-        <a:p>
-          <a:pPr lvl="0" algn="ctr" defTabSz="622300">
-            <a:lnSpc>
-              <a:spcPct val="90000"/>
-            </a:lnSpc>
-            <a:spcBef>
-              <a:spcPct val="0"/>
-            </a:spcBef>
-            <a:spcAft>
-              <a:spcPct val="35000"/>
-            </a:spcAft>
-          </a:pPr>
-          <a:r>
-            <a:rPr lang="es-ES" sz="1400" kern="1200" dirty="0" smtClean="0"/>
-            <a:t>Instalación y mantenimiento</a:t>
-          </a:r>
-          <a:endParaRPr lang="es-ES" sz="1400" kern="1200" dirty="0"/>
-        </a:p>
-      </dsp:txBody>
-      <dsp:txXfrm>
-        <a:off x="5723559" y="4458514"/>
-        <a:ext cx="1296662" cy="879078"/>
-      </dsp:txXfrm>
-    </dsp:sp>
   </dsp:spTree>
 </dsp:drawing>
 </file>
@@ -5022,7 +4273,7 @@
           <a:p>
             <a:fld id="{BACAB49F-3C56-4061-AA8F-163AE124D091}" type="datetimeFigureOut">
               <a:rPr lang="es-ES" smtClean="0"/>
-              <a:t>16/05/2021</a:t>
+              <a:t>20/05/2021</a:t>
             </a:fld>
             <a:endParaRPr lang="es-ES"/>
           </a:p>
@@ -5192,7 +4443,7 @@
           <a:p>
             <a:fld id="{BACAB49F-3C56-4061-AA8F-163AE124D091}" type="datetimeFigureOut">
               <a:rPr lang="es-ES" smtClean="0"/>
-              <a:t>16/05/2021</a:t>
+              <a:t>20/05/2021</a:t>
             </a:fld>
             <a:endParaRPr lang="es-ES"/>
           </a:p>
@@ -5372,7 +4623,7 @@
           <a:p>
             <a:fld id="{BACAB49F-3C56-4061-AA8F-163AE124D091}" type="datetimeFigureOut">
               <a:rPr lang="es-ES" smtClean="0"/>
-              <a:t>16/05/2021</a:t>
+              <a:t>20/05/2021</a:t>
             </a:fld>
             <a:endParaRPr lang="es-ES"/>
           </a:p>
@@ -5542,7 +4793,7 @@
           <a:p>
             <a:fld id="{BACAB49F-3C56-4061-AA8F-163AE124D091}" type="datetimeFigureOut">
               <a:rPr lang="es-ES" smtClean="0"/>
-              <a:t>16/05/2021</a:t>
+              <a:t>20/05/2021</a:t>
             </a:fld>
             <a:endParaRPr lang="es-ES"/>
           </a:p>
@@ -5788,7 +5039,7 @@
           <a:p>
             <a:fld id="{BACAB49F-3C56-4061-AA8F-163AE124D091}" type="datetimeFigureOut">
               <a:rPr lang="es-ES" smtClean="0"/>
-              <a:t>16/05/2021</a:t>
+              <a:t>20/05/2021</a:t>
             </a:fld>
             <a:endParaRPr lang="es-ES"/>
           </a:p>
@@ -6020,7 +5271,7 @@
           <a:p>
             <a:fld id="{BACAB49F-3C56-4061-AA8F-163AE124D091}" type="datetimeFigureOut">
               <a:rPr lang="es-ES" smtClean="0"/>
-              <a:t>16/05/2021</a:t>
+              <a:t>20/05/2021</a:t>
             </a:fld>
             <a:endParaRPr lang="es-ES"/>
           </a:p>
@@ -6387,7 +5638,7 @@
           <a:p>
             <a:fld id="{BACAB49F-3C56-4061-AA8F-163AE124D091}" type="datetimeFigureOut">
               <a:rPr lang="es-ES" smtClean="0"/>
-              <a:t>16/05/2021</a:t>
+              <a:t>20/05/2021</a:t>
             </a:fld>
             <a:endParaRPr lang="es-ES"/>
           </a:p>
@@ -6505,7 +5756,7 @@
           <a:p>
             <a:fld id="{BACAB49F-3C56-4061-AA8F-163AE124D091}" type="datetimeFigureOut">
               <a:rPr lang="es-ES" smtClean="0"/>
-              <a:t>16/05/2021</a:t>
+              <a:t>20/05/2021</a:t>
             </a:fld>
             <a:endParaRPr lang="es-ES"/>
           </a:p>
@@ -6600,7 +5851,7 @@
           <a:p>
             <a:fld id="{BACAB49F-3C56-4061-AA8F-163AE124D091}" type="datetimeFigureOut">
               <a:rPr lang="es-ES" smtClean="0"/>
-              <a:t>16/05/2021</a:t>
+              <a:t>20/05/2021</a:t>
             </a:fld>
             <a:endParaRPr lang="es-ES"/>
           </a:p>
@@ -6877,7 +6128,7 @@
           <a:p>
             <a:fld id="{BACAB49F-3C56-4061-AA8F-163AE124D091}" type="datetimeFigureOut">
               <a:rPr lang="es-ES" smtClean="0"/>
-              <a:t>16/05/2021</a:t>
+              <a:t>20/05/2021</a:t>
             </a:fld>
             <a:endParaRPr lang="es-ES"/>
           </a:p>
@@ -7130,7 +6381,7 @@
           <a:p>
             <a:fld id="{BACAB49F-3C56-4061-AA8F-163AE124D091}" type="datetimeFigureOut">
               <a:rPr lang="es-ES" smtClean="0"/>
-              <a:t>16/05/2021</a:t>
+              <a:t>20/05/2021</a:t>
             </a:fld>
             <a:endParaRPr lang="es-ES"/>
           </a:p>
@@ -7343,7 +6594,7 @@
           <a:p>
             <a:fld id="{BACAB49F-3C56-4061-AA8F-163AE124D091}" type="datetimeFigureOut">
               <a:rPr lang="es-ES" smtClean="0"/>
-              <a:t>16/05/2021</a:t>
+              <a:t>20/05/2021</a:t>
             </a:fld>
             <a:endParaRPr lang="es-ES"/>
           </a:p>

</xml_diff>